<commit_message>
bemutató dia, 1. tartalmi dia elkészítése
</commit_message>
<xml_diff>
--- a/DAW.pptx
+++ b/DAW.pptx
@@ -12,6 +12,7 @@
     <p:sldId id="260" r:id="rId6"/>
     <p:sldId id="259" r:id="rId7"/>
     <p:sldId id="261" r:id="rId8"/>
+    <p:sldId id="263" r:id="rId9"/>
   </p:sldIdLst>
   <p:sldSz cx="12192000" cy="6858000"/>
   <p:notesSz cx="6858000" cy="9144000"/>
@@ -303,7 +304,7 @@
           <a:p>
             <a:fld id="{7FB75100-EDBA-48EA-928A-085546B307CA}" type="datetimeFigureOut">
               <a:rPr lang="hu-HU" smtClean="0"/>
-              <a:t>2022.09.12.</a:t>
+              <a:t>2022.09.13.</a:t>
             </a:fld>
             <a:endParaRPr lang="hu-HU"/>
           </a:p>
@@ -601,7 +602,7 @@
           <a:p>
             <a:fld id="{7FB75100-EDBA-48EA-928A-085546B307CA}" type="datetimeFigureOut">
               <a:rPr lang="hu-HU" smtClean="0"/>
-              <a:t>2022.09.12.</a:t>
+              <a:t>2022.09.13.</a:t>
             </a:fld>
             <a:endParaRPr lang="hu-HU"/>
           </a:p>
@@ -793,7 +794,7 @@
           <a:p>
             <a:fld id="{7FB75100-EDBA-48EA-928A-085546B307CA}" type="datetimeFigureOut">
               <a:rPr lang="hu-HU" smtClean="0"/>
-              <a:t>2022.09.12.</a:t>
+              <a:t>2022.09.13.</a:t>
             </a:fld>
             <a:endParaRPr lang="hu-HU"/>
           </a:p>
@@ -1054,7 +1055,7 @@
           <a:p>
             <a:fld id="{7FB75100-EDBA-48EA-928A-085546B307CA}" type="datetimeFigureOut">
               <a:rPr lang="hu-HU" smtClean="0"/>
-              <a:t>2022.09.12.</a:t>
+              <a:t>2022.09.13.</a:t>
             </a:fld>
             <a:endParaRPr lang="hu-HU"/>
           </a:p>
@@ -1478,7 +1479,7 @@
           <a:p>
             <a:fld id="{7FB75100-EDBA-48EA-928A-085546B307CA}" type="datetimeFigureOut">
               <a:rPr lang="hu-HU" smtClean="0"/>
-              <a:t>2022.09.12.</a:t>
+              <a:t>2022.09.13.</a:t>
             </a:fld>
             <a:endParaRPr lang="hu-HU"/>
           </a:p>
@@ -2015,7 +2016,7 @@
           <a:p>
             <a:fld id="{7FB75100-EDBA-48EA-928A-085546B307CA}" type="datetimeFigureOut">
               <a:rPr lang="hu-HU" smtClean="0"/>
-              <a:t>2022.09.12.</a:t>
+              <a:t>2022.09.13.</a:t>
             </a:fld>
             <a:endParaRPr lang="hu-HU"/>
           </a:p>
@@ -2879,7 +2880,7 @@
           <a:p>
             <a:fld id="{7FB75100-EDBA-48EA-928A-085546B307CA}" type="datetimeFigureOut">
               <a:rPr lang="hu-HU" smtClean="0"/>
-              <a:t>2022.09.12.</a:t>
+              <a:t>2022.09.13.</a:t>
             </a:fld>
             <a:endParaRPr lang="hu-HU"/>
           </a:p>
@@ -3049,7 +3050,7 @@
           <a:p>
             <a:fld id="{7FB75100-EDBA-48EA-928A-085546B307CA}" type="datetimeFigureOut">
               <a:rPr lang="hu-HU" smtClean="0"/>
-              <a:t>2022.09.12.</a:t>
+              <a:t>2022.09.13.</a:t>
             </a:fld>
             <a:endParaRPr lang="hu-HU"/>
           </a:p>
@@ -3233,7 +3234,7 @@
           <a:p>
             <a:fld id="{7FB75100-EDBA-48EA-928A-085546B307CA}" type="datetimeFigureOut">
               <a:rPr lang="hu-HU" smtClean="0"/>
-              <a:t>2022.09.12.</a:t>
+              <a:t>2022.09.13.</a:t>
             </a:fld>
             <a:endParaRPr lang="hu-HU"/>
           </a:p>
@@ -3403,7 +3404,7 @@
           <a:p>
             <a:fld id="{7FB75100-EDBA-48EA-928A-085546B307CA}" type="datetimeFigureOut">
               <a:rPr lang="hu-HU" smtClean="0"/>
-              <a:t>2022.09.12.</a:t>
+              <a:t>2022.09.13.</a:t>
             </a:fld>
             <a:endParaRPr lang="hu-HU"/>
           </a:p>
@@ -3647,7 +3648,7 @@
           <a:p>
             <a:fld id="{7FB75100-EDBA-48EA-928A-085546B307CA}" type="datetimeFigureOut">
               <a:rPr lang="hu-HU" smtClean="0"/>
-              <a:t>2022.09.12.</a:t>
+              <a:t>2022.09.13.</a:t>
             </a:fld>
             <a:endParaRPr lang="hu-HU"/>
           </a:p>
@@ -3883,7 +3884,7 @@
           <a:p>
             <a:fld id="{7FB75100-EDBA-48EA-928A-085546B307CA}" type="datetimeFigureOut">
               <a:rPr lang="hu-HU" smtClean="0"/>
-              <a:t>2022.09.12.</a:t>
+              <a:t>2022.09.13.</a:t>
             </a:fld>
             <a:endParaRPr lang="hu-HU"/>
           </a:p>
@@ -4349,7 +4350,7 @@
           <a:p>
             <a:fld id="{7FB75100-EDBA-48EA-928A-085546B307CA}" type="datetimeFigureOut">
               <a:rPr lang="hu-HU" smtClean="0"/>
-              <a:t>2022.09.12.</a:t>
+              <a:t>2022.09.13.</a:t>
             </a:fld>
             <a:endParaRPr lang="hu-HU"/>
           </a:p>
@@ -4467,7 +4468,7 @@
           <a:p>
             <a:fld id="{7FB75100-EDBA-48EA-928A-085546B307CA}" type="datetimeFigureOut">
               <a:rPr lang="hu-HU" smtClean="0"/>
-              <a:t>2022.09.12.</a:t>
+              <a:t>2022.09.13.</a:t>
             </a:fld>
             <a:endParaRPr lang="hu-HU"/>
           </a:p>
@@ -4562,7 +4563,7 @@
           <a:p>
             <a:fld id="{7FB75100-EDBA-48EA-928A-085546B307CA}" type="datetimeFigureOut">
               <a:rPr lang="hu-HU" smtClean="0"/>
-              <a:t>2022.09.12.</a:t>
+              <a:t>2022.09.13.</a:t>
             </a:fld>
             <a:endParaRPr lang="hu-HU"/>
           </a:p>
@@ -4817,7 +4818,7 @@
           <a:p>
             <a:fld id="{7FB75100-EDBA-48EA-928A-085546B307CA}" type="datetimeFigureOut">
               <a:rPr lang="hu-HU" smtClean="0"/>
-              <a:t>2022.09.12.</a:t>
+              <a:t>2022.09.13.</a:t>
             </a:fld>
             <a:endParaRPr lang="hu-HU"/>
           </a:p>
@@ -5117,7 +5118,7 @@
           <a:p>
             <a:fld id="{7FB75100-EDBA-48EA-928A-085546B307CA}" type="datetimeFigureOut">
               <a:rPr lang="hu-HU" smtClean="0"/>
-              <a:t>2022.09.12.</a:t>
+              <a:t>2022.09.13.</a:t>
             </a:fld>
             <a:endParaRPr lang="hu-HU"/>
           </a:p>
@@ -5351,7 +5352,7 @@
           <a:p>
             <a:fld id="{7FB75100-EDBA-48EA-928A-085546B307CA}" type="datetimeFigureOut">
               <a:rPr lang="hu-HU" smtClean="0"/>
-              <a:t>2022.09.12.</a:t>
+              <a:t>2022.09.13.</a:t>
             </a:fld>
             <a:endParaRPr lang="hu-HU"/>
           </a:p>
@@ -6035,7 +6036,12 @@
             <p:ph type="ctrTitle"/>
           </p:nvPr>
         </p:nvSpPr>
-        <p:spPr/>
+        <p:spPr>
+          <a:xfrm>
+            <a:off x="1375983" y="2117660"/>
+            <a:ext cx="9440034" cy="1828801"/>
+          </a:xfrm>
+        </p:spPr>
         <p:txBody>
           <a:bodyPr/>
           <a:lstStyle/>
@@ -6101,11 +6107,7 @@
           <a:p>
             <a:r>
               <a:rPr lang="hu-HU" dirty="0" smtClean="0"/>
-              <a:t>Készítette: Tátrai </a:t>
-            </a:r>
-            <a:r>
-              <a:rPr lang="hu-HU" dirty="0" smtClean="0"/>
-              <a:t>Dominik</a:t>
+              <a:t>Készítette: Tátrai Dominik</a:t>
             </a:r>
             <a:endParaRPr lang="hu-HU" dirty="0"/>
           </a:p>
@@ -6184,20 +6186,40 @@
       </p:sp>
       <p:sp>
         <p:nvSpPr>
-          <p:cNvPr id="9" name="Háromszög 8"/>
+          <p:cNvPr id="4" name="Egy sarkán levágott téglalap 3"/>
           <p:cNvSpPr/>
           <p:nvPr/>
         </p:nvSpPr>
         <p:spPr>
-          <a:xfrm rot="10800000">
-            <a:off x="0" y="1638299"/>
-            <a:ext cx="2656114" cy="1828800"/>
+          <a:xfrm flipH="1">
+            <a:off x="8775700" y="5054600"/>
+            <a:ext cx="3416300" cy="1803400"/>
           </a:xfrm>
-          <a:prstGeom prst="triangle">
+          <a:prstGeom prst="snip1Rect">
             <a:avLst>
-              <a:gd name="adj" fmla="val 100000"/>
+              <a:gd name="adj" fmla="val 50000"/>
             </a:avLst>
           </a:prstGeom>
+          <a:blipFill dpi="0" rotWithShape="1">
+            <a:blip r:embed="rId4" cstate="print">
+              <a:extLst>
+                <a:ext uri="{28A0092B-C50C-407E-A947-70E740481C1C}">
+                  <a14:useLocalDpi xmlns:a14="http://schemas.microsoft.com/office/drawing/2010/main" val="0"/>
+                </a:ext>
+              </a:extLst>
+            </a:blip>
+            <a:srcRect/>
+            <a:stretch>
+              <a:fillRect/>
+            </a:stretch>
+          </a:blipFill>
+          <a:ln>
+            <a:solidFill>
+              <a:schemeClr val="tx1">
+                <a:lumMod val="65000"/>
+              </a:schemeClr>
+            </a:solidFill>
+          </a:ln>
         </p:spPr>
         <p:style>
           <a:lnRef idx="2">
@@ -6224,6 +6246,168 @@
           </a:p>
         </p:txBody>
       </p:sp>
+      <p:pic>
+        <p:nvPicPr>
+          <p:cNvPr id="1026" name="Picture 2" descr="Ripped paper note"/>
+          <p:cNvPicPr>
+            <a:picLocks noChangeAspect="1" noChangeArrowheads="1"/>
+          </p:cNvPicPr>
+          <p:nvPr/>
+        </p:nvPicPr>
+        <p:blipFill>
+          <a:blip r:embed="rId5">
+            <a:extLst>
+              <a:ext uri="{BEBA8EAE-BF5A-486C-A8C5-ECC9F3942E4B}">
+                <a14:imgProps xmlns:a14="http://schemas.microsoft.com/office/drawing/2010/main">
+                  <a14:imgLayer r:embed="rId6">
+                    <a14:imgEffect>
+                      <a14:backgroundRemoval t="5036" b="94724" l="4633" r="96486"/>
+                    </a14:imgEffect>
+                  </a14:imgLayer>
+                </a14:imgProps>
+              </a:ext>
+              <a:ext uri="{28A0092B-C50C-407E-A947-70E740481C1C}">
+                <a14:useLocalDpi xmlns:a14="http://schemas.microsoft.com/office/drawing/2010/main" val="0"/>
+              </a:ext>
+            </a:extLst>
+          </a:blip>
+          <a:srcRect/>
+          <a:stretch>
+            <a:fillRect/>
+          </a:stretch>
+        </p:blipFill>
+        <p:spPr bwMode="auto">
+          <a:xfrm>
+            <a:off x="7914642" y="-10970"/>
+            <a:ext cx="4277358" cy="2849294"/>
+          </a:xfrm>
+          <a:prstGeom prst="rect">
+            <a:avLst/>
+          </a:prstGeom>
+          <a:noFill/>
+          <a:extLst>
+            <a:ext uri="{909E8E84-426E-40DD-AFC4-6F175D3DCCD1}">
+              <a14:hiddenFill xmlns:a14="http://schemas.microsoft.com/office/drawing/2010/main">
+                <a:solidFill>
+                  <a:srgbClr val="FFFFFF"/>
+                </a:solidFill>
+              </a14:hiddenFill>
+            </a:ext>
+          </a:extLst>
+        </p:spPr>
+      </p:pic>
+      <p:pic>
+        <p:nvPicPr>
+          <p:cNvPr id="1030" name="Picture 6" descr="Music Notes Decal, 20x24&quot; - Contemporary - Wall Decals - by Design With  Vinyl | Houzz"/>
+          <p:cNvPicPr>
+            <a:picLocks noChangeAspect="1" noChangeArrowheads="1"/>
+          </p:cNvPicPr>
+          <p:nvPr/>
+        </p:nvPicPr>
+        <p:blipFill>
+          <a:blip r:embed="rId7" cstate="print">
+            <a:extLst>
+              <a:ext uri="{BEBA8EAE-BF5A-486C-A8C5-ECC9F3942E4B}">
+                <a14:imgProps xmlns:a14="http://schemas.microsoft.com/office/drawing/2010/main">
+                  <a14:imgLayer r:embed="rId8">
+                    <a14:imgEffect>
+                      <a14:backgroundRemoval t="0" b="100000" l="0" r="100000">
+                        <a14:foregroundMark x1="63424" y1="54844" x2="60117" y2="52500"/>
+                        <a14:foregroundMark x1="76265" y1="49219" x2="83268" y2="45313"/>
+                        <a14:foregroundMark x1="91051" y1="20313" x2="92996" y2="20156"/>
+                        <a14:backgroundMark x1="57977" y1="38594" x2="58755" y2="37969"/>
+                        <a14:backgroundMark x1="60895" y1="40313" x2="60895" y2="40313"/>
+                        <a14:backgroundMark x1="61673" y1="5781" x2="61673" y2="5781"/>
+                      </a14:backgroundRemoval>
+                    </a14:imgEffect>
+                  </a14:imgLayer>
+                </a14:imgProps>
+              </a:ext>
+              <a:ext uri="{28A0092B-C50C-407E-A947-70E740481C1C}">
+                <a14:useLocalDpi xmlns:a14="http://schemas.microsoft.com/office/drawing/2010/main" val="0"/>
+              </a:ext>
+            </a:extLst>
+          </a:blip>
+          <a:srcRect/>
+          <a:stretch>
+            <a:fillRect/>
+          </a:stretch>
+        </p:blipFill>
+        <p:spPr bwMode="auto">
+          <a:xfrm>
+            <a:off x="10579100" y="745943"/>
+            <a:ext cx="1167796" cy="1454065"/>
+          </a:xfrm>
+          <a:prstGeom prst="rect">
+            <a:avLst/>
+          </a:prstGeom>
+          <a:noFill/>
+          <a:effectLst>
+            <a:outerShdw blurRad="50800" dist="38100" dir="13500000" algn="br" rotWithShape="0">
+              <a:prstClr val="black">
+                <a:alpha val="40000"/>
+              </a:prstClr>
+            </a:outerShdw>
+          </a:effectLst>
+          <a:extLst>
+            <a:ext uri="{909E8E84-426E-40DD-AFC4-6F175D3DCCD1}">
+              <a14:hiddenFill xmlns:a14="http://schemas.microsoft.com/office/drawing/2010/main">
+                <a:solidFill>
+                  <a:srgbClr val="FFFFFF"/>
+                </a:solidFill>
+              </a14:hiddenFill>
+            </a:ext>
+          </a:extLst>
+        </p:spPr>
+      </p:pic>
+      <p:pic>
+        <p:nvPicPr>
+          <p:cNvPr id="1032" name="Picture 8" descr="B# Chord"/>
+          <p:cNvPicPr>
+            <a:picLocks noChangeAspect="1" noChangeArrowheads="1"/>
+          </p:cNvPicPr>
+          <p:nvPr/>
+        </p:nvPicPr>
+        <p:blipFill>
+          <a:blip r:embed="rId9">
+            <a:extLst>
+              <a:ext uri="{28A0092B-C50C-407E-A947-70E740481C1C}">
+                <a14:useLocalDpi xmlns:a14="http://schemas.microsoft.com/office/drawing/2010/main" val="0"/>
+              </a:ext>
+            </a:extLst>
+          </a:blip>
+          <a:srcRect/>
+          <a:stretch>
+            <a:fillRect/>
+          </a:stretch>
+        </p:blipFill>
+        <p:spPr bwMode="auto">
+          <a:xfrm>
+            <a:off x="8587809" y="483820"/>
+            <a:ext cx="1633840" cy="1633840"/>
+          </a:xfrm>
+          <a:prstGeom prst="rect">
+            <a:avLst/>
+          </a:prstGeom>
+          <a:noFill/>
+          <a:effectLst>
+            <a:outerShdw blurRad="50800" dist="38100" dir="13500000" algn="br" rotWithShape="0">
+              <a:prstClr val="black">
+                <a:alpha val="40000"/>
+              </a:prstClr>
+            </a:outerShdw>
+          </a:effectLst>
+          <a:extLst>
+            <a:ext uri="{909E8E84-426E-40DD-AFC4-6F175D3DCCD1}">
+              <a14:hiddenFill xmlns:a14="http://schemas.microsoft.com/office/drawing/2010/main">
+                <a:solidFill>
+                  <a:srgbClr val="FFFFFF"/>
+                </a:solidFill>
+              </a14:hiddenFill>
+            </a:ext>
+          </a:extLst>
+        </p:spPr>
+      </p:pic>
     </p:spTree>
     <p:extLst>
       <p:ext uri="{BB962C8B-B14F-4D97-AF65-F5344CB8AC3E}">
@@ -6276,6 +6460,7 @@
           <a:bodyPr/>
           <a:lstStyle/>
           <a:p>
+            <a:pPr algn="l"/>
             <a:r>
               <a:rPr lang="hu-HU" dirty="0" smtClean="0"/>
               <a:t>Mi az a DAW</a:t>
@@ -6299,10 +6484,86 @@
           <a:bodyPr/>
           <a:lstStyle/>
           <a:p>
-            <a:endParaRPr lang="hu-HU"/>
-          </a:p>
-        </p:txBody>
-      </p:sp>
+            <a:pPr marL="36900" indent="0">
+              <a:buNone/>
+            </a:pPr>
+            <a:r>
+              <a:rPr lang="hu-HU" dirty="0" smtClean="0"/>
+              <a:t>(Digitális </a:t>
+            </a:r>
+            <a:r>
+              <a:rPr lang="hu-HU" dirty="0" err="1" smtClean="0"/>
+              <a:t>audió</a:t>
+            </a:r>
+            <a:r>
+              <a:rPr lang="hu-HU" dirty="0" smtClean="0"/>
+              <a:t> munkaállomás)</a:t>
+            </a:r>
+          </a:p>
+          <a:p>
+            <a:r>
+              <a:rPr lang="hu-HU" dirty="0" smtClean="0"/>
+              <a:t>Elektronikus eszköz/ szoftver:</a:t>
+            </a:r>
+            <a:br>
+              <a:rPr lang="hu-HU" dirty="0" smtClean="0"/>
+            </a:br>
+            <a:r>
+              <a:rPr lang="hu-HU" dirty="0" smtClean="0"/>
+              <a:t>-hangfájlok rögzítésére, szerkesztésére szolgál</a:t>
+            </a:r>
+          </a:p>
+          <a:p>
+            <a:r>
+              <a:rPr lang="hu-HU" dirty="0" smtClean="0"/>
+              <a:t>Széles választék:</a:t>
+            </a:r>
+            <a:br>
+              <a:rPr lang="hu-HU" dirty="0" smtClean="0"/>
+            </a:br>
+            <a:r>
+              <a:rPr lang="hu-HU" dirty="0" smtClean="0"/>
+              <a:t>Laptopon használt szoftvertől…		„integrált egyéni egység”</a:t>
+            </a:r>
+          </a:p>
+        </p:txBody>
+      </p:sp>
+      <p:cxnSp>
+        <p:nvCxnSpPr>
+          <p:cNvPr id="5" name="Egyenes összekötő nyíllal 4"/>
+          <p:cNvCxnSpPr/>
+          <p:nvPr/>
+        </p:nvCxnSpPr>
+        <p:spPr>
+          <a:xfrm>
+            <a:off x="5003800" y="3416300"/>
+            <a:ext cx="355600" cy="0"/>
+          </a:xfrm>
+          <a:prstGeom prst="straightConnector1">
+            <a:avLst/>
+          </a:prstGeom>
+          <a:ln w="57150">
+            <a:solidFill>
+              <a:srgbClr val="00B0F0"/>
+            </a:solidFill>
+            <a:tailEnd type="triangle"/>
+          </a:ln>
+        </p:spPr>
+        <p:style>
+          <a:lnRef idx="1">
+            <a:schemeClr val="accent1"/>
+          </a:lnRef>
+          <a:fillRef idx="0">
+            <a:schemeClr val="accent1"/>
+          </a:fillRef>
+          <a:effectRef idx="0">
+            <a:schemeClr val="accent1"/>
+          </a:effectRef>
+          <a:fontRef idx="minor">
+            <a:schemeClr val="tx1"/>
+          </a:fontRef>
+        </p:style>
+      </p:cxnSp>
     </p:spTree>
     <p:extLst>
       <p:ext uri="{BB962C8B-B14F-4D97-AF65-F5344CB8AC3E}">
@@ -6688,6 +6949,65 @@
           <a:bodyPr/>
           <a:lstStyle/>
           <a:p>
+            <a:r>
+              <a:rPr lang="hu-HU" dirty="0">
+                <a:hlinkClick r:id="rId2"/>
+              </a:rPr>
+              <a:t>https://in.pinterest.com/pin/607915649691778141</a:t>
+            </a:r>
+            <a:r>
+              <a:rPr lang="hu-HU" dirty="0" smtClean="0">
+                <a:hlinkClick r:id="rId2"/>
+              </a:rPr>
+              <a:t>/</a:t>
+            </a:r>
+            <a:endParaRPr lang="hu-HU" dirty="0" smtClean="0"/>
+          </a:p>
+          <a:p>
+            <a:r>
+              <a:rPr lang="hu-HU" dirty="0"/>
+              <a:t>https://</a:t>
+            </a:r>
+            <a:r>
+              <a:rPr lang="hu-HU" dirty="0" smtClean="0"/>
+              <a:t>online.berklee.edu/takenote/wp-content/uploads/2022/02/Take-Note-DAW-image.jpg</a:t>
+            </a:r>
+          </a:p>
+          <a:p>
+            <a:r>
+              <a:rPr lang="hu-HU" dirty="0">
+                <a:hlinkClick r:id="rId3"/>
+              </a:rPr>
+              <a:t>https://</a:t>
+            </a:r>
+            <a:r>
+              <a:rPr lang="hu-HU" dirty="0" smtClean="0">
+                <a:hlinkClick r:id="rId3"/>
+              </a:rPr>
+              <a:t>www.freepik.com/free-vector/ripped-paper-note_4561983.htm</a:t>
+            </a:r>
+            <a:endParaRPr lang="hu-HU" dirty="0" smtClean="0"/>
+          </a:p>
+          <a:p>
+            <a:r>
+              <a:rPr lang="hu-HU" dirty="0">
+                <a:hlinkClick r:id="rId4"/>
+              </a:rPr>
+              <a:t>https://</a:t>
+            </a:r>
+            <a:r>
+              <a:rPr lang="hu-HU" dirty="0" smtClean="0">
+                <a:hlinkClick r:id="rId4"/>
+              </a:rPr>
+              <a:t>st.hzcdn.com/simgs/0cf142150825f739_4-5579/home-design.jpg</a:t>
+            </a:r>
+            <a:endParaRPr lang="hu-HU" dirty="0" smtClean="0"/>
+          </a:p>
+          <a:p>
+            <a:r>
+              <a:rPr lang="hu-HU" dirty="0"/>
+              <a:t>https://jguitar.com/images/chordshape/Bsharp-Major-Bsharp-x%2C3%2C2%2C0%2C1%2C3.png</a:t>
+            </a:r>
             <a:endParaRPr lang="hu-HU" dirty="0"/>
           </a:p>
         </p:txBody>
@@ -6709,6 +7029,81 @@
       </p:par>
     </p:tnLst>
   </p:timing>
+</p:sld>
+</file>
+
+<file path=ppt/slides/slide8.xml><?xml version="1.0" encoding="utf-8"?>
+<p:sld xmlns:a="http://schemas.openxmlformats.org/drawingml/2006/main" xmlns:r="http://schemas.openxmlformats.org/officeDocument/2006/relationships" xmlns:p="http://schemas.openxmlformats.org/presentationml/2006/main">
+  <p:cSld>
+    <p:spTree>
+      <p:nvGrpSpPr>
+        <p:cNvPr id="1" name=""/>
+        <p:cNvGrpSpPr/>
+        <p:nvPr/>
+      </p:nvGrpSpPr>
+      <p:grpSpPr>
+        <a:xfrm>
+          <a:off x="0" y="0"/>
+          <a:ext cx="0" cy="0"/>
+          <a:chOff x="0" y="0"/>
+          <a:chExt cx="0" cy="0"/>
+        </a:xfrm>
+      </p:grpSpPr>
+      <p:sp>
+        <p:nvSpPr>
+          <p:cNvPr id="2" name="Cím 1"/>
+          <p:cNvSpPr>
+            <a:spLocks noGrp="1"/>
+          </p:cNvSpPr>
+          <p:nvPr>
+            <p:ph type="title"/>
+          </p:nvPr>
+        </p:nvSpPr>
+        <p:spPr/>
+        <p:txBody>
+          <a:bodyPr/>
+          <a:lstStyle/>
+          <a:p>
+            <a:r>
+              <a:rPr lang="hu-HU" dirty="0" smtClean="0"/>
+              <a:t>Tartalmi források</a:t>
+            </a:r>
+            <a:endParaRPr lang="hu-HU" dirty="0"/>
+          </a:p>
+        </p:txBody>
+      </p:sp>
+      <p:sp>
+        <p:nvSpPr>
+          <p:cNvPr id="3" name="Tartalom helye 2"/>
+          <p:cNvSpPr>
+            <a:spLocks noGrp="1"/>
+          </p:cNvSpPr>
+          <p:nvPr>
+            <p:ph idx="1"/>
+          </p:nvPr>
+        </p:nvSpPr>
+        <p:spPr/>
+        <p:txBody>
+          <a:bodyPr/>
+          <a:lstStyle/>
+          <a:p>
+            <a:r>
+              <a:rPr lang="hu-HU" dirty="0"/>
+              <a:t>https://integraudio.com/how-to-develop-daw/</a:t>
+            </a:r>
+          </a:p>
+        </p:txBody>
+      </p:sp>
+    </p:spTree>
+    <p:extLst>
+      <p:ext uri="{BB962C8B-B14F-4D97-AF65-F5344CB8AC3E}">
+        <p14:creationId xmlns:p14="http://schemas.microsoft.com/office/powerpoint/2010/main" val="1048620916"/>
+      </p:ext>
+    </p:extLst>
+  </p:cSld>
+  <p:clrMapOvr>
+    <a:masterClrMapping/>
+  </p:clrMapOvr>
 </p:sld>
 </file>
 

</xml_diff>

<commit_message>
tartalom, design 4. diáig
</commit_message>
<xml_diff>
--- a/DAW.pptx
+++ b/DAW.pptx
@@ -119,6 +119,312 @@
 </p:presentation>
 </file>
 
+<file path=ppt/revisionInfo.xml><?xml version="1.0" encoding="utf-8"?>
+<p1510:revInfo xmlns:a="http://schemas.openxmlformats.org/drawingml/2006/main" xmlns:r="http://schemas.openxmlformats.org/officeDocument/2006/relationships" xmlns:p1510="http://schemas.microsoft.com/office/powerpoint/2015/10/main">
+  <p1510:revLst>
+    <p1510:client id="{5B54EF79-89E9-4C1C-8D2A-4ADBEC983752}" v="163" dt="2022-09-14T20:58:05.240"/>
+  </p1510:revLst>
+</p1510:revInfo>
+</file>
+
+<file path=ppt/changesInfos/changesInfo1.xml><?xml version="1.0" encoding="utf-8"?>
+<pc:chgInfo xmlns:a="http://schemas.openxmlformats.org/drawingml/2006/main" xmlns:r="http://schemas.openxmlformats.org/officeDocument/2006/relationships" xmlns:ac="http://schemas.microsoft.com/office/drawing/2013/main/command" xmlns:pc="http://schemas.microsoft.com/office/powerpoint/2013/main/command">
+  <pc:docChgLst>
+    <pc:chgData name="Dominik Tátrai" userId="353052d5ae88acf7" providerId="LiveId" clId="{5B54EF79-89E9-4C1C-8D2A-4ADBEC983752}"/>
+    <pc:docChg chg="undo redo custSel modSld">
+      <pc:chgData name="Dominik Tátrai" userId="353052d5ae88acf7" providerId="LiveId" clId="{5B54EF79-89E9-4C1C-8D2A-4ADBEC983752}" dt="2022-09-14T20:58:05.239" v="1125" actId="1076"/>
+      <pc:docMkLst>
+        <pc:docMk/>
+      </pc:docMkLst>
+      <pc:sldChg chg="modSp mod">
+        <pc:chgData name="Dominik Tátrai" userId="353052d5ae88acf7" providerId="LiveId" clId="{5B54EF79-89E9-4C1C-8D2A-4ADBEC983752}" dt="2022-09-14T20:08:30.275" v="457" actId="208"/>
+        <pc:sldMkLst>
+          <pc:docMk/>
+          <pc:sldMk cId="101870283" sldId="256"/>
+        </pc:sldMkLst>
+        <pc:spChg chg="mod">
+          <ac:chgData name="Dominik Tátrai" userId="353052d5ae88acf7" providerId="LiveId" clId="{5B54EF79-89E9-4C1C-8D2A-4ADBEC983752}" dt="2022-09-14T20:08:30.275" v="457" actId="208"/>
+          <ac:spMkLst>
+            <pc:docMk/>
+            <pc:sldMk cId="101870283" sldId="256"/>
+            <ac:spMk id="4" creationId="{00000000-0000-0000-0000-000000000000}"/>
+          </ac:spMkLst>
+        </pc:spChg>
+        <pc:spChg chg="mod">
+          <ac:chgData name="Dominik Tátrai" userId="353052d5ae88acf7" providerId="LiveId" clId="{5B54EF79-89E9-4C1C-8D2A-4ADBEC983752}" dt="2022-09-14T20:08:18.665" v="455" actId="208"/>
+          <ac:spMkLst>
+            <pc:docMk/>
+            <pc:sldMk cId="101870283" sldId="256"/>
+            <ac:spMk id="8" creationId="{00000000-0000-0000-0000-000000000000}"/>
+          </ac:spMkLst>
+        </pc:spChg>
+      </pc:sldChg>
+      <pc:sldChg chg="addSp delSp modSp mod">
+        <pc:chgData name="Dominik Tátrai" userId="353052d5ae88acf7" providerId="LiveId" clId="{5B54EF79-89E9-4C1C-8D2A-4ADBEC983752}" dt="2022-09-14T20:17:23.170" v="600" actId="113"/>
+        <pc:sldMkLst>
+          <pc:docMk/>
+          <pc:sldMk cId="1639800600" sldId="257"/>
+        </pc:sldMkLst>
+        <pc:spChg chg="mod">
+          <ac:chgData name="Dominik Tátrai" userId="353052d5ae88acf7" providerId="LiveId" clId="{5B54EF79-89E9-4C1C-8D2A-4ADBEC983752}" dt="2022-09-14T20:10:58.068" v="458" actId="20577"/>
+          <ac:spMkLst>
+            <pc:docMk/>
+            <pc:sldMk cId="1639800600" sldId="257"/>
+            <ac:spMk id="2" creationId="{00000000-0000-0000-0000-000000000000}"/>
+          </ac:spMkLst>
+        </pc:spChg>
+        <pc:spChg chg="mod">
+          <ac:chgData name="Dominik Tátrai" userId="353052d5ae88acf7" providerId="LiveId" clId="{5B54EF79-89E9-4C1C-8D2A-4ADBEC983752}" dt="2022-09-14T20:17:23.170" v="600" actId="113"/>
+          <ac:spMkLst>
+            <pc:docMk/>
+            <pc:sldMk cId="1639800600" sldId="257"/>
+            <ac:spMk id="3" creationId="{00000000-0000-0000-0000-000000000000}"/>
+          </ac:spMkLst>
+        </pc:spChg>
+        <pc:spChg chg="add del mod">
+          <ac:chgData name="Dominik Tátrai" userId="353052d5ae88acf7" providerId="LiveId" clId="{5B54EF79-89E9-4C1C-8D2A-4ADBEC983752}" dt="2022-09-14T19:57:30.766" v="387" actId="11529"/>
+          <ac:spMkLst>
+            <pc:docMk/>
+            <pc:sldMk cId="1639800600" sldId="257"/>
+            <ac:spMk id="7" creationId="{FB5E8D2E-6124-4EAB-57D4-C49EF428A7CF}"/>
+          </ac:spMkLst>
+        </pc:spChg>
+        <pc:spChg chg="add mod">
+          <ac:chgData name="Dominik Tátrai" userId="353052d5ae88acf7" providerId="LiveId" clId="{5B54EF79-89E9-4C1C-8D2A-4ADBEC983752}" dt="2022-09-14T20:05:46.353" v="439" actId="1582"/>
+          <ac:spMkLst>
+            <pc:docMk/>
+            <pc:sldMk cId="1639800600" sldId="257"/>
+            <ac:spMk id="8" creationId="{951A3C41-CBF6-2852-187D-8843C23A6592}"/>
+          </ac:spMkLst>
+        </pc:spChg>
+        <pc:picChg chg="add mod">
+          <ac:chgData name="Dominik Tátrai" userId="353052d5ae88acf7" providerId="LiveId" clId="{5B54EF79-89E9-4C1C-8D2A-4ADBEC983752}" dt="2022-09-14T20:06:02.395" v="442" actId="208"/>
+          <ac:picMkLst>
+            <pc:docMk/>
+            <pc:sldMk cId="1639800600" sldId="257"/>
+            <ac:picMk id="6" creationId="{AAB9BCD5-1A66-6B99-54F0-E12327ADD867}"/>
+          </ac:picMkLst>
+        </pc:picChg>
+        <pc:picChg chg="add del">
+          <ac:chgData name="Dominik Tátrai" userId="353052d5ae88acf7" providerId="LiveId" clId="{5B54EF79-89E9-4C1C-8D2A-4ADBEC983752}" dt="2022-09-14T20:02:14.404" v="429"/>
+          <ac:picMkLst>
+            <pc:docMk/>
+            <pc:sldMk cId="1639800600" sldId="257"/>
+            <ac:picMk id="9" creationId="{A3A1B94B-BB0D-B91D-751A-E5E3644629B9}"/>
+          </ac:picMkLst>
+        </pc:picChg>
+        <pc:picChg chg="add del mod">
+          <ac:chgData name="Dominik Tátrai" userId="353052d5ae88acf7" providerId="LiveId" clId="{5B54EF79-89E9-4C1C-8D2A-4ADBEC983752}" dt="2022-09-14T19:56:26.877" v="369"/>
+          <ac:picMkLst>
+            <pc:docMk/>
+            <pc:sldMk cId="1639800600" sldId="257"/>
+            <ac:picMk id="1026" creationId="{5C70705F-3EAF-BA9D-9CD3-AC4C1A462D54}"/>
+          </ac:picMkLst>
+        </pc:picChg>
+        <pc:picChg chg="add del mod">
+          <ac:chgData name="Dominik Tátrai" userId="353052d5ae88acf7" providerId="LiveId" clId="{5B54EF79-89E9-4C1C-8D2A-4ADBEC983752}" dt="2022-09-14T19:58:53.500" v="410"/>
+          <ac:picMkLst>
+            <pc:docMk/>
+            <pc:sldMk cId="1639800600" sldId="257"/>
+            <ac:picMk id="1028" creationId="{D4C36627-5055-9189-F42B-56784C3C2B01}"/>
+          </ac:picMkLst>
+        </pc:picChg>
+        <pc:cxnChg chg="mod">
+          <ac:chgData name="Dominik Tátrai" userId="353052d5ae88acf7" providerId="LiveId" clId="{5B54EF79-89E9-4C1C-8D2A-4ADBEC983752}" dt="2022-09-14T20:14:14.973" v="466" actId="1076"/>
+          <ac:cxnSpMkLst>
+            <pc:docMk/>
+            <pc:sldMk cId="1639800600" sldId="257"/>
+            <ac:cxnSpMk id="5" creationId="{00000000-0000-0000-0000-000000000000}"/>
+          </ac:cxnSpMkLst>
+        </pc:cxnChg>
+      </pc:sldChg>
+      <pc:sldChg chg="addSp delSp modSp mod">
+        <pc:chgData name="Dominik Tátrai" userId="353052d5ae88acf7" providerId="LiveId" clId="{5B54EF79-89E9-4C1C-8D2A-4ADBEC983752}" dt="2022-09-14T20:37:40.086" v="1036" actId="14100"/>
+        <pc:sldMkLst>
+          <pc:docMk/>
+          <pc:sldMk cId="2079422939" sldId="258"/>
+        </pc:sldMkLst>
+        <pc:spChg chg="mod">
+          <ac:chgData name="Dominik Tátrai" userId="353052d5ae88acf7" providerId="LiveId" clId="{5B54EF79-89E9-4C1C-8D2A-4ADBEC983752}" dt="2022-09-14T20:27:33.836" v="678" actId="120"/>
+          <ac:spMkLst>
+            <pc:docMk/>
+            <pc:sldMk cId="2079422939" sldId="258"/>
+            <ac:spMk id="2" creationId="{00000000-0000-0000-0000-000000000000}"/>
+          </ac:spMkLst>
+        </pc:spChg>
+        <pc:spChg chg="mod">
+          <ac:chgData name="Dominik Tátrai" userId="353052d5ae88acf7" providerId="LiveId" clId="{5B54EF79-89E9-4C1C-8D2A-4ADBEC983752}" dt="2022-09-14T20:37:28.172" v="1033" actId="20577"/>
+          <ac:spMkLst>
+            <pc:docMk/>
+            <pc:sldMk cId="2079422939" sldId="258"/>
+            <ac:spMk id="3" creationId="{00000000-0000-0000-0000-000000000000}"/>
+          </ac:spMkLst>
+        </pc:spChg>
+        <pc:spChg chg="add del">
+          <ac:chgData name="Dominik Tátrai" userId="353052d5ae88acf7" providerId="LiveId" clId="{5B54EF79-89E9-4C1C-8D2A-4ADBEC983752}" dt="2022-09-14T20:33:55.534" v="924" actId="11529"/>
+          <ac:spMkLst>
+            <pc:docMk/>
+            <pc:sldMk cId="2079422939" sldId="258"/>
+            <ac:spMk id="4" creationId="{8B8B1C3B-FAA7-912A-6C58-22E806C1C144}"/>
+          </ac:spMkLst>
+        </pc:spChg>
+        <pc:spChg chg="add mod">
+          <ac:chgData name="Dominik Tátrai" userId="353052d5ae88acf7" providerId="LiveId" clId="{5B54EF79-89E9-4C1C-8D2A-4ADBEC983752}" dt="2022-09-14T20:37:40.086" v="1036" actId="14100"/>
+          <ac:spMkLst>
+            <pc:docMk/>
+            <pc:sldMk cId="2079422939" sldId="258"/>
+            <ac:spMk id="5" creationId="{11CB1380-3795-F2AC-4466-54E1715450AF}"/>
+          </ac:spMkLst>
+        </pc:spChg>
+        <pc:spChg chg="add del mod">
+          <ac:chgData name="Dominik Tátrai" userId="353052d5ae88acf7" providerId="LiveId" clId="{5B54EF79-89E9-4C1C-8D2A-4ADBEC983752}" dt="2022-09-14T20:36:58.403" v="980" actId="21"/>
+          <ac:spMkLst>
+            <pc:docMk/>
+            <pc:sldMk cId="2079422939" sldId="258"/>
+            <ac:spMk id="6" creationId="{712432BD-CCEE-23F8-7C7B-489BD9D69499}"/>
+          </ac:spMkLst>
+        </pc:spChg>
+      </pc:sldChg>
+      <pc:sldChg chg="addSp delSp modSp mod">
+        <pc:chgData name="Dominik Tátrai" userId="353052d5ae88acf7" providerId="LiveId" clId="{5B54EF79-89E9-4C1C-8D2A-4ADBEC983752}" dt="2022-09-14T20:58:05.239" v="1125" actId="1076"/>
+        <pc:sldMkLst>
+          <pc:docMk/>
+          <pc:sldMk cId="22057409" sldId="262"/>
+        </pc:sldMkLst>
+        <pc:spChg chg="mod">
+          <ac:chgData name="Dominik Tátrai" userId="353052d5ae88acf7" providerId="LiveId" clId="{5B54EF79-89E9-4C1C-8D2A-4ADBEC983752}" dt="2022-09-14T20:48:58.598" v="1053" actId="1076"/>
+          <ac:spMkLst>
+            <pc:docMk/>
+            <pc:sldMk cId="22057409" sldId="262"/>
+            <ac:spMk id="2" creationId="{00000000-0000-0000-0000-000000000000}"/>
+          </ac:spMkLst>
+        </pc:spChg>
+        <pc:spChg chg="mod">
+          <ac:chgData name="Dominik Tátrai" userId="353052d5ae88acf7" providerId="LiveId" clId="{5B54EF79-89E9-4C1C-8D2A-4ADBEC983752}" dt="2022-09-14T20:25:04.240" v="645" actId="1076"/>
+          <ac:spMkLst>
+            <pc:docMk/>
+            <pc:sldMk cId="22057409" sldId="262"/>
+            <ac:spMk id="3" creationId="{00000000-0000-0000-0000-000000000000}"/>
+          </ac:spMkLst>
+        </pc:spChg>
+        <pc:spChg chg="add del mod">
+          <ac:chgData name="Dominik Tátrai" userId="353052d5ae88acf7" providerId="LiveId" clId="{5B54EF79-89E9-4C1C-8D2A-4ADBEC983752}" dt="2022-09-14T20:17:19.894" v="598" actId="11529"/>
+          <ac:spMkLst>
+            <pc:docMk/>
+            <pc:sldMk cId="22057409" sldId="262"/>
+            <ac:spMk id="4" creationId="{80051D81-DE39-8E3B-1639-06CA0CE8F039}"/>
+          </ac:spMkLst>
+        </pc:spChg>
+        <pc:picChg chg="add del mod">
+          <ac:chgData name="Dominik Tátrai" userId="353052d5ae88acf7" providerId="LiveId" clId="{5B54EF79-89E9-4C1C-8D2A-4ADBEC983752}" dt="2022-09-14T20:48:24.613" v="1047" actId="22"/>
+          <ac:picMkLst>
+            <pc:docMk/>
+            <pc:sldMk cId="22057409" sldId="262"/>
+            <ac:picMk id="6" creationId="{15A4B551-D38D-2275-5FF1-7B49FE9B31D0}"/>
+          </ac:picMkLst>
+        </pc:picChg>
+        <pc:picChg chg="add mod">
+          <ac:chgData name="Dominik Tátrai" userId="353052d5ae88acf7" providerId="LiveId" clId="{5B54EF79-89E9-4C1C-8D2A-4ADBEC983752}" dt="2022-09-14T20:52:05.182" v="1068" actId="571"/>
+          <ac:picMkLst>
+            <pc:docMk/>
+            <pc:sldMk cId="22057409" sldId="262"/>
+            <ac:picMk id="7" creationId="{C7C5CF01-6869-ECB4-8C0D-69BBE417E65C}"/>
+          </ac:picMkLst>
+        </pc:picChg>
+        <pc:picChg chg="add del mod">
+          <ac:chgData name="Dominik Tátrai" userId="353052d5ae88acf7" providerId="LiveId" clId="{5B54EF79-89E9-4C1C-8D2A-4ADBEC983752}" dt="2022-09-14T20:55:25.036" v="1085" actId="931"/>
+          <ac:picMkLst>
+            <pc:docMk/>
+            <pc:sldMk cId="22057409" sldId="262"/>
+            <ac:picMk id="9" creationId="{FF3C21D5-7903-994A-D1FF-FA15F5A9E300}"/>
+          </ac:picMkLst>
+        </pc:picChg>
+        <pc:picChg chg="add mod">
+          <ac:chgData name="Dominik Tátrai" userId="353052d5ae88acf7" providerId="LiveId" clId="{5B54EF79-89E9-4C1C-8D2A-4ADBEC983752}" dt="2022-09-14T20:56:26.656" v="1100" actId="1076"/>
+          <ac:picMkLst>
+            <pc:docMk/>
+            <pc:sldMk cId="22057409" sldId="262"/>
+            <ac:picMk id="11" creationId="{67518699-2CAE-C797-0B3D-DAE856DE85E8}"/>
+          </ac:picMkLst>
+        </pc:picChg>
+        <pc:picChg chg="add del mod">
+          <ac:chgData name="Dominik Tátrai" userId="353052d5ae88acf7" providerId="LiveId" clId="{5B54EF79-89E9-4C1C-8D2A-4ADBEC983752}" dt="2022-09-14T20:56:53.109" v="1112" actId="22"/>
+          <ac:picMkLst>
+            <pc:docMk/>
+            <pc:sldMk cId="22057409" sldId="262"/>
+            <ac:picMk id="13" creationId="{F82B9D60-A7F9-FC5F-FAED-0FF704EDBC2D}"/>
+          </ac:picMkLst>
+        </pc:picChg>
+        <pc:picChg chg="add mod">
+          <ac:chgData name="Dominik Tátrai" userId="353052d5ae88acf7" providerId="LiveId" clId="{5B54EF79-89E9-4C1C-8D2A-4ADBEC983752}" dt="2022-09-14T20:57:42.045" v="1117" actId="1076"/>
+          <ac:picMkLst>
+            <pc:docMk/>
+            <pc:sldMk cId="22057409" sldId="262"/>
+            <ac:picMk id="15" creationId="{4384773E-B9D6-7BA1-8F65-D4612760D61B}"/>
+          </ac:picMkLst>
+        </pc:picChg>
+        <pc:picChg chg="add mod">
+          <ac:chgData name="Dominik Tátrai" userId="353052d5ae88acf7" providerId="LiveId" clId="{5B54EF79-89E9-4C1C-8D2A-4ADBEC983752}" dt="2022-09-14T20:58:05.239" v="1125" actId="1076"/>
+          <ac:picMkLst>
+            <pc:docMk/>
+            <pc:sldMk cId="22057409" sldId="262"/>
+            <ac:picMk id="17" creationId="{0E301E45-EF06-AAFA-D78A-C6C03A80A9D8}"/>
+          </ac:picMkLst>
+        </pc:picChg>
+        <pc:picChg chg="add mod">
+          <ac:chgData name="Dominik Tátrai" userId="353052d5ae88acf7" providerId="LiveId" clId="{5B54EF79-89E9-4C1C-8D2A-4ADBEC983752}" dt="2022-09-14T20:24:58.557" v="644" actId="1076"/>
+          <ac:picMkLst>
+            <pc:docMk/>
+            <pc:sldMk cId="22057409" sldId="262"/>
+            <ac:picMk id="2050" creationId="{141574E7-B4AA-C450-2913-92E2D53BE599}"/>
+          </ac:picMkLst>
+        </pc:picChg>
+        <pc:picChg chg="add del mod">
+          <ac:chgData name="Dominik Tátrai" userId="353052d5ae88acf7" providerId="LiveId" clId="{5B54EF79-89E9-4C1C-8D2A-4ADBEC983752}" dt="2022-09-14T20:48:18.403" v="1043" actId="21"/>
+          <ac:picMkLst>
+            <pc:docMk/>
+            <pc:sldMk cId="22057409" sldId="262"/>
+            <ac:picMk id="2052" creationId="{4D626D7F-6552-8649-5F30-9906A7DBC793}"/>
+          </ac:picMkLst>
+        </pc:picChg>
+        <pc:picChg chg="add del mod">
+          <ac:chgData name="Dominik Tátrai" userId="353052d5ae88acf7" providerId="LiveId" clId="{5B54EF79-89E9-4C1C-8D2A-4ADBEC983752}" dt="2022-09-14T20:52:29.262" v="1073"/>
+          <ac:picMkLst>
+            <pc:docMk/>
+            <pc:sldMk cId="22057409" sldId="262"/>
+            <ac:picMk id="2054" creationId="{5A3A63AB-CFA7-0E1F-6317-D3E127A9DFBA}"/>
+          </ac:picMkLst>
+        </pc:picChg>
+        <pc:picChg chg="add mod">
+          <ac:chgData name="Dominik Tátrai" userId="353052d5ae88acf7" providerId="LiveId" clId="{5B54EF79-89E9-4C1C-8D2A-4ADBEC983752}" dt="2022-09-14T20:54:05.243" v="1078" actId="1076"/>
+          <ac:picMkLst>
+            <pc:docMk/>
+            <pc:sldMk cId="22057409" sldId="262"/>
+            <ac:picMk id="2056" creationId="{DB5E2172-FB06-EA01-9AA3-88E483BBE21D}"/>
+          </ac:picMkLst>
+        </pc:picChg>
+        <pc:picChg chg="add del">
+          <ac:chgData name="Dominik Tátrai" userId="353052d5ae88acf7" providerId="LiveId" clId="{5B54EF79-89E9-4C1C-8D2A-4ADBEC983752}" dt="2022-09-14T20:55:04.829" v="1080"/>
+          <ac:picMkLst>
+            <pc:docMk/>
+            <pc:sldMk cId="22057409" sldId="262"/>
+            <ac:picMk id="2058" creationId="{C654A640-4B3D-32AF-10DC-AA675486B970}"/>
+          </ac:picMkLst>
+        </pc:picChg>
+        <pc:picChg chg="add mod">
+          <ac:chgData name="Dominik Tátrai" userId="353052d5ae88acf7" providerId="LiveId" clId="{5B54EF79-89E9-4C1C-8D2A-4ADBEC983752}" dt="2022-09-14T20:56:08.497" v="1096" actId="14100"/>
+          <ac:picMkLst>
+            <pc:docMk/>
+            <pc:sldMk cId="22057409" sldId="262"/>
+            <ac:picMk id="2060" creationId="{62A5F4E3-6579-A3A2-CAB1-4E62AAE823CB}"/>
+          </ac:picMkLst>
+        </pc:picChg>
+      </pc:sldChg>
+    </pc:docChg>
+  </pc:docChgLst>
+</pc:chgInfo>
+</file>
+
 <file path=ppt/slideLayouts/slideLayout1.xml><?xml version="1.0" encoding="utf-8"?>
 <p:sldLayout xmlns:a="http://schemas.openxmlformats.org/drawingml/2006/main" xmlns:r="http://schemas.openxmlformats.org/officeDocument/2006/relationships" xmlns:p="http://schemas.openxmlformats.org/presentationml/2006/main" type="title" preserve="1">
   <p:cSld name="Címdia">
@@ -163,7 +469,7 @@
           </a:lstStyle>
           <a:p>
             <a:r>
-              <a:rPr lang="hu-HU" smtClean="0"/>
+              <a:rPr lang="hu-HU"/>
               <a:t>Mintacím szerkesztése</a:t>
             </a:r>
             <a:endParaRPr lang="en-US" dirty="0"/>
@@ -280,7 +586,7 @@
           </a:lstStyle>
           <a:p>
             <a:r>
-              <a:rPr lang="hu-HU" smtClean="0"/>
+              <a:rPr lang="hu-HU"/>
               <a:t>Kattintson ide az alcím mintájának szerkesztéséhez</a:t>
             </a:r>
             <a:endParaRPr lang="en-US" dirty="0"/>
@@ -304,7 +610,7 @@
           <a:p>
             <a:fld id="{7FB75100-EDBA-48EA-928A-085546B307CA}" type="datetimeFigureOut">
               <a:rPr lang="hu-HU" smtClean="0"/>
-              <a:t>2022.09.13.</a:t>
+              <a:t>2022. 09. 14.</a:t>
             </a:fld>
             <a:endParaRPr lang="hu-HU"/>
           </a:p>
@@ -439,7 +745,7 @@
           </a:lstStyle>
           <a:p>
             <a:r>
-              <a:rPr lang="hu-HU" smtClean="0"/>
+              <a:rPr lang="hu-HU"/>
               <a:t>Mintacím szerkesztése</a:t>
             </a:r>
             <a:endParaRPr lang="en-US" dirty="0"/>
@@ -513,7 +819,7 @@
           </a:lstStyle>
           <a:p>
             <a:r>
-              <a:rPr lang="hu-HU" smtClean="0"/>
+              <a:rPr lang="hu-HU"/>
               <a:t>Kép beszúrásához kattintson az ikonra</a:t>
             </a:r>
             <a:endParaRPr lang="en-US" dirty="0"/>
@@ -579,7 +885,7 @@
           <a:p>
             <a:pPr lvl="0"/>
             <a:r>
-              <a:rPr lang="hu-HU" smtClean="0"/>
+              <a:rPr lang="hu-HU"/>
               <a:t>Mintaszöveg szerkesztése</a:t>
             </a:r>
           </a:p>
@@ -602,7 +908,7 @@
           <a:p>
             <a:fld id="{7FB75100-EDBA-48EA-928A-085546B307CA}" type="datetimeFigureOut">
               <a:rPr lang="hu-HU" smtClean="0"/>
-              <a:t>2022.09.13.</a:t>
+              <a:t>2022. 09. 14.</a:t>
             </a:fld>
             <a:endParaRPr lang="hu-HU"/>
           </a:p>
@@ -705,7 +1011,7 @@
           </a:lstStyle>
           <a:p>
             <a:r>
-              <a:rPr lang="hu-HU" smtClean="0"/>
+              <a:rPr lang="hu-HU"/>
               <a:t>Mintacím szerkesztése</a:t>
             </a:r>
             <a:endParaRPr lang="en-US" dirty="0"/>
@@ -771,7 +1077,7 @@
           <a:p>
             <a:pPr lvl="0"/>
             <a:r>
-              <a:rPr lang="hu-HU" smtClean="0"/>
+              <a:rPr lang="hu-HU"/>
               <a:t>Mintaszöveg szerkesztése</a:t>
             </a:r>
           </a:p>
@@ -794,7 +1100,7 @@
           <a:p>
             <a:fld id="{7FB75100-EDBA-48EA-928A-085546B307CA}" type="datetimeFigureOut">
               <a:rPr lang="hu-HU" smtClean="0"/>
-              <a:t>2022.09.13.</a:t>
+              <a:t>2022. 09. 14.</a:t>
             </a:fld>
             <a:endParaRPr lang="hu-HU"/>
           </a:p>
@@ -897,7 +1203,7 @@
           </a:lstStyle>
           <a:p>
             <a:r>
-              <a:rPr lang="hu-HU" smtClean="0"/>
+              <a:rPr lang="hu-HU"/>
               <a:t>Mintacím szerkesztése</a:t>
             </a:r>
             <a:endParaRPr lang="en-US" dirty="0"/>
@@ -965,7 +1271,7 @@
           <a:p>
             <a:pPr lvl="0"/>
             <a:r>
-              <a:rPr lang="hu-HU" smtClean="0"/>
+              <a:rPr lang="hu-HU"/>
               <a:t>Mintaszöveg szerkesztése</a:t>
             </a:r>
           </a:p>
@@ -1032,7 +1338,7 @@
           <a:p>
             <a:pPr lvl="0"/>
             <a:r>
-              <a:rPr lang="hu-HU" smtClean="0"/>
+              <a:rPr lang="hu-HU"/>
               <a:t>Mintaszöveg szerkesztése</a:t>
             </a:r>
           </a:p>
@@ -1055,7 +1361,7 @@
           <a:p>
             <a:fld id="{7FB75100-EDBA-48EA-928A-085546B307CA}" type="datetimeFigureOut">
               <a:rPr lang="hu-HU" smtClean="0"/>
-              <a:t>2022.09.13.</a:t>
+              <a:t>2022. 09. 14.</a:t>
             </a:fld>
             <a:endParaRPr lang="hu-HU"/>
           </a:p>
@@ -1390,7 +1696,7 @@
           </a:lstStyle>
           <a:p>
             <a:r>
-              <a:rPr lang="hu-HU" smtClean="0"/>
+              <a:rPr lang="hu-HU"/>
               <a:t>Mintacím szerkesztése</a:t>
             </a:r>
             <a:endParaRPr lang="en-US" dirty="0"/>
@@ -1456,7 +1762,7 @@
           <a:p>
             <a:pPr lvl="0"/>
             <a:r>
-              <a:rPr lang="hu-HU" smtClean="0"/>
+              <a:rPr lang="hu-HU"/>
               <a:t>Mintaszöveg szerkesztése</a:t>
             </a:r>
           </a:p>
@@ -1479,7 +1785,7 @@
           <a:p>
             <a:fld id="{7FB75100-EDBA-48EA-928A-085546B307CA}" type="datetimeFigureOut">
               <a:rPr lang="hu-HU" smtClean="0"/>
-              <a:t>2022.09.13.</a:t>
+              <a:t>2022. 09. 14.</a:t>
             </a:fld>
             <a:endParaRPr lang="hu-HU"/>
           </a:p>
@@ -1578,7 +1884,7 @@
           <a:lstStyle/>
           <a:p>
             <a:r>
-              <a:rPr lang="hu-HU" smtClean="0"/>
+              <a:rPr lang="hu-HU"/>
               <a:t>Mintacím szerkesztése</a:t>
             </a:r>
             <a:endParaRPr lang="en-US" dirty="0"/>
@@ -1650,7 +1956,7 @@
           <a:p>
             <a:pPr lvl="0"/>
             <a:r>
-              <a:rPr lang="hu-HU" smtClean="0"/>
+              <a:rPr lang="hu-HU"/>
               <a:t>Mintaszöveg szerkesztése</a:t>
             </a:r>
           </a:p>
@@ -1717,7 +2023,7 @@
           <a:p>
             <a:pPr lvl="0"/>
             <a:r>
-              <a:rPr lang="hu-HU" smtClean="0"/>
+              <a:rPr lang="hu-HU"/>
               <a:t>Mintaszöveg szerkesztése</a:t>
             </a:r>
           </a:p>
@@ -1788,7 +2094,7 @@
           <a:p>
             <a:pPr lvl="0"/>
             <a:r>
-              <a:rPr lang="hu-HU" smtClean="0"/>
+              <a:rPr lang="hu-HU"/>
               <a:t>Mintaszöveg szerkesztése</a:t>
             </a:r>
           </a:p>
@@ -1855,7 +2161,7 @@
           <a:p>
             <a:pPr lvl="0"/>
             <a:r>
-              <a:rPr lang="hu-HU" smtClean="0"/>
+              <a:rPr lang="hu-HU"/>
               <a:t>Mintaszöveg szerkesztése</a:t>
             </a:r>
           </a:p>
@@ -1926,7 +2232,7 @@
           <a:p>
             <a:pPr lvl="0"/>
             <a:r>
-              <a:rPr lang="hu-HU" smtClean="0"/>
+              <a:rPr lang="hu-HU"/>
               <a:t>Mintaszöveg szerkesztése</a:t>
             </a:r>
           </a:p>
@@ -1993,7 +2299,7 @@
           <a:p>
             <a:pPr lvl="0"/>
             <a:r>
-              <a:rPr lang="hu-HU" smtClean="0"/>
+              <a:rPr lang="hu-HU"/>
               <a:t>Mintaszöveg szerkesztése</a:t>
             </a:r>
           </a:p>
@@ -2016,7 +2322,7 @@
           <a:p>
             <a:fld id="{7FB75100-EDBA-48EA-928A-085546B307CA}" type="datetimeFigureOut">
               <a:rPr lang="hu-HU" smtClean="0"/>
-              <a:t>2022.09.13.</a:t>
+              <a:t>2022. 09. 14.</a:t>
             </a:fld>
             <a:endParaRPr lang="hu-HU"/>
           </a:p>
@@ -2205,7 +2511,7 @@
           <a:lstStyle/>
           <a:p>
             <a:r>
-              <a:rPr lang="hu-HU" smtClean="0"/>
+              <a:rPr lang="hu-HU"/>
               <a:t>Mintacím szerkesztése</a:t>
             </a:r>
             <a:endParaRPr lang="en-US" dirty="0"/>
@@ -2277,7 +2583,7 @@
           <a:p>
             <a:pPr lvl="0"/>
             <a:r>
-              <a:rPr lang="hu-HU" smtClean="0"/>
+              <a:rPr lang="hu-HU"/>
               <a:t>Mintaszöveg szerkesztése</a:t>
             </a:r>
           </a:p>
@@ -2355,7 +2661,7 @@
           </a:lstStyle>
           <a:p>
             <a:r>
-              <a:rPr lang="hu-HU" smtClean="0"/>
+              <a:rPr lang="hu-HU"/>
               <a:t>Kép beszúrásához kattintson az ikonra</a:t>
             </a:r>
             <a:endParaRPr lang="en-US" dirty="0"/>
@@ -2423,7 +2729,7 @@
           <a:p>
             <a:pPr lvl="0"/>
             <a:r>
-              <a:rPr lang="hu-HU" smtClean="0"/>
+              <a:rPr lang="hu-HU"/>
               <a:t>Mintaszöveg szerkesztése</a:t>
             </a:r>
           </a:p>
@@ -2494,7 +2800,7 @@
           <a:p>
             <a:pPr lvl="0"/>
             <a:r>
-              <a:rPr lang="hu-HU" smtClean="0"/>
+              <a:rPr lang="hu-HU"/>
               <a:t>Mintaszöveg szerkesztése</a:t>
             </a:r>
           </a:p>
@@ -2572,7 +2878,7 @@
           </a:lstStyle>
           <a:p>
             <a:r>
-              <a:rPr lang="hu-HU" smtClean="0"/>
+              <a:rPr lang="hu-HU"/>
               <a:t>Kép beszúrásához kattintson az ikonra</a:t>
             </a:r>
             <a:endParaRPr lang="en-US" dirty="0"/>
@@ -2640,7 +2946,7 @@
           <a:p>
             <a:pPr lvl="0"/>
             <a:r>
-              <a:rPr lang="hu-HU" smtClean="0"/>
+              <a:rPr lang="hu-HU"/>
               <a:t>Mintaszöveg szerkesztése</a:t>
             </a:r>
           </a:p>
@@ -2711,7 +3017,7 @@
           <a:p>
             <a:pPr lvl="0"/>
             <a:r>
-              <a:rPr lang="hu-HU" smtClean="0"/>
+              <a:rPr lang="hu-HU"/>
               <a:t>Mintaszöveg szerkesztése</a:t>
             </a:r>
           </a:p>
@@ -2789,7 +3095,7 @@
           </a:lstStyle>
           <a:p>
             <a:r>
-              <a:rPr lang="hu-HU" smtClean="0"/>
+              <a:rPr lang="hu-HU"/>
               <a:t>Kép beszúrásához kattintson az ikonra</a:t>
             </a:r>
             <a:endParaRPr lang="en-US" dirty="0"/>
@@ -2857,7 +3163,7 @@
           <a:p>
             <a:pPr lvl="0"/>
             <a:r>
-              <a:rPr lang="hu-HU" smtClean="0"/>
+              <a:rPr lang="hu-HU"/>
               <a:t>Mintaszöveg szerkesztése</a:t>
             </a:r>
           </a:p>
@@ -2880,7 +3186,7 @@
           <a:p>
             <a:fld id="{7FB75100-EDBA-48EA-928A-085546B307CA}" type="datetimeFigureOut">
               <a:rPr lang="hu-HU" smtClean="0"/>
-              <a:t>2022.09.13.</a:t>
+              <a:t>2022. 09. 14.</a:t>
             </a:fld>
             <a:endParaRPr lang="hu-HU"/>
           </a:p>
@@ -2974,7 +3280,7 @@
           <a:lstStyle/>
           <a:p>
             <a:r>
-              <a:rPr lang="hu-HU" smtClean="0"/>
+              <a:rPr lang="hu-HU"/>
               <a:t>Mintacím szerkesztése</a:t>
             </a:r>
             <a:endParaRPr lang="en-US" dirty="0"/>
@@ -2998,35 +3304,35 @@
           <a:p>
             <a:pPr lvl="0"/>
             <a:r>
-              <a:rPr lang="hu-HU" smtClean="0"/>
+              <a:rPr lang="hu-HU"/>
               <a:t>Mintaszöveg szerkesztése</a:t>
             </a:r>
           </a:p>
           <a:p>
             <a:pPr lvl="1"/>
             <a:r>
-              <a:rPr lang="hu-HU" smtClean="0"/>
+              <a:rPr lang="hu-HU"/>
               <a:t>Második szint</a:t>
             </a:r>
           </a:p>
           <a:p>
             <a:pPr lvl="2"/>
             <a:r>
-              <a:rPr lang="hu-HU" smtClean="0"/>
+              <a:rPr lang="hu-HU"/>
               <a:t>Harmadik szint</a:t>
             </a:r>
           </a:p>
           <a:p>
             <a:pPr lvl="3"/>
             <a:r>
-              <a:rPr lang="hu-HU" smtClean="0"/>
+              <a:rPr lang="hu-HU"/>
               <a:t>Negyedik szint</a:t>
             </a:r>
           </a:p>
           <a:p>
             <a:pPr lvl="4"/>
             <a:r>
-              <a:rPr lang="hu-HU" smtClean="0"/>
+              <a:rPr lang="hu-HU"/>
               <a:t>Ötödik szint</a:t>
             </a:r>
             <a:endParaRPr lang="en-US" dirty="0"/>
@@ -3050,7 +3356,7 @@
           <a:p>
             <a:fld id="{7FB75100-EDBA-48EA-928A-085546B307CA}" type="datetimeFigureOut">
               <a:rPr lang="hu-HU" smtClean="0"/>
-              <a:t>2022.09.13.</a:t>
+              <a:t>2022. 09. 14.</a:t>
             </a:fld>
             <a:endParaRPr lang="hu-HU"/>
           </a:p>
@@ -3153,7 +3459,7 @@
           </a:lstStyle>
           <a:p>
             <a:r>
-              <a:rPr lang="hu-HU" smtClean="0"/>
+              <a:rPr lang="hu-HU"/>
               <a:t>Mintacím szerkesztése</a:t>
             </a:r>
             <a:endParaRPr lang="en-US" dirty="0"/>
@@ -3182,35 +3488,35 @@
           <a:p>
             <a:pPr lvl="0"/>
             <a:r>
-              <a:rPr lang="hu-HU" smtClean="0"/>
+              <a:rPr lang="hu-HU"/>
               <a:t>Mintaszöveg szerkesztése</a:t>
             </a:r>
           </a:p>
           <a:p>
             <a:pPr lvl="1"/>
             <a:r>
-              <a:rPr lang="hu-HU" smtClean="0"/>
+              <a:rPr lang="hu-HU"/>
               <a:t>Második szint</a:t>
             </a:r>
           </a:p>
           <a:p>
             <a:pPr lvl="2"/>
             <a:r>
-              <a:rPr lang="hu-HU" smtClean="0"/>
+              <a:rPr lang="hu-HU"/>
               <a:t>Harmadik szint</a:t>
             </a:r>
           </a:p>
           <a:p>
             <a:pPr lvl="3"/>
             <a:r>
-              <a:rPr lang="hu-HU" smtClean="0"/>
+              <a:rPr lang="hu-HU"/>
               <a:t>Negyedik szint</a:t>
             </a:r>
           </a:p>
           <a:p>
             <a:pPr lvl="4"/>
             <a:r>
-              <a:rPr lang="hu-HU" smtClean="0"/>
+              <a:rPr lang="hu-HU"/>
               <a:t>Ötödik szint</a:t>
             </a:r>
             <a:endParaRPr lang="en-US" dirty="0"/>
@@ -3234,7 +3540,7 @@
           <a:p>
             <a:fld id="{7FB75100-EDBA-48EA-928A-085546B307CA}" type="datetimeFigureOut">
               <a:rPr lang="hu-HU" smtClean="0"/>
-              <a:t>2022.09.13.</a:t>
+              <a:t>2022. 09. 14.</a:t>
             </a:fld>
             <a:endParaRPr lang="hu-HU"/>
           </a:p>
@@ -3328,7 +3634,7 @@
           <a:lstStyle/>
           <a:p>
             <a:r>
-              <a:rPr lang="hu-HU" smtClean="0"/>
+              <a:rPr lang="hu-HU"/>
               <a:t>Mintacím szerkesztése</a:t>
             </a:r>
             <a:endParaRPr lang="en-US" dirty="0"/>
@@ -3352,35 +3658,35 @@
           <a:p>
             <a:pPr lvl="0"/>
             <a:r>
-              <a:rPr lang="hu-HU" smtClean="0"/>
+              <a:rPr lang="hu-HU"/>
               <a:t>Mintaszöveg szerkesztése</a:t>
             </a:r>
           </a:p>
           <a:p>
             <a:pPr lvl="1"/>
             <a:r>
-              <a:rPr lang="hu-HU" smtClean="0"/>
+              <a:rPr lang="hu-HU"/>
               <a:t>Második szint</a:t>
             </a:r>
           </a:p>
           <a:p>
             <a:pPr lvl="2"/>
             <a:r>
-              <a:rPr lang="hu-HU" smtClean="0"/>
+              <a:rPr lang="hu-HU"/>
               <a:t>Harmadik szint</a:t>
             </a:r>
           </a:p>
           <a:p>
             <a:pPr lvl="3"/>
             <a:r>
-              <a:rPr lang="hu-HU" smtClean="0"/>
+              <a:rPr lang="hu-HU"/>
               <a:t>Negyedik szint</a:t>
             </a:r>
           </a:p>
           <a:p>
             <a:pPr lvl="4"/>
             <a:r>
-              <a:rPr lang="hu-HU" smtClean="0"/>
+              <a:rPr lang="hu-HU"/>
               <a:t>Ötödik szint</a:t>
             </a:r>
             <a:endParaRPr lang="en-US" dirty="0"/>
@@ -3404,7 +3710,7 @@
           <a:p>
             <a:fld id="{7FB75100-EDBA-48EA-928A-085546B307CA}" type="datetimeFigureOut">
               <a:rPr lang="hu-HU" smtClean="0"/>
-              <a:t>2022.09.13.</a:t>
+              <a:t>2022. 09. 14.</a:t>
             </a:fld>
             <a:endParaRPr lang="hu-HU"/>
           </a:p>
@@ -3507,7 +3813,7 @@
           </a:lstStyle>
           <a:p>
             <a:r>
-              <a:rPr lang="hu-HU" smtClean="0"/>
+              <a:rPr lang="hu-HU"/>
               <a:t>Mintacím szerkesztése</a:t>
             </a:r>
             <a:endParaRPr lang="en-US" dirty="0"/>
@@ -3625,7 +3931,7 @@
           <a:p>
             <a:pPr lvl="0"/>
             <a:r>
-              <a:rPr lang="hu-HU" smtClean="0"/>
+              <a:rPr lang="hu-HU"/>
               <a:t>Mintaszöveg szerkesztése</a:t>
             </a:r>
           </a:p>
@@ -3648,7 +3954,7 @@
           <a:p>
             <a:fld id="{7FB75100-EDBA-48EA-928A-085546B307CA}" type="datetimeFigureOut">
               <a:rPr lang="hu-HU" smtClean="0"/>
-              <a:t>2022.09.13.</a:t>
+              <a:t>2022. 09. 14.</a:t>
             </a:fld>
             <a:endParaRPr lang="hu-HU"/>
           </a:p>
@@ -3742,7 +4048,7 @@
           <a:lstStyle/>
           <a:p>
             <a:r>
-              <a:rPr lang="hu-HU" smtClean="0"/>
+              <a:rPr lang="hu-HU"/>
               <a:t>Mintacím szerkesztése</a:t>
             </a:r>
             <a:endParaRPr lang="en-US" dirty="0"/>
@@ -3773,35 +4079,35 @@
           <a:p>
             <a:pPr lvl="0"/>
             <a:r>
-              <a:rPr lang="hu-HU" smtClean="0"/>
+              <a:rPr lang="hu-HU"/>
               <a:t>Mintaszöveg szerkesztése</a:t>
             </a:r>
           </a:p>
           <a:p>
             <a:pPr lvl="1"/>
             <a:r>
-              <a:rPr lang="hu-HU" smtClean="0"/>
+              <a:rPr lang="hu-HU"/>
               <a:t>Második szint</a:t>
             </a:r>
           </a:p>
           <a:p>
             <a:pPr lvl="2"/>
             <a:r>
-              <a:rPr lang="hu-HU" smtClean="0"/>
+              <a:rPr lang="hu-HU"/>
               <a:t>Harmadik szint</a:t>
             </a:r>
           </a:p>
           <a:p>
             <a:pPr lvl="3"/>
             <a:r>
-              <a:rPr lang="hu-HU" smtClean="0"/>
+              <a:rPr lang="hu-HU"/>
               <a:t>Negyedik szint</a:t>
             </a:r>
           </a:p>
           <a:p>
             <a:pPr lvl="4"/>
             <a:r>
-              <a:rPr lang="hu-HU" smtClean="0"/>
+              <a:rPr lang="hu-HU"/>
               <a:t>Ötödik szint</a:t>
             </a:r>
             <a:endParaRPr lang="en-US" dirty="0"/>
@@ -3832,35 +4138,35 @@
           <a:p>
             <a:pPr lvl="0"/>
             <a:r>
-              <a:rPr lang="hu-HU" smtClean="0"/>
+              <a:rPr lang="hu-HU"/>
               <a:t>Mintaszöveg szerkesztése</a:t>
             </a:r>
           </a:p>
           <a:p>
             <a:pPr lvl="1"/>
             <a:r>
-              <a:rPr lang="hu-HU" smtClean="0"/>
+              <a:rPr lang="hu-HU"/>
               <a:t>Második szint</a:t>
             </a:r>
           </a:p>
           <a:p>
             <a:pPr lvl="2"/>
             <a:r>
-              <a:rPr lang="hu-HU" smtClean="0"/>
+              <a:rPr lang="hu-HU"/>
               <a:t>Harmadik szint</a:t>
             </a:r>
           </a:p>
           <a:p>
             <a:pPr lvl="3"/>
             <a:r>
-              <a:rPr lang="hu-HU" smtClean="0"/>
+              <a:rPr lang="hu-HU"/>
               <a:t>Negyedik szint</a:t>
             </a:r>
           </a:p>
           <a:p>
             <a:pPr lvl="4"/>
             <a:r>
-              <a:rPr lang="hu-HU" smtClean="0"/>
+              <a:rPr lang="hu-HU"/>
               <a:t>Ötödik szint</a:t>
             </a:r>
             <a:endParaRPr lang="en-US" dirty="0"/>
@@ -3884,7 +4190,7 @@
           <a:p>
             <a:fld id="{7FB75100-EDBA-48EA-928A-085546B307CA}" type="datetimeFigureOut">
               <a:rPr lang="hu-HU" smtClean="0"/>
-              <a:t>2022.09.13.</a:t>
+              <a:t>2022. 09. 14.</a:t>
             </a:fld>
             <a:endParaRPr lang="hu-HU"/>
           </a:p>
@@ -4042,7 +4348,7 @@
           </a:lstStyle>
           <a:p>
             <a:r>
-              <a:rPr lang="hu-HU" smtClean="0"/>
+              <a:rPr lang="hu-HU"/>
               <a:t>Mintacím szerkesztése</a:t>
             </a:r>
             <a:endParaRPr lang="en-US" dirty="0"/>
@@ -4110,7 +4416,7 @@
           <a:p>
             <a:pPr lvl="0"/>
             <a:r>
-              <a:rPr lang="hu-HU" smtClean="0"/>
+              <a:rPr lang="hu-HU"/>
               <a:t>Mintaszöveg szerkesztése</a:t>
             </a:r>
           </a:p>
@@ -4156,35 +4462,35 @@
           <a:p>
             <a:pPr lvl="0"/>
             <a:r>
-              <a:rPr lang="hu-HU" smtClean="0"/>
+              <a:rPr lang="hu-HU"/>
               <a:t>Mintaszöveg szerkesztése</a:t>
             </a:r>
           </a:p>
           <a:p>
             <a:pPr lvl="1"/>
             <a:r>
-              <a:rPr lang="hu-HU" smtClean="0"/>
+              <a:rPr lang="hu-HU"/>
               <a:t>Második szint</a:t>
             </a:r>
           </a:p>
           <a:p>
             <a:pPr lvl="2"/>
             <a:r>
-              <a:rPr lang="hu-HU" smtClean="0"/>
+              <a:rPr lang="hu-HU"/>
               <a:t>Harmadik szint</a:t>
             </a:r>
           </a:p>
           <a:p>
             <a:pPr lvl="3"/>
             <a:r>
-              <a:rPr lang="hu-HU" smtClean="0"/>
+              <a:rPr lang="hu-HU"/>
               <a:t>Negyedik szint</a:t>
             </a:r>
           </a:p>
           <a:p>
             <a:pPr lvl="4"/>
             <a:r>
-              <a:rPr lang="hu-HU" smtClean="0"/>
+              <a:rPr lang="hu-HU"/>
               <a:t>Ötödik szint</a:t>
             </a:r>
             <a:endParaRPr lang="en-US" dirty="0"/>
@@ -4252,7 +4558,7 @@
           <a:p>
             <a:pPr lvl="0"/>
             <a:r>
-              <a:rPr lang="hu-HU" smtClean="0"/>
+              <a:rPr lang="hu-HU"/>
               <a:t>Mintaszöveg szerkesztése</a:t>
             </a:r>
           </a:p>
@@ -4298,35 +4604,35 @@
           <a:p>
             <a:pPr lvl="0"/>
             <a:r>
-              <a:rPr lang="hu-HU" smtClean="0"/>
+              <a:rPr lang="hu-HU"/>
               <a:t>Mintaszöveg szerkesztése</a:t>
             </a:r>
           </a:p>
           <a:p>
             <a:pPr lvl="1"/>
             <a:r>
-              <a:rPr lang="hu-HU" smtClean="0"/>
+              <a:rPr lang="hu-HU"/>
               <a:t>Második szint</a:t>
             </a:r>
           </a:p>
           <a:p>
             <a:pPr lvl="2"/>
             <a:r>
-              <a:rPr lang="hu-HU" smtClean="0"/>
+              <a:rPr lang="hu-HU"/>
               <a:t>Harmadik szint</a:t>
             </a:r>
           </a:p>
           <a:p>
             <a:pPr lvl="3"/>
             <a:r>
-              <a:rPr lang="hu-HU" smtClean="0"/>
+              <a:rPr lang="hu-HU"/>
               <a:t>Negyedik szint</a:t>
             </a:r>
           </a:p>
           <a:p>
             <a:pPr lvl="4"/>
             <a:r>
-              <a:rPr lang="hu-HU" smtClean="0"/>
+              <a:rPr lang="hu-HU"/>
               <a:t>Ötödik szint</a:t>
             </a:r>
             <a:endParaRPr lang="en-US" dirty="0"/>
@@ -4350,7 +4656,7 @@
           <a:p>
             <a:fld id="{7FB75100-EDBA-48EA-928A-085546B307CA}" type="datetimeFigureOut">
               <a:rPr lang="hu-HU" smtClean="0"/>
-              <a:t>2022.09.13.</a:t>
+              <a:t>2022. 09. 14.</a:t>
             </a:fld>
             <a:endParaRPr lang="hu-HU"/>
           </a:p>
@@ -4444,7 +4750,7 @@
           <a:lstStyle/>
           <a:p>
             <a:r>
-              <a:rPr lang="hu-HU" smtClean="0"/>
+              <a:rPr lang="hu-HU"/>
               <a:t>Mintacím szerkesztése</a:t>
             </a:r>
             <a:endParaRPr lang="en-US" dirty="0"/>
@@ -4468,7 +4774,7 @@
           <a:p>
             <a:fld id="{7FB75100-EDBA-48EA-928A-085546B307CA}" type="datetimeFigureOut">
               <a:rPr lang="hu-HU" smtClean="0"/>
-              <a:t>2022.09.13.</a:t>
+              <a:t>2022. 09. 14.</a:t>
             </a:fld>
             <a:endParaRPr lang="hu-HU"/>
           </a:p>
@@ -4563,7 +4869,7 @@
           <a:p>
             <a:fld id="{7FB75100-EDBA-48EA-928A-085546B307CA}" type="datetimeFigureOut">
               <a:rPr lang="hu-HU" smtClean="0"/>
-              <a:t>2022.09.13.</a:t>
+              <a:t>2022. 09. 14.</a:t>
             </a:fld>
             <a:endParaRPr lang="hu-HU"/>
           </a:p>
@@ -4668,7 +4974,7 @@
           </a:lstStyle>
           <a:p>
             <a:r>
-              <a:rPr lang="hu-HU" smtClean="0"/>
+              <a:rPr lang="hu-HU"/>
               <a:t>Mintacím szerkesztése</a:t>
             </a:r>
             <a:endParaRPr lang="en-US" dirty="0"/>
@@ -4699,35 +5005,35 @@
           <a:p>
             <a:pPr lvl="0"/>
             <a:r>
-              <a:rPr lang="hu-HU" smtClean="0"/>
+              <a:rPr lang="hu-HU"/>
               <a:t>Mintaszöveg szerkesztése</a:t>
             </a:r>
           </a:p>
           <a:p>
             <a:pPr lvl="1"/>
             <a:r>
-              <a:rPr lang="hu-HU" smtClean="0"/>
+              <a:rPr lang="hu-HU"/>
               <a:t>Második szint</a:t>
             </a:r>
           </a:p>
           <a:p>
             <a:pPr lvl="2"/>
             <a:r>
-              <a:rPr lang="hu-HU" smtClean="0"/>
+              <a:rPr lang="hu-HU"/>
               <a:t>Harmadik szint</a:t>
             </a:r>
           </a:p>
           <a:p>
             <a:pPr lvl="3"/>
             <a:r>
-              <a:rPr lang="hu-HU" smtClean="0"/>
+              <a:rPr lang="hu-HU"/>
               <a:t>Negyedik szint</a:t>
             </a:r>
           </a:p>
           <a:p>
             <a:pPr lvl="4"/>
             <a:r>
-              <a:rPr lang="hu-HU" smtClean="0"/>
+              <a:rPr lang="hu-HU"/>
               <a:t>Ötödik szint</a:t>
             </a:r>
             <a:endParaRPr lang="en-US" dirty="0"/>
@@ -4795,7 +5101,7 @@
           <a:p>
             <a:pPr lvl="0"/>
             <a:r>
-              <a:rPr lang="hu-HU" smtClean="0"/>
+              <a:rPr lang="hu-HU"/>
               <a:t>Mintaszöveg szerkesztése</a:t>
             </a:r>
           </a:p>
@@ -4818,7 +5124,7 @@
           <a:p>
             <a:fld id="{7FB75100-EDBA-48EA-928A-085546B307CA}" type="datetimeFigureOut">
               <a:rPr lang="hu-HU" smtClean="0"/>
-              <a:t>2022.09.13.</a:t>
+              <a:t>2022. 09. 14.</a:t>
             </a:fld>
             <a:endParaRPr lang="hu-HU"/>
           </a:p>
@@ -4953,7 +5259,7 @@
           </a:lstStyle>
           <a:p>
             <a:r>
-              <a:rPr lang="hu-HU" smtClean="0"/>
+              <a:rPr lang="hu-HU"/>
               <a:t>Mintacím szerkesztése</a:t>
             </a:r>
             <a:endParaRPr lang="en-US" dirty="0"/>
@@ -5027,7 +5333,7 @@
           </a:lstStyle>
           <a:p>
             <a:r>
-              <a:rPr lang="hu-HU" smtClean="0"/>
+              <a:rPr lang="hu-HU"/>
               <a:t>Kép beszúrásához kattintson az ikonra</a:t>
             </a:r>
             <a:endParaRPr lang="en-US" dirty="0"/>
@@ -5095,7 +5401,7 @@
           <a:p>
             <a:pPr lvl="0"/>
             <a:r>
-              <a:rPr lang="hu-HU" smtClean="0"/>
+              <a:rPr lang="hu-HU"/>
               <a:t>Mintaszöveg szerkesztése</a:t>
             </a:r>
           </a:p>
@@ -5118,7 +5424,7 @@
           <a:p>
             <a:fld id="{7FB75100-EDBA-48EA-928A-085546B307CA}" type="datetimeFigureOut">
               <a:rPr lang="hu-HU" smtClean="0"/>
-              <a:t>2022.09.13.</a:t>
+              <a:t>2022. 09. 14.</a:t>
             </a:fld>
             <a:endParaRPr lang="hu-HU"/>
           </a:p>
@@ -5234,7 +5540,7 @@
           <a:lstStyle/>
           <a:p>
             <a:r>
-              <a:rPr lang="hu-HU" smtClean="0"/>
+              <a:rPr lang="hu-HU"/>
               <a:t>Mintacím szerkesztése</a:t>
             </a:r>
             <a:endParaRPr lang="en-US" dirty="0"/>
@@ -5275,35 +5581,35 @@
           <a:p>
             <a:pPr lvl="0"/>
             <a:r>
-              <a:rPr lang="hu-HU" smtClean="0"/>
+              <a:rPr lang="hu-HU"/>
               <a:t>Mintaszöveg szerkesztése</a:t>
             </a:r>
           </a:p>
           <a:p>
             <a:pPr lvl="1"/>
             <a:r>
-              <a:rPr lang="hu-HU" smtClean="0"/>
+              <a:rPr lang="hu-HU"/>
               <a:t>Második szint</a:t>
             </a:r>
           </a:p>
           <a:p>
             <a:pPr lvl="2"/>
             <a:r>
-              <a:rPr lang="hu-HU" smtClean="0"/>
+              <a:rPr lang="hu-HU"/>
               <a:t>Harmadik szint</a:t>
             </a:r>
           </a:p>
           <a:p>
             <a:pPr lvl="3"/>
             <a:r>
-              <a:rPr lang="hu-HU" smtClean="0"/>
+              <a:rPr lang="hu-HU"/>
               <a:t>Negyedik szint</a:t>
             </a:r>
           </a:p>
           <a:p>
             <a:pPr lvl="4"/>
             <a:r>
-              <a:rPr lang="hu-HU" smtClean="0"/>
+              <a:rPr lang="hu-HU"/>
               <a:t>Ötödik szint</a:t>
             </a:r>
             <a:endParaRPr lang="en-US" dirty="0"/>
@@ -5352,7 +5658,7 @@
           <a:p>
             <a:fld id="{7FB75100-EDBA-48EA-928A-085546B307CA}" type="datetimeFigureOut">
               <a:rPr lang="hu-HU" smtClean="0"/>
-              <a:t>2022.09.13.</a:t>
+              <a:t>2022. 09. 14.</a:t>
             </a:fld>
             <a:endParaRPr lang="hu-HU"/>
           </a:p>
@@ -6047,41 +6353,32 @@
           <a:lstStyle/>
           <a:p>
             <a:r>
-              <a:rPr lang="hu-HU" dirty="0" smtClean="0"/>
+              <a:rPr lang="hu-HU" dirty="0"/>
               <a:t>DAW</a:t>
             </a:r>
             <a:br>
-              <a:rPr lang="hu-HU" dirty="0" smtClean="0"/>
+              <a:rPr lang="hu-HU" dirty="0"/>
             </a:br>
             <a:r>
-              <a:rPr lang="hu-HU" dirty="0" smtClean="0"/>
+              <a:rPr lang="hu-HU" dirty="0"/>
               <a:t>/Digital </a:t>
             </a:r>
             <a:r>
               <a:rPr lang="hu-HU" dirty="0" err="1"/>
-              <a:t>A</a:t>
-            </a:r>
-            <a:r>
-              <a:rPr lang="hu-HU" dirty="0" err="1" smtClean="0"/>
-              <a:t>udio</a:t>
-            </a:r>
-            <a:r>
-              <a:rPr lang="hu-HU" dirty="0" smtClean="0"/>
+              <a:t>Audio</a:t>
+            </a:r>
+            <a:r>
+              <a:rPr lang="hu-HU" dirty="0"/>
               <a:t> </a:t>
             </a:r>
             <a:r>
               <a:rPr lang="hu-HU" dirty="0" err="1"/>
-              <a:t>W</a:t>
-            </a:r>
-            <a:r>
-              <a:rPr lang="hu-HU" dirty="0" err="1" smtClean="0"/>
-              <a:t>orkspace</a:t>
-            </a:r>
-            <a:r>
-              <a:rPr lang="hu-HU" dirty="0" smtClean="0"/>
+              <a:t>Workspace</a:t>
+            </a:r>
+            <a:r>
+              <a:rPr lang="hu-HU" dirty="0"/>
               <a:t>/</a:t>
             </a:r>
-            <a:endParaRPr lang="hu-HU" dirty="0"/>
           </a:p>
         </p:txBody>
       </p:sp>
@@ -6106,10 +6403,9 @@
           <a:lstStyle/>
           <a:p>
             <a:r>
-              <a:rPr lang="hu-HU" dirty="0" smtClean="0"/>
+              <a:rPr lang="hu-HU" dirty="0"/>
               <a:t>Készítette: Tátrai Dominik</a:t>
             </a:r>
-            <a:endParaRPr lang="hu-HU" dirty="0"/>
           </a:p>
         </p:txBody>
       </p:sp>
@@ -6152,8 +6448,10 @@
               <a:fillRect/>
             </a:stretch>
           </a:blipFill>
-          <a:ln>
-            <a:noFill/>
+          <a:ln w="12700">
+            <a:solidFill>
+              <a:srgbClr val="00B0F0"/>
+            </a:solidFill>
           </a:ln>
           <a:effectLst>
             <a:reflection endPos="0" dir="5400000" sy="-100000" algn="bl" rotWithShape="0"/>
@@ -6213,11 +6511,9 @@
               <a:fillRect/>
             </a:stretch>
           </a:blipFill>
-          <a:ln>
+          <a:ln w="12700">
             <a:solidFill>
-              <a:schemeClr val="tx1">
-                <a:lumMod val="65000"/>
-              </a:schemeClr>
+              <a:srgbClr val="00B0F0"/>
             </a:solidFill>
           </a:ln>
         </p:spPr>
@@ -6418,13 +6714,6 @@
   <p:clrMapOvr>
     <a:masterClrMapping/>
   </p:clrMapOvr>
-  <p:timing>
-    <p:tnLst>
-      <p:par>
-        <p:cTn id="1" dur="indefinite" restart="never" nodeType="tmRoot"/>
-      </p:par>
-    </p:tnLst>
-  </p:timing>
 </p:sld>
 </file>
 
@@ -6462,10 +6751,9 @@
           <a:p>
             <a:pPr algn="l"/>
             <a:r>
-              <a:rPr lang="hu-HU" dirty="0" smtClean="0"/>
-              <a:t>Mi az a DAW</a:t>
-            </a:r>
-            <a:endParaRPr lang="hu-HU" dirty="0"/>
+              <a:rPr lang="hu-HU" dirty="0"/>
+              <a:t>Mi az a DAW?</a:t>
+            </a:r>
           </a:p>
         </p:txBody>
       </p:sp>
@@ -6479,7 +6767,12 @@
             <p:ph idx="1"/>
           </p:nvPr>
         </p:nvSpPr>
-        <p:spPr/>
+        <p:spPr>
+          <a:xfrm>
+            <a:off x="862995" y="1656250"/>
+            <a:ext cx="10353762" cy="4058751"/>
+          </a:xfrm>
+        </p:spPr>
         <p:txBody>
           <a:bodyPr/>
           <a:lstStyle/>
@@ -6488,42 +6781,89 @@
               <a:buNone/>
             </a:pPr>
             <a:r>
-              <a:rPr lang="hu-HU" dirty="0" smtClean="0"/>
+              <a:rPr lang="hu-HU" i="1" dirty="0"/>
               <a:t>(Digitális </a:t>
             </a:r>
             <a:r>
-              <a:rPr lang="hu-HU" dirty="0" err="1" smtClean="0"/>
+              <a:rPr lang="hu-HU" i="1" dirty="0" err="1"/>
               <a:t>audió</a:t>
             </a:r>
             <a:r>
-              <a:rPr lang="hu-HU" dirty="0" smtClean="0"/>
+              <a:rPr lang="hu-HU" i="1" dirty="0"/>
               <a:t> munkaállomás)</a:t>
             </a:r>
           </a:p>
           <a:p>
-            <a:r>
-              <a:rPr lang="hu-HU" dirty="0" smtClean="0"/>
+            <a:pPr marL="36900" indent="0">
+              <a:buNone/>
+            </a:pPr>
+            <a:endParaRPr lang="hu-HU" dirty="0"/>
+          </a:p>
+          <a:p>
+            <a:r>
+              <a:rPr lang="hu-HU" dirty="0"/>
               <a:t>Elektronikus eszköz/ szoftver:</a:t>
             </a:r>
             <a:br>
-              <a:rPr lang="hu-HU" dirty="0" smtClean="0"/>
+              <a:rPr lang="hu-HU" dirty="0"/>
             </a:br>
             <a:r>
-              <a:rPr lang="hu-HU" dirty="0" smtClean="0"/>
-              <a:t>-hangfájlok rögzítésére, szerkesztésére szolgál</a:t>
-            </a:r>
-          </a:p>
-          <a:p>
-            <a:r>
-              <a:rPr lang="hu-HU" dirty="0" smtClean="0"/>
+              <a:rPr lang="hu-HU" dirty="0"/>
+              <a:t>-hangfájlok </a:t>
+            </a:r>
+            <a:r>
+              <a:rPr lang="hu-HU" b="1" dirty="0"/>
+              <a:t>rögzítésére</a:t>
+            </a:r>
+            <a:r>
+              <a:rPr lang="hu-HU" dirty="0"/>
+              <a:t>, </a:t>
+            </a:r>
+            <a:r>
+              <a:rPr lang="hu-HU" b="1" dirty="0"/>
+              <a:t>szerkesztésére</a:t>
+            </a:r>
+            <a:r>
+              <a:rPr lang="hu-HU" dirty="0"/>
+              <a:t> szolgál</a:t>
+            </a:r>
+          </a:p>
+          <a:p>
+            <a:pPr marL="36900" indent="0">
+              <a:buNone/>
+            </a:pPr>
+            <a:endParaRPr lang="hu-HU" dirty="0"/>
+          </a:p>
+          <a:p>
+            <a:r>
+              <a:rPr lang="hu-HU" dirty="0"/>
               <a:t>Széles választék:</a:t>
             </a:r>
             <a:br>
-              <a:rPr lang="hu-HU" dirty="0" smtClean="0"/>
+              <a:rPr lang="hu-HU" dirty="0"/>
             </a:br>
             <a:r>
-              <a:rPr lang="hu-HU" dirty="0" smtClean="0"/>
-              <a:t>Laptopon használt szoftvertől…		„integrált egyéni egység”</a:t>
+              <a:rPr lang="hu-HU" dirty="0"/>
+              <a:t>Laptopon használt </a:t>
+            </a:r>
+            <a:r>
+              <a:rPr lang="hu-HU" b="1" dirty="0"/>
+              <a:t>szoftver</a:t>
+            </a:r>
+            <a:r>
+              <a:rPr lang="hu-HU" dirty="0"/>
+              <a:t>…		</a:t>
+            </a:r>
+            <a:br>
+              <a:rPr lang="hu-HU" dirty="0"/>
+            </a:br>
+            <a:r>
+              <a:rPr lang="hu-HU" dirty="0"/>
+              <a:t>			</a:t>
+            </a:r>
+            <a:r>
+              <a:rPr lang="hu-HU" b="1" dirty="0"/>
+              <a:t>„integrált egyéni egység”</a:t>
             </a:r>
           </a:p>
         </p:txBody>
@@ -6536,7 +6876,7 @@
         </p:nvCxnSpPr>
         <p:spPr>
           <a:xfrm>
-            <a:off x="5003800" y="3416300"/>
+            <a:off x="1790700" y="4559300"/>
             <a:ext cx="355600" cy="0"/>
           </a:xfrm>
           <a:prstGeom prst="straightConnector1">
@@ -6564,6 +6904,348 @@
           </a:fontRef>
         </p:style>
       </p:cxnSp>
+      <p:pic>
+        <p:nvPicPr>
+          <p:cNvPr id="6" name="Kép 5">
+            <a:extLst>
+              <a:ext uri="{FF2B5EF4-FFF2-40B4-BE49-F238E27FC236}">
+                <a16:creationId xmlns:a16="http://schemas.microsoft.com/office/drawing/2014/main" id="{AAB9BCD5-1A66-6B99-54F0-E12327ADD867}"/>
+              </a:ext>
+            </a:extLst>
+          </p:cNvPr>
+          <p:cNvPicPr>
+            <a:picLocks noChangeAspect="1"/>
+          </p:cNvPicPr>
+          <p:nvPr/>
+        </p:nvPicPr>
+        <p:blipFill>
+          <a:blip r:embed="rId2">
+            <a:extLst>
+              <a:ext uri="{28A0092B-C50C-407E-A947-70E740481C1C}">
+                <a14:useLocalDpi xmlns:a14="http://schemas.microsoft.com/office/drawing/2010/main" val="0"/>
+              </a:ext>
+            </a:extLst>
+          </a:blip>
+          <a:stretch>
+            <a:fillRect/>
+          </a:stretch>
+        </p:blipFill>
+        <p:spPr>
+          <a:xfrm flipH="1">
+            <a:off x="5334000" y="3619500"/>
+            <a:ext cx="6858000" cy="3238500"/>
+          </a:xfrm>
+          <a:prstGeom prst="rtTriangle">
+            <a:avLst/>
+          </a:prstGeom>
+          <a:ln w="12700">
+            <a:solidFill>
+              <a:srgbClr val="00B0F0"/>
+            </a:solidFill>
+          </a:ln>
+        </p:spPr>
+      </p:pic>
+      <p:sp>
+        <p:nvSpPr>
+          <p:cNvPr id="8" name="Téglalap 7">
+            <a:extLst>
+              <a:ext uri="{FF2B5EF4-FFF2-40B4-BE49-F238E27FC236}">
+                <a16:creationId xmlns:a16="http://schemas.microsoft.com/office/drawing/2014/main" id="{951A3C41-CBF6-2852-187D-8843C23A6592}"/>
+              </a:ext>
+            </a:extLst>
+          </p:cNvPr>
+          <p:cNvSpPr/>
+          <p:nvPr/>
+        </p:nvSpPr>
+        <p:spPr>
+          <a:xfrm>
+            <a:off x="8318500" y="-12699"/>
+            <a:ext cx="3888939" cy="5422899"/>
+          </a:xfrm>
+          <a:custGeom>
+            <a:avLst/>
+            <a:gdLst>
+              <a:gd name="connsiteX0" fmla="*/ 0 w 4432300"/>
+              <a:gd name="connsiteY0" fmla="*/ 0 h 5841995"/>
+              <a:gd name="connsiteX1" fmla="*/ 4432300 w 4432300"/>
+              <a:gd name="connsiteY1" fmla="*/ 0 h 5841995"/>
+              <a:gd name="connsiteX2" fmla="*/ 4432300 w 4432300"/>
+              <a:gd name="connsiteY2" fmla="*/ 5841995 h 5841995"/>
+              <a:gd name="connsiteX3" fmla="*/ 0 w 4432300"/>
+              <a:gd name="connsiteY3" fmla="*/ 5841995 h 5841995"/>
+              <a:gd name="connsiteX4" fmla="*/ 0 w 4432300"/>
+              <a:gd name="connsiteY4" fmla="*/ 0 h 5841995"/>
+              <a:gd name="connsiteX0" fmla="*/ 0 w 4432300"/>
+              <a:gd name="connsiteY0" fmla="*/ 0 h 5841995"/>
+              <a:gd name="connsiteX1" fmla="*/ 4432300 w 4432300"/>
+              <a:gd name="connsiteY1" fmla="*/ 0 h 5841995"/>
+              <a:gd name="connsiteX2" fmla="*/ 4432300 w 4432300"/>
+              <a:gd name="connsiteY2" fmla="*/ 3213095 h 5841995"/>
+              <a:gd name="connsiteX3" fmla="*/ 0 w 4432300"/>
+              <a:gd name="connsiteY3" fmla="*/ 5841995 h 5841995"/>
+              <a:gd name="connsiteX4" fmla="*/ 0 w 4432300"/>
+              <a:gd name="connsiteY4" fmla="*/ 0 h 5841995"/>
+              <a:gd name="connsiteX0" fmla="*/ 0 w 4432300"/>
+              <a:gd name="connsiteY0" fmla="*/ 0 h 5435595"/>
+              <a:gd name="connsiteX1" fmla="*/ 4432300 w 4432300"/>
+              <a:gd name="connsiteY1" fmla="*/ 0 h 5435595"/>
+              <a:gd name="connsiteX2" fmla="*/ 4432300 w 4432300"/>
+              <a:gd name="connsiteY2" fmla="*/ 3213095 h 5435595"/>
+              <a:gd name="connsiteX3" fmla="*/ 50800 w 4432300"/>
+              <a:gd name="connsiteY3" fmla="*/ 5435595 h 5435595"/>
+              <a:gd name="connsiteX4" fmla="*/ 0 w 4432300"/>
+              <a:gd name="connsiteY4" fmla="*/ 0 h 5435595"/>
+              <a:gd name="connsiteX0" fmla="*/ 177800 w 4610100"/>
+              <a:gd name="connsiteY0" fmla="*/ 0 h 5460995"/>
+              <a:gd name="connsiteX1" fmla="*/ 4610100 w 4610100"/>
+              <a:gd name="connsiteY1" fmla="*/ 0 h 5460995"/>
+              <a:gd name="connsiteX2" fmla="*/ 4610100 w 4610100"/>
+              <a:gd name="connsiteY2" fmla="*/ 3213095 h 5460995"/>
+              <a:gd name="connsiteX3" fmla="*/ 0 w 4610100"/>
+              <a:gd name="connsiteY3" fmla="*/ 5460995 h 5460995"/>
+              <a:gd name="connsiteX4" fmla="*/ 177800 w 4610100"/>
+              <a:gd name="connsiteY4" fmla="*/ 0 h 5460995"/>
+              <a:gd name="connsiteX0" fmla="*/ 228600 w 4660900"/>
+              <a:gd name="connsiteY0" fmla="*/ 0 h 5397495"/>
+              <a:gd name="connsiteX1" fmla="*/ 4660900 w 4660900"/>
+              <a:gd name="connsiteY1" fmla="*/ 0 h 5397495"/>
+              <a:gd name="connsiteX2" fmla="*/ 4660900 w 4660900"/>
+              <a:gd name="connsiteY2" fmla="*/ 3213095 h 5397495"/>
+              <a:gd name="connsiteX3" fmla="*/ 0 w 4660900"/>
+              <a:gd name="connsiteY3" fmla="*/ 5397495 h 5397495"/>
+              <a:gd name="connsiteX4" fmla="*/ 228600 w 4660900"/>
+              <a:gd name="connsiteY4" fmla="*/ 0 h 5397495"/>
+              <a:gd name="connsiteX0" fmla="*/ 177800 w 4610100"/>
+              <a:gd name="connsiteY0" fmla="*/ 0 h 5435595"/>
+              <a:gd name="connsiteX1" fmla="*/ 4610100 w 4610100"/>
+              <a:gd name="connsiteY1" fmla="*/ 0 h 5435595"/>
+              <a:gd name="connsiteX2" fmla="*/ 4610100 w 4610100"/>
+              <a:gd name="connsiteY2" fmla="*/ 3213095 h 5435595"/>
+              <a:gd name="connsiteX3" fmla="*/ 0 w 4610100"/>
+              <a:gd name="connsiteY3" fmla="*/ 5435595 h 5435595"/>
+              <a:gd name="connsiteX4" fmla="*/ 177800 w 4610100"/>
+              <a:gd name="connsiteY4" fmla="*/ 0 h 5435595"/>
+              <a:gd name="connsiteX0" fmla="*/ 177800 w 4610100"/>
+              <a:gd name="connsiteY0" fmla="*/ 0 h 5435595"/>
+              <a:gd name="connsiteX1" fmla="*/ 4610100 w 4610100"/>
+              <a:gd name="connsiteY1" fmla="*/ 0 h 5435595"/>
+              <a:gd name="connsiteX2" fmla="*/ 4597400 w 4610100"/>
+              <a:gd name="connsiteY2" fmla="*/ 3415738 h 5435595"/>
+              <a:gd name="connsiteX3" fmla="*/ 0 w 4610100"/>
+              <a:gd name="connsiteY3" fmla="*/ 5435595 h 5435595"/>
+              <a:gd name="connsiteX4" fmla="*/ 177800 w 4610100"/>
+              <a:gd name="connsiteY4" fmla="*/ 0 h 5435595"/>
+              <a:gd name="connsiteX0" fmla="*/ 0 w 4762500"/>
+              <a:gd name="connsiteY0" fmla="*/ 0 h 5447515"/>
+              <a:gd name="connsiteX1" fmla="*/ 4762500 w 4762500"/>
+              <a:gd name="connsiteY1" fmla="*/ 11920 h 5447515"/>
+              <a:gd name="connsiteX2" fmla="*/ 4749800 w 4762500"/>
+              <a:gd name="connsiteY2" fmla="*/ 3427658 h 5447515"/>
+              <a:gd name="connsiteX3" fmla="*/ 152400 w 4762500"/>
+              <a:gd name="connsiteY3" fmla="*/ 5447515 h 5447515"/>
+              <a:gd name="connsiteX4" fmla="*/ 0 w 4762500"/>
+              <a:gd name="connsiteY4" fmla="*/ 0 h 5447515"/>
+              <a:gd name="connsiteX0" fmla="*/ 0 w 4762500"/>
+              <a:gd name="connsiteY0" fmla="*/ 0 h 5018389"/>
+              <a:gd name="connsiteX1" fmla="*/ 4762500 w 4762500"/>
+              <a:gd name="connsiteY1" fmla="*/ 11920 h 5018389"/>
+              <a:gd name="connsiteX2" fmla="*/ 4749800 w 4762500"/>
+              <a:gd name="connsiteY2" fmla="*/ 3427658 h 5018389"/>
+              <a:gd name="connsiteX3" fmla="*/ 199244 w 4762500"/>
+              <a:gd name="connsiteY3" fmla="*/ 5018389 h 5018389"/>
+              <a:gd name="connsiteX4" fmla="*/ 0 w 4762500"/>
+              <a:gd name="connsiteY4" fmla="*/ 0 h 5018389"/>
+              <a:gd name="connsiteX0" fmla="*/ 0 w 4762500"/>
+              <a:gd name="connsiteY0" fmla="*/ 0 h 5042229"/>
+              <a:gd name="connsiteX1" fmla="*/ 4762500 w 4762500"/>
+              <a:gd name="connsiteY1" fmla="*/ 11920 h 5042229"/>
+              <a:gd name="connsiteX2" fmla="*/ 4749800 w 4762500"/>
+              <a:gd name="connsiteY2" fmla="*/ 3427658 h 5042229"/>
+              <a:gd name="connsiteX3" fmla="*/ 214859 w 4762500"/>
+              <a:gd name="connsiteY3" fmla="*/ 5042229 h 5042229"/>
+              <a:gd name="connsiteX4" fmla="*/ 0 w 4762500"/>
+              <a:gd name="connsiteY4" fmla="*/ 0 h 5042229"/>
+              <a:gd name="connsiteX0" fmla="*/ 0 w 4781482"/>
+              <a:gd name="connsiteY0" fmla="*/ 0 h 5042229"/>
+              <a:gd name="connsiteX1" fmla="*/ 4762500 w 4781482"/>
+              <a:gd name="connsiteY1" fmla="*/ 11920 h 5042229"/>
+              <a:gd name="connsiteX2" fmla="*/ 4781030 w 4781482"/>
+              <a:gd name="connsiteY2" fmla="*/ 3308456 h 5042229"/>
+              <a:gd name="connsiteX3" fmla="*/ 214859 w 4781482"/>
+              <a:gd name="connsiteY3" fmla="*/ 5042229 h 5042229"/>
+              <a:gd name="connsiteX4" fmla="*/ 0 w 4781482"/>
+              <a:gd name="connsiteY4" fmla="*/ 0 h 5042229"/>
+              <a:gd name="connsiteX0" fmla="*/ 0 w 4781482"/>
+              <a:gd name="connsiteY0" fmla="*/ 0 h 5042229"/>
+              <a:gd name="connsiteX1" fmla="*/ 4762500 w 4781482"/>
+              <a:gd name="connsiteY1" fmla="*/ 11920 h 5042229"/>
+              <a:gd name="connsiteX2" fmla="*/ 4781030 w 4781482"/>
+              <a:gd name="connsiteY2" fmla="*/ 3415738 h 5042229"/>
+              <a:gd name="connsiteX3" fmla="*/ 214859 w 4781482"/>
+              <a:gd name="connsiteY3" fmla="*/ 5042229 h 5042229"/>
+              <a:gd name="connsiteX4" fmla="*/ 0 w 4781482"/>
+              <a:gd name="connsiteY4" fmla="*/ 0 h 5042229"/>
+              <a:gd name="connsiteX0" fmla="*/ 0 w 4781482"/>
+              <a:gd name="connsiteY0" fmla="*/ 0 h 5030309"/>
+              <a:gd name="connsiteX1" fmla="*/ 4762500 w 4781482"/>
+              <a:gd name="connsiteY1" fmla="*/ 11920 h 5030309"/>
+              <a:gd name="connsiteX2" fmla="*/ 4781030 w 4781482"/>
+              <a:gd name="connsiteY2" fmla="*/ 3415738 h 5030309"/>
+              <a:gd name="connsiteX3" fmla="*/ 168015 w 4781482"/>
+              <a:gd name="connsiteY3" fmla="*/ 5030309 h 5030309"/>
+              <a:gd name="connsiteX4" fmla="*/ 0 w 4781482"/>
+              <a:gd name="connsiteY4" fmla="*/ 0 h 5030309"/>
+              <a:gd name="connsiteX0" fmla="*/ 0 w 4781482"/>
+              <a:gd name="connsiteY0" fmla="*/ 0 h 5066069"/>
+              <a:gd name="connsiteX1" fmla="*/ 4762500 w 4781482"/>
+              <a:gd name="connsiteY1" fmla="*/ 11920 h 5066069"/>
+              <a:gd name="connsiteX2" fmla="*/ 4781030 w 4781482"/>
+              <a:gd name="connsiteY2" fmla="*/ 3415738 h 5066069"/>
+              <a:gd name="connsiteX3" fmla="*/ 121170 w 4781482"/>
+              <a:gd name="connsiteY3" fmla="*/ 5066069 h 5066069"/>
+              <a:gd name="connsiteX4" fmla="*/ 0 w 4781482"/>
+              <a:gd name="connsiteY4" fmla="*/ 0 h 5066069"/>
+              <a:gd name="connsiteX0" fmla="*/ 0 w 4781482"/>
+              <a:gd name="connsiteY0" fmla="*/ 0 h 5089909"/>
+              <a:gd name="connsiteX1" fmla="*/ 4762500 w 4781482"/>
+              <a:gd name="connsiteY1" fmla="*/ 11920 h 5089909"/>
+              <a:gd name="connsiteX2" fmla="*/ 4781030 w 4781482"/>
+              <a:gd name="connsiteY2" fmla="*/ 3415738 h 5089909"/>
+              <a:gd name="connsiteX3" fmla="*/ 89941 w 4781482"/>
+              <a:gd name="connsiteY3" fmla="*/ 5089909 h 5089909"/>
+              <a:gd name="connsiteX4" fmla="*/ 0 w 4781482"/>
+              <a:gd name="connsiteY4" fmla="*/ 0 h 5089909"/>
+              <a:gd name="connsiteX0" fmla="*/ 374754 w 5156236"/>
+              <a:gd name="connsiteY0" fmla="*/ 0 h 5089909"/>
+              <a:gd name="connsiteX1" fmla="*/ 5137254 w 5156236"/>
+              <a:gd name="connsiteY1" fmla="*/ 11920 h 5089909"/>
+              <a:gd name="connsiteX2" fmla="*/ 5155784 w 5156236"/>
+              <a:gd name="connsiteY2" fmla="*/ 3415738 h 5089909"/>
+              <a:gd name="connsiteX3" fmla="*/ 464695 w 5156236"/>
+              <a:gd name="connsiteY3" fmla="*/ 5089909 h 5089909"/>
+              <a:gd name="connsiteX4" fmla="*/ 0 w 5156236"/>
+              <a:gd name="connsiteY4" fmla="*/ 2825078 h 5089909"/>
+              <a:gd name="connsiteX5" fmla="*/ 374754 w 5156236"/>
+              <a:gd name="connsiteY5" fmla="*/ 0 h 5089909"/>
+              <a:gd name="connsiteX0" fmla="*/ 0 w 4781482"/>
+              <a:gd name="connsiteY0" fmla="*/ 0 h 5089909"/>
+              <a:gd name="connsiteX1" fmla="*/ 4762500 w 4781482"/>
+              <a:gd name="connsiteY1" fmla="*/ 11920 h 5089909"/>
+              <a:gd name="connsiteX2" fmla="*/ 4781030 w 4781482"/>
+              <a:gd name="connsiteY2" fmla="*/ 3415738 h 5089909"/>
+              <a:gd name="connsiteX3" fmla="*/ 89941 w 4781482"/>
+              <a:gd name="connsiteY3" fmla="*/ 5089909 h 5089909"/>
+              <a:gd name="connsiteX4" fmla="*/ 156148 w 4781482"/>
+              <a:gd name="connsiteY4" fmla="*/ 2825078 h 5089909"/>
+              <a:gd name="connsiteX5" fmla="*/ 0 w 4781482"/>
+              <a:gd name="connsiteY5" fmla="*/ 0 h 5089909"/>
+              <a:gd name="connsiteX0" fmla="*/ 0 w 4781482"/>
+              <a:gd name="connsiteY0" fmla="*/ 0 h 5089909"/>
+              <a:gd name="connsiteX1" fmla="*/ 4762500 w 4781482"/>
+              <a:gd name="connsiteY1" fmla="*/ 11920 h 5089909"/>
+              <a:gd name="connsiteX2" fmla="*/ 4781030 w 4781482"/>
+              <a:gd name="connsiteY2" fmla="*/ 3415738 h 5089909"/>
+              <a:gd name="connsiteX3" fmla="*/ 89941 w 4781482"/>
+              <a:gd name="connsiteY3" fmla="*/ 5089909 h 5089909"/>
+              <a:gd name="connsiteX4" fmla="*/ 31230 w 4781482"/>
+              <a:gd name="connsiteY4" fmla="*/ 2825078 h 5089909"/>
+              <a:gd name="connsiteX5" fmla="*/ 0 w 4781482"/>
+              <a:gd name="connsiteY5" fmla="*/ 0 h 5089909"/>
+            </a:gdLst>
+            <a:ahLst/>
+            <a:cxnLst>
+              <a:cxn ang="0">
+                <a:pos x="connsiteX0" y="connsiteY0"/>
+              </a:cxn>
+              <a:cxn ang="0">
+                <a:pos x="connsiteX1" y="connsiteY1"/>
+              </a:cxn>
+              <a:cxn ang="0">
+                <a:pos x="connsiteX2" y="connsiteY2"/>
+              </a:cxn>
+              <a:cxn ang="0">
+                <a:pos x="connsiteX3" y="connsiteY3"/>
+              </a:cxn>
+              <a:cxn ang="0">
+                <a:pos x="connsiteX4" y="connsiteY4"/>
+              </a:cxn>
+              <a:cxn ang="0">
+                <a:pos x="connsiteX5" y="connsiteY5"/>
+              </a:cxn>
+            </a:cxnLst>
+            <a:rect l="l" t="t" r="r" b="b"/>
+            <a:pathLst>
+              <a:path w="4781482" h="5089909">
+                <a:moveTo>
+                  <a:pt x="0" y="0"/>
+                </a:moveTo>
+                <a:lnTo>
+                  <a:pt x="4762500" y="11920"/>
+                </a:lnTo>
+                <a:cubicBezTo>
+                  <a:pt x="4758267" y="1150499"/>
+                  <a:pt x="4785263" y="2277159"/>
+                  <a:pt x="4781030" y="3415738"/>
+                </a:cubicBezTo>
+                <a:lnTo>
+                  <a:pt x="89941" y="5089909"/>
+                </a:lnTo>
+                <a:cubicBezTo>
+                  <a:pt x="70371" y="4327019"/>
+                  <a:pt x="50800" y="3587968"/>
+                  <a:pt x="31230" y="2825078"/>
+                </a:cubicBezTo>
+                <a:lnTo>
+                  <a:pt x="0" y="0"/>
+                </a:lnTo>
+                <a:close/>
+              </a:path>
+            </a:pathLst>
+          </a:custGeom>
+          <a:blipFill dpi="0" rotWithShape="1">
+            <a:blip r:embed="rId3">
+              <a:extLst>
+                <a:ext uri="{28A0092B-C50C-407E-A947-70E740481C1C}">
+                  <a14:useLocalDpi xmlns:a14="http://schemas.microsoft.com/office/drawing/2010/main" val="0"/>
+                </a:ext>
+              </a:extLst>
+            </a:blip>
+            <a:srcRect/>
+            <a:stretch>
+              <a:fillRect/>
+            </a:stretch>
+          </a:blipFill>
+          <a:ln w="12700">
+            <a:solidFill>
+              <a:srgbClr val="00B0F0"/>
+            </a:solidFill>
+          </a:ln>
+        </p:spPr>
+        <p:style>
+          <a:lnRef idx="2">
+            <a:schemeClr val="accent1">
+              <a:shade val="50000"/>
+            </a:schemeClr>
+          </a:lnRef>
+          <a:fillRef idx="1">
+            <a:schemeClr val="accent1"/>
+          </a:fillRef>
+          <a:effectRef idx="0">
+            <a:schemeClr val="accent1"/>
+          </a:effectRef>
+          <a:fontRef idx="minor">
+            <a:schemeClr val="lt1"/>
+          </a:fontRef>
+        </p:style>
+        <p:txBody>
+          <a:bodyPr rtlCol="0" anchor="ctr"/>
+          <a:lstStyle/>
+          <a:p>
+            <a:pPr algn="ctr"/>
+            <a:endParaRPr lang="hu-HU"/>
+          </a:p>
+        </p:txBody>
+      </p:sp>
     </p:spTree>
     <p:extLst>
       <p:ext uri="{BB962C8B-B14F-4D97-AF65-F5344CB8AC3E}">
@@ -6574,13 +7256,6 @@
   <p:clrMapOvr>
     <a:masterClrMapping/>
   </p:clrMapOvr>
-  <p:timing>
-    <p:tnLst>
-      <p:par>
-        <p:cTn id="1" dur="indefinite" restart="never" nodeType="tmRoot"/>
-      </p:par>
-    </p:tnLst>
-  </p:timing>
 </p:sld>
 </file>
 
@@ -6601,6 +7276,68 @@
           <a:chExt cx="0" cy="0"/>
         </a:xfrm>
       </p:grpSpPr>
+      <p:pic>
+        <p:nvPicPr>
+          <p:cNvPr id="2050" name="Picture 2" descr="Torn Notebook Paper Png - Folha De Papel Rasgado Png PNG Image |  Transparent PNG Free Download on SeekPNG">
+            <a:extLst>
+              <a:ext uri="{FF2B5EF4-FFF2-40B4-BE49-F238E27FC236}">
+                <a16:creationId xmlns:a16="http://schemas.microsoft.com/office/drawing/2014/main" id="{141574E7-B4AA-C450-2913-92E2D53BE599}"/>
+              </a:ext>
+            </a:extLst>
+          </p:cNvPr>
+          <p:cNvPicPr>
+            <a:picLocks noChangeAspect="1" noChangeArrowheads="1"/>
+          </p:cNvPicPr>
+          <p:nvPr/>
+        </p:nvPicPr>
+        <p:blipFill>
+          <a:blip r:embed="rId2">
+            <a:extLst>
+              <a:ext uri="{BEBA8EAE-BF5A-486C-A8C5-ECC9F3942E4B}">
+                <a14:imgProps xmlns:a14="http://schemas.microsoft.com/office/drawing/2010/main">
+                  <a14:imgLayer r:embed="rId3">
+                    <a14:imgEffect>
+                      <a14:backgroundRemoval t="10000" b="90000" l="10000" r="90000">
+                        <a14:backgroundMark x1="14878" y1="37363" x2="14878" y2="37363"/>
+                        <a14:backgroundMark x1="14512" y1="46978" x2="14512" y2="46978"/>
+                        <a14:backgroundMark x1="13780" y1="57005" x2="13780" y2="57005"/>
+                        <a14:backgroundMark x1="14512" y1="67445" x2="14512" y2="67445"/>
+                        <a14:backgroundMark x1="14512" y1="78159" x2="14512" y2="78159"/>
+                      </a14:backgroundRemoval>
+                    </a14:imgEffect>
+                  </a14:imgLayer>
+                </a14:imgProps>
+              </a:ext>
+              <a:ext uri="{28A0092B-C50C-407E-A947-70E740481C1C}">
+                <a14:useLocalDpi xmlns:a14="http://schemas.microsoft.com/office/drawing/2010/main" val="0"/>
+              </a:ext>
+            </a:extLst>
+          </a:blip>
+          <a:srcRect/>
+          <a:stretch>
+            <a:fillRect/>
+          </a:stretch>
+        </p:blipFill>
+        <p:spPr bwMode="auto">
+          <a:xfrm>
+            <a:off x="-382587" y="790024"/>
+            <a:ext cx="6895077" cy="6121400"/>
+          </a:xfrm>
+          <a:prstGeom prst="rect">
+            <a:avLst/>
+          </a:prstGeom>
+          <a:noFill/>
+          <a:extLst>
+            <a:ext uri="{909E8E84-426E-40DD-AFC4-6F175D3DCCD1}">
+              <a14:hiddenFill xmlns:a14="http://schemas.microsoft.com/office/drawing/2010/main">
+                <a:solidFill>
+                  <a:srgbClr val="FFFFFF"/>
+                </a:solidFill>
+              </a14:hiddenFill>
+            </a:ext>
+          </a:extLst>
+        </p:spPr>
+      </p:pic>
       <p:sp>
         <p:nvSpPr>
           <p:cNvPr id="2" name="Cím 1"/>
@@ -6616,11 +7353,11 @@
           <a:bodyPr/>
           <a:lstStyle/>
           <a:p>
-            <a:r>
-              <a:rPr lang="hu-HU" dirty="0" smtClean="0"/>
-              <a:t>Mi kell hozzá</a:t>
-            </a:r>
-            <a:endParaRPr lang="hu-HU" dirty="0"/>
+            <a:pPr algn="l"/>
+            <a:r>
+              <a:rPr lang="hu-HU" dirty="0"/>
+              <a:t>Mi kell hozzá?</a:t>
+            </a:r>
           </a:p>
         </p:txBody>
       </p:sp>
@@ -6634,15 +7371,458 @@
             <p:ph idx="1"/>
           </p:nvPr>
         </p:nvSpPr>
-        <p:spPr/>
+        <p:spPr>
+          <a:xfrm>
+            <a:off x="913795" y="2769023"/>
+            <a:ext cx="4636105" cy="4058751"/>
+          </a:xfrm>
+        </p:spPr>
         <p:txBody>
           <a:bodyPr/>
           <a:lstStyle/>
           <a:p>
-            <a:endParaRPr lang="hu-HU"/>
-          </a:p>
-        </p:txBody>
-      </p:sp>
+            <a:pPr>
+              <a:buClrTx/>
+              <a:buFont typeface="Arial" panose="020B0604020202020204" pitchFamily="34" charset="0"/>
+              <a:buChar char="•"/>
+            </a:pPr>
+            <a:r>
+              <a:rPr lang="hu-HU" b="1" dirty="0">
+                <a:solidFill>
+                  <a:schemeClr val="bg1">
+                    <a:lumMod val="95000"/>
+                    <a:lumOff val="5000"/>
+                  </a:schemeClr>
+                </a:solidFill>
+                <a:latin typeface="Bradley Hand ITC" panose="03070402050302030203" pitchFamily="66" charset="0"/>
+              </a:rPr>
+              <a:t>DAW szoftver/integrált egység</a:t>
+            </a:r>
+          </a:p>
+          <a:p>
+            <a:pPr>
+              <a:buClr>
+                <a:schemeClr val="bg1"/>
+              </a:buClr>
+              <a:buFont typeface="Arial" panose="020B0604020202020204" pitchFamily="34" charset="0"/>
+              <a:buChar char="•"/>
+            </a:pPr>
+            <a:r>
+              <a:rPr lang="hu-HU" b="1" dirty="0">
+                <a:solidFill>
+                  <a:schemeClr val="bg1">
+                    <a:lumMod val="95000"/>
+                    <a:lumOff val="5000"/>
+                  </a:schemeClr>
+                </a:solidFill>
+                <a:latin typeface="Bradley Hand ITC" panose="03070402050302030203" pitchFamily="66" charset="0"/>
+              </a:rPr>
+              <a:t>Hangkártya</a:t>
+            </a:r>
+          </a:p>
+          <a:p>
+            <a:pPr>
+              <a:buClrTx/>
+              <a:buFont typeface="Arial" panose="020B0604020202020204" pitchFamily="34" charset="0"/>
+              <a:buChar char="•"/>
+            </a:pPr>
+            <a:r>
+              <a:rPr lang="hu-HU" b="1" dirty="0">
+                <a:solidFill>
+                  <a:schemeClr val="bg1">
+                    <a:lumMod val="95000"/>
+                    <a:lumOff val="5000"/>
+                  </a:schemeClr>
+                </a:solidFill>
+                <a:latin typeface="Bradley Hand ITC" panose="03070402050302030203" pitchFamily="66" charset="0"/>
+              </a:rPr>
+              <a:t>Hangszer</a:t>
+            </a:r>
+          </a:p>
+          <a:p>
+            <a:pPr>
+              <a:buClrTx/>
+              <a:buFont typeface="Arial" panose="020B0604020202020204" pitchFamily="34" charset="0"/>
+              <a:buChar char="•"/>
+            </a:pPr>
+            <a:r>
+              <a:rPr lang="hu-HU" b="1" dirty="0">
+                <a:solidFill>
+                  <a:schemeClr val="bg1">
+                    <a:lumMod val="95000"/>
+                    <a:lumOff val="5000"/>
+                  </a:schemeClr>
+                </a:solidFill>
+                <a:latin typeface="Bradley Hand ITC" panose="03070402050302030203" pitchFamily="66" charset="0"/>
+              </a:rPr>
+              <a:t>Mikrofon ( ha nincs hangszedő)</a:t>
+            </a:r>
+          </a:p>
+          <a:p>
+            <a:pPr>
+              <a:buClrTx/>
+              <a:buFont typeface="Arial" panose="020B0604020202020204" pitchFamily="34" charset="0"/>
+              <a:buChar char="•"/>
+            </a:pPr>
+            <a:r>
+              <a:rPr lang="hu-HU" b="1" dirty="0" err="1">
+                <a:solidFill>
+                  <a:schemeClr val="bg1">
+                    <a:lumMod val="95000"/>
+                    <a:lumOff val="5000"/>
+                  </a:schemeClr>
+                </a:solidFill>
+                <a:latin typeface="Bradley Hand ITC" panose="03070402050302030203" pitchFamily="66" charset="0"/>
+              </a:rPr>
+              <a:t>Audio</a:t>
+            </a:r>
+            <a:r>
+              <a:rPr lang="hu-HU" b="1" dirty="0">
+                <a:solidFill>
+                  <a:schemeClr val="bg1">
+                    <a:lumMod val="95000"/>
+                    <a:lumOff val="5000"/>
+                  </a:schemeClr>
+                </a:solidFill>
+                <a:latin typeface="Bradley Hand ITC" panose="03070402050302030203" pitchFamily="66" charset="0"/>
+              </a:rPr>
+              <a:t> kábelek </a:t>
+            </a:r>
+          </a:p>
+          <a:p>
+            <a:pPr>
+              <a:buClrTx/>
+              <a:buFont typeface="Arial" panose="020B0604020202020204" pitchFamily="34" charset="0"/>
+              <a:buChar char="•"/>
+            </a:pPr>
+            <a:r>
+              <a:rPr lang="hu-HU" b="1" dirty="0">
+                <a:solidFill>
+                  <a:schemeClr val="bg1">
+                    <a:lumMod val="95000"/>
+                    <a:lumOff val="5000"/>
+                  </a:schemeClr>
+                </a:solidFill>
+                <a:latin typeface="Bradley Hand ITC" panose="03070402050302030203" pitchFamily="66" charset="0"/>
+              </a:rPr>
+              <a:t>Fejhallgató, hangszóró, stúdiómonitor</a:t>
+            </a:r>
+          </a:p>
+        </p:txBody>
+      </p:sp>
+      <p:pic>
+        <p:nvPicPr>
+          <p:cNvPr id="2056" name="Picture 8" descr="20 Studio Setup Tips - Part Two">
+            <a:extLst>
+              <a:ext uri="{FF2B5EF4-FFF2-40B4-BE49-F238E27FC236}">
+                <a16:creationId xmlns:a16="http://schemas.microsoft.com/office/drawing/2014/main" id="{DB5E2172-FB06-EA01-9AA3-88E483BBE21D}"/>
+              </a:ext>
+            </a:extLst>
+          </p:cNvPr>
+          <p:cNvPicPr>
+            <a:picLocks noChangeAspect="1" noChangeArrowheads="1"/>
+          </p:cNvPicPr>
+          <p:nvPr/>
+        </p:nvPicPr>
+        <p:blipFill>
+          <a:blip r:embed="rId4">
+            <a:extLst>
+              <a:ext uri="{28A0092B-C50C-407E-A947-70E740481C1C}">
+                <a14:useLocalDpi xmlns:a14="http://schemas.microsoft.com/office/drawing/2010/main" val="0"/>
+              </a:ext>
+            </a:extLst>
+          </a:blip>
+          <a:srcRect/>
+          <a:stretch>
+            <a:fillRect/>
+          </a:stretch>
+        </p:blipFill>
+        <p:spPr bwMode="auto">
+          <a:xfrm>
+            <a:off x="6096000" y="1384034"/>
+            <a:ext cx="5339324" cy="3704156"/>
+          </a:xfrm>
+          <a:prstGeom prst="rect">
+            <a:avLst/>
+          </a:prstGeom>
+          <a:noFill/>
+          <a:extLst>
+            <a:ext uri="{909E8E84-426E-40DD-AFC4-6F175D3DCCD1}">
+              <a14:hiddenFill xmlns:a14="http://schemas.microsoft.com/office/drawing/2010/main">
+                <a:solidFill>
+                  <a:srgbClr val="FFFFFF"/>
+                </a:solidFill>
+              </a14:hiddenFill>
+            </a:ext>
+          </a:extLst>
+        </p:spPr>
+      </p:pic>
+      <p:pic>
+        <p:nvPicPr>
+          <p:cNvPr id="2060" name="Picture 12" descr="masking tape png - x tape clip art PNG image with transparent background |  TOPpng">
+            <a:extLst>
+              <a:ext uri="{FF2B5EF4-FFF2-40B4-BE49-F238E27FC236}">
+                <a16:creationId xmlns:a16="http://schemas.microsoft.com/office/drawing/2014/main" id="{62A5F4E3-6579-A3A2-CAB1-4E62AAE823CB}"/>
+              </a:ext>
+            </a:extLst>
+          </p:cNvPr>
+          <p:cNvPicPr>
+            <a:picLocks noChangeAspect="1" noChangeArrowheads="1"/>
+          </p:cNvPicPr>
+          <p:nvPr/>
+        </p:nvPicPr>
+        <p:blipFill>
+          <a:blip r:embed="rId5">
+            <a:extLst>
+              <a:ext uri="{BEBA8EAE-BF5A-486C-A8C5-ECC9F3942E4B}">
+                <a14:imgProps xmlns:a14="http://schemas.microsoft.com/office/drawing/2010/main">
+                  <a14:imgLayer r:embed="rId6">
+                    <a14:imgEffect>
+                      <a14:backgroundRemoval t="7451" b="90920" l="1310" r="97738">
+                        <a14:foregroundMark x1="4881" y1="25378" x2="8095" y2="26310"/>
+                        <a14:foregroundMark x1="1310" y1="23283" x2="1310" y2="23283"/>
+                        <a14:foregroundMark x1="21429" y1="7451" x2="23095" y2="8731"/>
+                        <a14:foregroundMark x1="77976" y1="90920" x2="76310" y2="89406"/>
+                        <a14:foregroundMark x1="93929" y1="77416" x2="93214" y2="73923"/>
+                        <a14:foregroundMark x1="97738" y1="76251" x2="97738" y2="76251"/>
+                      </a14:backgroundRemoval>
+                    </a14:imgEffect>
+                  </a14:imgLayer>
+                </a14:imgProps>
+              </a:ext>
+              <a:ext uri="{28A0092B-C50C-407E-A947-70E740481C1C}">
+                <a14:useLocalDpi xmlns:a14="http://schemas.microsoft.com/office/drawing/2010/main" val="0"/>
+              </a:ext>
+            </a:extLst>
+          </a:blip>
+          <a:srcRect/>
+          <a:stretch>
+            <a:fillRect/>
+          </a:stretch>
+        </p:blipFill>
+        <p:spPr bwMode="auto">
+          <a:xfrm>
+            <a:off x="5816552" y="4165600"/>
+            <a:ext cx="1242038" cy="1270266"/>
+          </a:xfrm>
+          <a:prstGeom prst="rect">
+            <a:avLst/>
+          </a:prstGeom>
+          <a:noFill/>
+          <a:extLst>
+            <a:ext uri="{909E8E84-426E-40DD-AFC4-6F175D3DCCD1}">
+              <a14:hiddenFill xmlns:a14="http://schemas.microsoft.com/office/drawing/2010/main">
+                <a:solidFill>
+                  <a:srgbClr val="FFFFFF"/>
+                </a:solidFill>
+              </a14:hiddenFill>
+            </a:ext>
+          </a:extLst>
+        </p:spPr>
+      </p:pic>
+      <p:pic>
+        <p:nvPicPr>
+          <p:cNvPr id="11" name="Picture 12" descr="masking tape png - x tape clip art PNG image with transparent background |  TOPpng">
+            <a:extLst>
+              <a:ext uri="{FF2B5EF4-FFF2-40B4-BE49-F238E27FC236}">
+                <a16:creationId xmlns:a16="http://schemas.microsoft.com/office/drawing/2014/main" id="{67518699-2CAE-C797-0B3D-DAE856DE85E8}"/>
+              </a:ext>
+            </a:extLst>
+          </p:cNvPr>
+          <p:cNvPicPr>
+            <a:picLocks noChangeAspect="1" noChangeArrowheads="1"/>
+          </p:cNvPicPr>
+          <p:nvPr/>
+        </p:nvPicPr>
+        <p:blipFill>
+          <a:blip r:embed="rId5">
+            <a:extLst>
+              <a:ext uri="{BEBA8EAE-BF5A-486C-A8C5-ECC9F3942E4B}">
+                <a14:imgProps xmlns:a14="http://schemas.microsoft.com/office/drawing/2010/main">
+                  <a14:imgLayer r:embed="rId6">
+                    <a14:imgEffect>
+                      <a14:backgroundRemoval t="7451" b="90920" l="1310" r="97738">
+                        <a14:foregroundMark x1="4881" y1="25378" x2="8095" y2="26310"/>
+                        <a14:foregroundMark x1="1310" y1="23283" x2="1310" y2="23283"/>
+                        <a14:foregroundMark x1="21429" y1="7451" x2="23095" y2="8731"/>
+                        <a14:foregroundMark x1="77976" y1="90920" x2="76310" y2="89406"/>
+                        <a14:foregroundMark x1="93929" y1="77416" x2="93214" y2="73923"/>
+                        <a14:foregroundMark x1="97738" y1="76251" x2="97738" y2="76251"/>
+                      </a14:backgroundRemoval>
+                    </a14:imgEffect>
+                  </a14:imgLayer>
+                </a14:imgProps>
+              </a:ext>
+              <a:ext uri="{28A0092B-C50C-407E-A947-70E740481C1C}">
+                <a14:useLocalDpi xmlns:a14="http://schemas.microsoft.com/office/drawing/2010/main" val="0"/>
+              </a:ext>
+            </a:extLst>
+          </a:blip>
+          <a:srcRect/>
+          <a:stretch>
+            <a:fillRect/>
+          </a:stretch>
+        </p:blipFill>
+        <p:spPr bwMode="auto">
+          <a:xfrm rot="553827">
+            <a:off x="10692927" y="992826"/>
+            <a:ext cx="1242038" cy="1270266"/>
+          </a:xfrm>
+          <a:prstGeom prst="rect">
+            <a:avLst/>
+          </a:prstGeom>
+          <a:noFill/>
+          <a:extLst>
+            <a:ext uri="{909E8E84-426E-40DD-AFC4-6F175D3DCCD1}">
+              <a14:hiddenFill xmlns:a14="http://schemas.microsoft.com/office/drawing/2010/main">
+                <a:solidFill>
+                  <a:srgbClr val="FFFFFF"/>
+                </a:solidFill>
+              </a14:hiddenFill>
+            </a:ext>
+          </a:extLst>
+        </p:spPr>
+      </p:pic>
+      <p:pic>
+        <p:nvPicPr>
+          <p:cNvPr id="15" name="Picture 12" descr="masking tape png - x tape clip art PNG image with transparent background |  TOPpng">
+            <a:extLst>
+              <a:ext uri="{FF2B5EF4-FFF2-40B4-BE49-F238E27FC236}">
+                <a16:creationId xmlns:a16="http://schemas.microsoft.com/office/drawing/2014/main" id="{4384773E-B9D6-7BA1-8F65-D4612760D61B}"/>
+              </a:ext>
+            </a:extLst>
+          </p:cNvPr>
+          <p:cNvPicPr>
+            <a:picLocks noChangeAspect="1" noChangeArrowheads="1"/>
+          </p:cNvPicPr>
+          <p:nvPr/>
+        </p:nvPicPr>
+        <p:blipFill>
+          <a:blip r:embed="rId5">
+            <a:duotone>
+              <a:prstClr val="black"/>
+              <a:srgbClr val="0000FF">
+                <a:tint val="45000"/>
+                <a:satMod val="400000"/>
+              </a:srgbClr>
+            </a:duotone>
+            <a:extLst>
+              <a:ext uri="{BEBA8EAE-BF5A-486C-A8C5-ECC9F3942E4B}">
+                <a14:imgProps xmlns:a14="http://schemas.microsoft.com/office/drawing/2010/main">
+                  <a14:imgLayer r:embed="rId6">
+                    <a14:imgEffect>
+                      <a14:backgroundRemoval t="7451" b="90920" l="1310" r="97738">
+                        <a14:foregroundMark x1="4881" y1="25378" x2="8095" y2="26310"/>
+                        <a14:foregroundMark x1="1310" y1="23283" x2="1310" y2="23283"/>
+                        <a14:foregroundMark x1="21429" y1="7451" x2="23095" y2="8731"/>
+                        <a14:foregroundMark x1="77976" y1="90920" x2="76310" y2="89406"/>
+                        <a14:foregroundMark x1="93929" y1="77416" x2="93214" y2="73923"/>
+                        <a14:foregroundMark x1="97738" y1="76251" x2="97738" y2="76251"/>
+                      </a14:backgroundRemoval>
+                    </a14:imgEffect>
+                  </a14:imgLayer>
+                </a14:imgProps>
+              </a:ext>
+              <a:ext uri="{28A0092B-C50C-407E-A947-70E740481C1C}">
+                <a14:useLocalDpi xmlns:a14="http://schemas.microsoft.com/office/drawing/2010/main" val="0"/>
+              </a:ext>
+            </a:extLst>
+          </a:blip>
+          <a:srcRect/>
+          <a:stretch>
+            <a:fillRect/>
+          </a:stretch>
+        </p:blipFill>
+        <p:spPr bwMode="auto">
+          <a:xfrm rot="16584763">
+            <a:off x="4881502" y="5047067"/>
+            <a:ext cx="1242038" cy="1270266"/>
+          </a:xfrm>
+          <a:prstGeom prst="rect">
+            <a:avLst/>
+          </a:prstGeom>
+          <a:noFill/>
+          <a:extLst>
+            <a:ext uri="{909E8E84-426E-40DD-AFC4-6F175D3DCCD1}">
+              <a14:hiddenFill xmlns:a14="http://schemas.microsoft.com/office/drawing/2010/main">
+                <a:solidFill>
+                  <a:srgbClr val="FFFFFF"/>
+                </a:solidFill>
+              </a14:hiddenFill>
+            </a:ext>
+          </a:extLst>
+        </p:spPr>
+      </p:pic>
+      <p:pic>
+        <p:nvPicPr>
+          <p:cNvPr id="17" name="Picture 12" descr="masking tape png - x tape clip art PNG image with transparent background |  TOPpng">
+            <a:extLst>
+              <a:ext uri="{FF2B5EF4-FFF2-40B4-BE49-F238E27FC236}">
+                <a16:creationId xmlns:a16="http://schemas.microsoft.com/office/drawing/2014/main" id="{0E301E45-EF06-AAFA-D78A-C6C03A80A9D8}"/>
+              </a:ext>
+            </a:extLst>
+          </p:cNvPr>
+          <p:cNvPicPr>
+            <a:picLocks noChangeAspect="1" noChangeArrowheads="1"/>
+          </p:cNvPicPr>
+          <p:nvPr/>
+        </p:nvPicPr>
+        <p:blipFill>
+          <a:blip r:embed="rId5">
+            <a:duotone>
+              <a:prstClr val="black"/>
+              <a:srgbClr val="0000FF">
+                <a:tint val="45000"/>
+                <a:satMod val="400000"/>
+              </a:srgbClr>
+            </a:duotone>
+            <a:extLst>
+              <a:ext uri="{BEBA8EAE-BF5A-486C-A8C5-ECC9F3942E4B}">
+                <a14:imgProps xmlns:a14="http://schemas.microsoft.com/office/drawing/2010/main">
+                  <a14:imgLayer r:embed="rId6">
+                    <a14:imgEffect>
+                      <a14:backgroundRemoval t="7451" b="90920" l="1310" r="97738">
+                        <a14:foregroundMark x1="4881" y1="25378" x2="8095" y2="26310"/>
+                        <a14:foregroundMark x1="1310" y1="23283" x2="1310" y2="23283"/>
+                        <a14:foregroundMark x1="21429" y1="7451" x2="23095" y2="8731"/>
+                        <a14:foregroundMark x1="77976" y1="90920" x2="76310" y2="89406"/>
+                        <a14:foregroundMark x1="93929" y1="77416" x2="93214" y2="73923"/>
+                        <a14:foregroundMark x1="97738" y1="76251" x2="97738" y2="76251"/>
+                      </a14:backgroundRemoval>
+                    </a14:imgEffect>
+                  </a14:imgLayer>
+                </a14:imgProps>
+              </a:ext>
+              <a:ext uri="{28A0092B-C50C-407E-A947-70E740481C1C}">
+                <a14:useLocalDpi xmlns:a14="http://schemas.microsoft.com/office/drawing/2010/main" val="0"/>
+              </a:ext>
+            </a:extLst>
+          </a:blip>
+          <a:srcRect/>
+          <a:stretch>
+            <a:fillRect/>
+          </a:stretch>
+        </p:blipFill>
+        <p:spPr bwMode="auto">
+          <a:xfrm rot="16200000">
+            <a:off x="-112003" y="1458519"/>
+            <a:ext cx="1948341" cy="1992622"/>
+          </a:xfrm>
+          <a:prstGeom prst="rect">
+            <a:avLst/>
+          </a:prstGeom>
+          <a:noFill/>
+          <a:extLst>
+            <a:ext uri="{909E8E84-426E-40DD-AFC4-6F175D3DCCD1}">
+              <a14:hiddenFill xmlns:a14="http://schemas.microsoft.com/office/drawing/2010/main">
+                <a:solidFill>
+                  <a:srgbClr val="FFFFFF"/>
+                </a:solidFill>
+              </a14:hiddenFill>
+            </a:ext>
+          </a:extLst>
+        </p:spPr>
+      </p:pic>
     </p:spTree>
     <p:extLst>
       <p:ext uri="{BB962C8B-B14F-4D97-AF65-F5344CB8AC3E}">
@@ -6683,36 +7863,23 @@
             <p:ph type="title"/>
           </p:nvPr>
         </p:nvSpPr>
-        <p:spPr/>
+        <p:spPr>
+          <a:xfrm>
+            <a:off x="913795" y="581575"/>
+            <a:ext cx="10353762" cy="970450"/>
+          </a:xfrm>
+        </p:spPr>
         <p:txBody>
           <a:bodyPr>
             <a:normAutofit/>
           </a:bodyPr>
           <a:lstStyle/>
           <a:p>
-            <a:r>
-              <a:rPr lang="hu-HU" dirty="0" err="1" smtClean="0"/>
-              <a:t>Felj</a:t>
-            </a:r>
-            <a:r>
-              <a:rPr lang="hu-HU" dirty="0" smtClean="0">
-                <a:sym typeface="Wingdings" panose="05000000000000000000" pitchFamily="2" charset="2"/>
-              </a:rPr>
-              <a:t>: (előnye, előrelépés, </a:t>
-            </a:r>
-            <a:r>
-              <a:rPr lang="hu-HU" dirty="0" err="1" smtClean="0">
-                <a:sym typeface="Wingdings" panose="05000000000000000000" pitchFamily="2" charset="2"/>
-              </a:rPr>
-              <a:t>stb</a:t>
-            </a:r>
-            <a:r>
-              <a:rPr lang="hu-HU" dirty="0" smtClean="0">
-                <a:sym typeface="Wingdings" panose="05000000000000000000" pitchFamily="2" charset="2"/>
-              </a:rPr>
-              <a:t>)</a:t>
-            </a:r>
-            <a:endParaRPr lang="hu-HU" dirty="0"/>
+            <a:pPr algn="l"/>
+            <a:r>
+              <a:rPr lang="hu-HU" dirty="0"/>
+              <a:t>Miért előnyös használata?</a:t>
+            </a:r>
           </a:p>
         </p:txBody>
       </p:sp>
@@ -6731,6 +7898,93 @@
           <a:bodyPr/>
           <a:lstStyle/>
           <a:p>
+            <a:r>
+              <a:rPr lang="hu-HU" dirty="0"/>
+              <a:t>Külön szerkeszthetőség:</a:t>
+            </a:r>
+            <a:br>
+              <a:rPr lang="hu-HU" dirty="0"/>
+            </a:br>
+            <a:r>
+              <a:rPr lang="hu-HU" dirty="0"/>
+              <a:t>						-szólamok</a:t>
+            </a:r>
+          </a:p>
+          <a:p>
+            <a:pPr marL="36900" indent="0">
+              <a:buNone/>
+            </a:pPr>
+            <a:r>
+              <a:rPr lang="hu-HU" dirty="0"/>
+              <a:t>										  hangsávok</a:t>
+            </a:r>
+            <a:br>
+              <a:rPr lang="hu-HU" dirty="0"/>
+            </a:br>
+            <a:r>
+              <a:rPr lang="hu-HU" dirty="0"/>
+              <a:t>						-hangszerek</a:t>
+            </a:r>
+          </a:p>
+          <a:p>
+            <a:pPr marL="36900" indent="0">
+              <a:buNone/>
+            </a:pPr>
+            <a:br>
+              <a:rPr lang="hu-HU" dirty="0"/>
+            </a:br>
+            <a:endParaRPr lang="hu-HU" dirty="0"/>
+          </a:p>
+        </p:txBody>
+      </p:sp>
+      <p:sp>
+        <p:nvSpPr>
+          <p:cNvPr id="5" name="Jobb oldali kapcsos zárójel 4">
+            <a:extLst>
+              <a:ext uri="{FF2B5EF4-FFF2-40B4-BE49-F238E27FC236}">
+                <a16:creationId xmlns:a16="http://schemas.microsoft.com/office/drawing/2014/main" id="{11CB1380-3795-F2AC-4466-54E1715450AF}"/>
+              </a:ext>
+            </a:extLst>
+          </p:cNvPr>
+          <p:cNvSpPr/>
+          <p:nvPr/>
+        </p:nvSpPr>
+        <p:spPr>
+          <a:xfrm>
+            <a:off x="5194300" y="2247900"/>
+            <a:ext cx="330200" cy="863599"/>
+          </a:xfrm>
+          <a:prstGeom prst="rightBrace">
+            <a:avLst>
+              <a:gd name="adj1" fmla="val 0"/>
+              <a:gd name="adj2" fmla="val 50000"/>
+            </a:avLst>
+          </a:prstGeom>
+          <a:ln w="38100">
+            <a:solidFill>
+              <a:srgbClr val="00B0F0"/>
+            </a:solidFill>
+          </a:ln>
+        </p:spPr>
+        <p:style>
+          <a:lnRef idx="1">
+            <a:schemeClr val="accent1"/>
+          </a:lnRef>
+          <a:fillRef idx="0">
+            <a:schemeClr val="accent1"/>
+          </a:fillRef>
+          <a:effectRef idx="0">
+            <a:schemeClr val="accent1"/>
+          </a:effectRef>
+          <a:fontRef idx="minor">
+            <a:schemeClr val="tx1"/>
+          </a:fontRef>
+        </p:style>
+        <p:txBody>
+          <a:bodyPr rtlCol="0" anchor="ctr"/>
+          <a:lstStyle/>
+          <a:p>
+            <a:pPr algn="ctr"/>
             <a:endParaRPr lang="hu-HU"/>
           </a:p>
         </p:txBody>
@@ -6781,10 +8035,9 @@
           <a:lstStyle/>
           <a:p>
             <a:r>
-              <a:rPr lang="hu-HU" dirty="0" smtClean="0"/>
+              <a:rPr lang="hu-HU" dirty="0"/>
               <a:t>Elődei</a:t>
             </a:r>
-            <a:endParaRPr lang="hu-HU" dirty="0"/>
           </a:p>
         </p:txBody>
       </p:sp>
@@ -6853,10 +8106,9 @@
           <a:lstStyle/>
           <a:p>
             <a:r>
-              <a:rPr lang="hu-HU" dirty="0" smtClean="0"/>
+              <a:rPr lang="hu-HU" dirty="0"/>
               <a:t>Működése</a:t>
             </a:r>
-            <a:endParaRPr lang="hu-HU" dirty="0"/>
           </a:p>
         </p:txBody>
       </p:sp>
@@ -6927,10 +8179,9 @@
           <a:lstStyle/>
           <a:p>
             <a:r>
-              <a:rPr lang="hu-HU" dirty="0" smtClean="0"/>
+              <a:rPr lang="hu-HU" dirty="0"/>
               <a:t>Képforrások:</a:t>
             </a:r>
-            <a:endParaRPr lang="hu-HU" dirty="0"/>
           </a:p>
         </p:txBody>
       </p:sp>
@@ -6953,24 +8204,14 @@
               <a:rPr lang="hu-HU" dirty="0">
                 <a:hlinkClick r:id="rId2"/>
               </a:rPr>
-              <a:t>https://in.pinterest.com/pin/607915649691778141</a:t>
-            </a:r>
-            <a:r>
-              <a:rPr lang="hu-HU" dirty="0" smtClean="0">
-                <a:hlinkClick r:id="rId2"/>
-              </a:rPr>
-              <a:t>/</a:t>
-            </a:r>
-            <a:endParaRPr lang="hu-HU" dirty="0" smtClean="0"/>
+              <a:t>https://in.pinterest.com/pin/607915649691778141/</a:t>
+            </a:r>
+            <a:endParaRPr lang="hu-HU" dirty="0"/>
           </a:p>
           <a:p>
             <a:r>
               <a:rPr lang="hu-HU" dirty="0"/>
-              <a:t>https://</a:t>
-            </a:r>
-            <a:r>
-              <a:rPr lang="hu-HU" dirty="0" smtClean="0"/>
-              <a:t>online.berklee.edu/takenote/wp-content/uploads/2022/02/Take-Note-DAW-image.jpg</a:t>
+              <a:t>https://online.berklee.edu/takenote/wp-content/uploads/2022/02/Take-Note-DAW-image.jpg</a:t>
             </a:r>
           </a:p>
           <a:p>
@@ -6978,37 +8219,24 @@
               <a:rPr lang="hu-HU" dirty="0">
                 <a:hlinkClick r:id="rId3"/>
               </a:rPr>
-              <a:t>https://</a:t>
-            </a:r>
-            <a:r>
-              <a:rPr lang="hu-HU" dirty="0" smtClean="0">
-                <a:hlinkClick r:id="rId3"/>
-              </a:rPr>
-              <a:t>www.freepik.com/free-vector/ripped-paper-note_4561983.htm</a:t>
-            </a:r>
-            <a:endParaRPr lang="hu-HU" dirty="0" smtClean="0"/>
+              <a:t>https://www.freepik.com/free-vector/ripped-paper-note_4561983.htm</a:t>
+            </a:r>
+            <a:endParaRPr lang="hu-HU" dirty="0"/>
           </a:p>
           <a:p>
             <a:r>
               <a:rPr lang="hu-HU" dirty="0">
                 <a:hlinkClick r:id="rId4"/>
               </a:rPr>
-              <a:t>https://</a:t>
-            </a:r>
-            <a:r>
-              <a:rPr lang="hu-HU" dirty="0" smtClean="0">
-                <a:hlinkClick r:id="rId4"/>
-              </a:rPr>
-              <a:t>st.hzcdn.com/simgs/0cf142150825f739_4-5579/home-design.jpg</a:t>
-            </a:r>
-            <a:endParaRPr lang="hu-HU" dirty="0" smtClean="0"/>
+              <a:t>https://st.hzcdn.com/simgs/0cf142150825f739_4-5579/home-design.jpg</a:t>
+            </a:r>
+            <a:endParaRPr lang="hu-HU" dirty="0"/>
           </a:p>
           <a:p>
             <a:r>
               <a:rPr lang="hu-HU" dirty="0"/>
               <a:t>https://jguitar.com/images/chordshape/Bsharp-Major-Bsharp-x%2C3%2C2%2C0%2C1%2C3.png</a:t>
             </a:r>
-            <a:endParaRPr lang="hu-HU" dirty="0"/>
           </a:p>
         </p:txBody>
       </p:sp>
@@ -7022,13 +8250,6 @@
   <p:clrMapOvr>
     <a:masterClrMapping/>
   </p:clrMapOvr>
-  <p:timing>
-    <p:tnLst>
-      <p:par>
-        <p:cTn id="1" dur="indefinite" restart="never" nodeType="tmRoot"/>
-      </p:par>
-    </p:tnLst>
-  </p:timing>
 </p:sld>
 </file>
 
@@ -7065,10 +8286,9 @@
           <a:lstStyle/>
           <a:p>
             <a:r>
-              <a:rPr lang="hu-HU" dirty="0" smtClean="0"/>
+              <a:rPr lang="hu-HU" dirty="0"/>
               <a:t>Tartalmi források</a:t>
             </a:r>
-            <a:endParaRPr lang="hu-HU" dirty="0"/>
           </a:p>
         </p:txBody>
       </p:sp>

</xml_diff>

<commit_message>
"Működés, programozás, szoftver" diák létrehozása
</commit_message>
<xml_diff>
--- a/DAW.pptx
+++ b/DAW.pptx
@@ -11,8 +11,11 @@
     <p:sldId id="258" r:id="rId5"/>
     <p:sldId id="260" r:id="rId6"/>
     <p:sldId id="259" r:id="rId7"/>
-    <p:sldId id="261" r:id="rId8"/>
-    <p:sldId id="263" r:id="rId9"/>
+    <p:sldId id="266" r:id="rId8"/>
+    <p:sldId id="264" r:id="rId9"/>
+    <p:sldId id="265" r:id="rId10"/>
+    <p:sldId id="261" r:id="rId11"/>
+    <p:sldId id="263" r:id="rId12"/>
   </p:sldIdLst>
   <p:sldSz cx="12192000" cy="6858000"/>
   <p:notesSz cx="6858000" cy="9144000"/>
@@ -610,7 +613,7 @@
           <a:p>
             <a:fld id="{7FB75100-EDBA-48EA-928A-085546B307CA}" type="datetimeFigureOut">
               <a:rPr lang="hu-HU" smtClean="0"/>
-              <a:t>2022.09.15.</a:t>
+              <a:t>2022.09.19.</a:t>
             </a:fld>
             <a:endParaRPr lang="hu-HU"/>
           </a:p>
@@ -908,7 +911,7 @@
           <a:p>
             <a:fld id="{7FB75100-EDBA-48EA-928A-085546B307CA}" type="datetimeFigureOut">
               <a:rPr lang="hu-HU" smtClean="0"/>
-              <a:t>2022.09.15.</a:t>
+              <a:t>2022.09.19.</a:t>
             </a:fld>
             <a:endParaRPr lang="hu-HU"/>
           </a:p>
@@ -1100,7 +1103,7 @@
           <a:p>
             <a:fld id="{7FB75100-EDBA-48EA-928A-085546B307CA}" type="datetimeFigureOut">
               <a:rPr lang="hu-HU" smtClean="0"/>
-              <a:t>2022.09.15.</a:t>
+              <a:t>2022.09.19.</a:t>
             </a:fld>
             <a:endParaRPr lang="hu-HU"/>
           </a:p>
@@ -1361,7 +1364,7 @@
           <a:p>
             <a:fld id="{7FB75100-EDBA-48EA-928A-085546B307CA}" type="datetimeFigureOut">
               <a:rPr lang="hu-HU" smtClean="0"/>
-              <a:t>2022.09.15.</a:t>
+              <a:t>2022.09.19.</a:t>
             </a:fld>
             <a:endParaRPr lang="hu-HU"/>
           </a:p>
@@ -1785,7 +1788,7 @@
           <a:p>
             <a:fld id="{7FB75100-EDBA-48EA-928A-085546B307CA}" type="datetimeFigureOut">
               <a:rPr lang="hu-HU" smtClean="0"/>
-              <a:t>2022.09.15.</a:t>
+              <a:t>2022.09.19.</a:t>
             </a:fld>
             <a:endParaRPr lang="hu-HU"/>
           </a:p>
@@ -2322,7 +2325,7 @@
           <a:p>
             <a:fld id="{7FB75100-EDBA-48EA-928A-085546B307CA}" type="datetimeFigureOut">
               <a:rPr lang="hu-HU" smtClean="0"/>
-              <a:t>2022.09.15.</a:t>
+              <a:t>2022.09.19.</a:t>
             </a:fld>
             <a:endParaRPr lang="hu-HU"/>
           </a:p>
@@ -3186,7 +3189,7 @@
           <a:p>
             <a:fld id="{7FB75100-EDBA-48EA-928A-085546B307CA}" type="datetimeFigureOut">
               <a:rPr lang="hu-HU" smtClean="0"/>
-              <a:t>2022.09.15.</a:t>
+              <a:t>2022.09.19.</a:t>
             </a:fld>
             <a:endParaRPr lang="hu-HU"/>
           </a:p>
@@ -3356,7 +3359,7 @@
           <a:p>
             <a:fld id="{7FB75100-EDBA-48EA-928A-085546B307CA}" type="datetimeFigureOut">
               <a:rPr lang="hu-HU" smtClean="0"/>
-              <a:t>2022.09.15.</a:t>
+              <a:t>2022.09.19.</a:t>
             </a:fld>
             <a:endParaRPr lang="hu-HU"/>
           </a:p>
@@ -3540,7 +3543,7 @@
           <a:p>
             <a:fld id="{7FB75100-EDBA-48EA-928A-085546B307CA}" type="datetimeFigureOut">
               <a:rPr lang="hu-HU" smtClean="0"/>
-              <a:t>2022.09.15.</a:t>
+              <a:t>2022.09.19.</a:t>
             </a:fld>
             <a:endParaRPr lang="hu-HU"/>
           </a:p>
@@ -3710,7 +3713,7 @@
           <a:p>
             <a:fld id="{7FB75100-EDBA-48EA-928A-085546B307CA}" type="datetimeFigureOut">
               <a:rPr lang="hu-HU" smtClean="0"/>
-              <a:t>2022.09.15.</a:t>
+              <a:t>2022.09.19.</a:t>
             </a:fld>
             <a:endParaRPr lang="hu-HU"/>
           </a:p>
@@ -3954,7 +3957,7 @@
           <a:p>
             <a:fld id="{7FB75100-EDBA-48EA-928A-085546B307CA}" type="datetimeFigureOut">
               <a:rPr lang="hu-HU" smtClean="0"/>
-              <a:t>2022.09.15.</a:t>
+              <a:t>2022.09.19.</a:t>
             </a:fld>
             <a:endParaRPr lang="hu-HU"/>
           </a:p>
@@ -4190,7 +4193,7 @@
           <a:p>
             <a:fld id="{7FB75100-EDBA-48EA-928A-085546B307CA}" type="datetimeFigureOut">
               <a:rPr lang="hu-HU" smtClean="0"/>
-              <a:t>2022.09.15.</a:t>
+              <a:t>2022.09.19.</a:t>
             </a:fld>
             <a:endParaRPr lang="hu-HU"/>
           </a:p>
@@ -4656,7 +4659,7 @@
           <a:p>
             <a:fld id="{7FB75100-EDBA-48EA-928A-085546B307CA}" type="datetimeFigureOut">
               <a:rPr lang="hu-HU" smtClean="0"/>
-              <a:t>2022.09.15.</a:t>
+              <a:t>2022.09.19.</a:t>
             </a:fld>
             <a:endParaRPr lang="hu-HU"/>
           </a:p>
@@ -4774,7 +4777,7 @@
           <a:p>
             <a:fld id="{7FB75100-EDBA-48EA-928A-085546B307CA}" type="datetimeFigureOut">
               <a:rPr lang="hu-HU" smtClean="0"/>
-              <a:t>2022.09.15.</a:t>
+              <a:t>2022.09.19.</a:t>
             </a:fld>
             <a:endParaRPr lang="hu-HU"/>
           </a:p>
@@ -4869,7 +4872,7 @@
           <a:p>
             <a:fld id="{7FB75100-EDBA-48EA-928A-085546B307CA}" type="datetimeFigureOut">
               <a:rPr lang="hu-HU" smtClean="0"/>
-              <a:t>2022.09.15.</a:t>
+              <a:t>2022.09.19.</a:t>
             </a:fld>
             <a:endParaRPr lang="hu-HU"/>
           </a:p>
@@ -5124,7 +5127,7 @@
           <a:p>
             <a:fld id="{7FB75100-EDBA-48EA-928A-085546B307CA}" type="datetimeFigureOut">
               <a:rPr lang="hu-HU" smtClean="0"/>
-              <a:t>2022.09.15.</a:t>
+              <a:t>2022.09.19.</a:t>
             </a:fld>
             <a:endParaRPr lang="hu-HU"/>
           </a:p>
@@ -5424,7 +5427,7 @@
           <a:p>
             <a:fld id="{7FB75100-EDBA-48EA-928A-085546B307CA}" type="datetimeFigureOut">
               <a:rPr lang="hu-HU" smtClean="0"/>
-              <a:t>2022.09.15.</a:t>
+              <a:t>2022.09.19.</a:t>
             </a:fld>
             <a:endParaRPr lang="hu-HU"/>
           </a:p>
@@ -5658,7 +5661,7 @@
           <a:p>
             <a:fld id="{7FB75100-EDBA-48EA-928A-085546B307CA}" type="datetimeFigureOut">
               <a:rPr lang="hu-HU" smtClean="0"/>
-              <a:t>2022.09.15.</a:t>
+              <a:t>2022.09.19.</a:t>
             </a:fld>
             <a:endParaRPr lang="hu-HU"/>
           </a:p>
@@ -6717,6 +6720,240 @@
 </p:sld>
 </file>
 
+<file path=ppt/slides/slide10.xml><?xml version="1.0" encoding="utf-8"?>
+<p:sld xmlns:a="http://schemas.openxmlformats.org/drawingml/2006/main" xmlns:r="http://schemas.openxmlformats.org/officeDocument/2006/relationships" xmlns:p="http://schemas.openxmlformats.org/presentationml/2006/main">
+  <p:cSld>
+    <p:spTree>
+      <p:nvGrpSpPr>
+        <p:cNvPr id="1" name=""/>
+        <p:cNvGrpSpPr/>
+        <p:nvPr/>
+      </p:nvGrpSpPr>
+      <p:grpSpPr>
+        <a:xfrm>
+          <a:off x="0" y="0"/>
+          <a:ext cx="0" cy="0"/>
+          <a:chOff x="0" y="0"/>
+          <a:chExt cx="0" cy="0"/>
+        </a:xfrm>
+      </p:grpSpPr>
+      <p:sp>
+        <p:nvSpPr>
+          <p:cNvPr id="2" name="Cím 1"/>
+          <p:cNvSpPr>
+            <a:spLocks noGrp="1"/>
+          </p:cNvSpPr>
+          <p:nvPr>
+            <p:ph type="title"/>
+          </p:nvPr>
+        </p:nvSpPr>
+        <p:spPr/>
+        <p:txBody>
+          <a:bodyPr>
+            <a:normAutofit/>
+          </a:bodyPr>
+          <a:lstStyle/>
+          <a:p>
+            <a:r>
+              <a:rPr lang="hu-HU" dirty="0"/>
+              <a:t>Képforrások:</a:t>
+            </a:r>
+          </a:p>
+        </p:txBody>
+      </p:sp>
+      <p:sp>
+        <p:nvSpPr>
+          <p:cNvPr id="3" name="Tartalom helye 2"/>
+          <p:cNvSpPr>
+            <a:spLocks noGrp="1"/>
+          </p:cNvSpPr>
+          <p:nvPr>
+            <p:ph idx="1"/>
+          </p:nvPr>
+        </p:nvSpPr>
+        <p:spPr/>
+        <p:txBody>
+          <a:bodyPr>
+            <a:normAutofit fontScale="92500" lnSpcReduction="10000"/>
+          </a:bodyPr>
+          <a:lstStyle/>
+          <a:p>
+            <a:r>
+              <a:rPr lang="hu-HU" dirty="0">
+                <a:hlinkClick r:id="rId2"/>
+              </a:rPr>
+              <a:t>https://in.pinterest.com/pin/607915649691778141/</a:t>
+            </a:r>
+            <a:endParaRPr lang="hu-HU" dirty="0"/>
+          </a:p>
+          <a:p>
+            <a:r>
+              <a:rPr lang="hu-HU" dirty="0"/>
+              <a:t>https://online.berklee.edu/takenote/wp-content/uploads/2022/02/Take-Note-DAW-image.jpg</a:t>
+            </a:r>
+          </a:p>
+          <a:p>
+            <a:r>
+              <a:rPr lang="hu-HU" dirty="0">
+                <a:hlinkClick r:id="rId3"/>
+              </a:rPr>
+              <a:t>https://www.freepik.com/free-vector/ripped-paper-note_4561983.htm</a:t>
+            </a:r>
+            <a:endParaRPr lang="hu-HU" dirty="0"/>
+          </a:p>
+          <a:p>
+            <a:r>
+              <a:rPr lang="hu-HU" dirty="0">
+                <a:hlinkClick r:id="rId4"/>
+              </a:rPr>
+              <a:t>https://st.hzcdn.com/simgs/0cf142150825f739_4-5579/home-design.jpg</a:t>
+            </a:r>
+            <a:endParaRPr lang="hu-HU" dirty="0"/>
+          </a:p>
+          <a:p>
+            <a:r>
+              <a:rPr lang="hu-HU" dirty="0">
+                <a:hlinkClick r:id="rId5"/>
+              </a:rPr>
+              <a:t>https://</a:t>
+            </a:r>
+            <a:r>
+              <a:rPr lang="hu-HU" dirty="0" smtClean="0">
+                <a:hlinkClick r:id="rId5"/>
+              </a:rPr>
+              <a:t>jguitar.com/images/chordshape/Bsharp-Major-Bsharp-x%2C3%2C2%2C0%2C1%2C3.png</a:t>
+            </a:r>
+            <a:endParaRPr lang="hu-HU" dirty="0" smtClean="0"/>
+          </a:p>
+          <a:p>
+            <a:r>
+              <a:rPr lang="hu-HU" dirty="0">
+                <a:hlinkClick r:id="rId6"/>
+              </a:rPr>
+              <a:t>https://</a:t>
+            </a:r>
+            <a:r>
+              <a:rPr lang="hu-HU" dirty="0" smtClean="0">
+                <a:hlinkClick r:id="rId6"/>
+              </a:rPr>
+              <a:t>musictech.com/wp-content/uploads/2015/10/marc-antony-batmandica1.jpg</a:t>
+            </a:r>
+            <a:endParaRPr lang="hu-HU" dirty="0" smtClean="0"/>
+          </a:p>
+          <a:p>
+            <a:r>
+              <a:rPr lang="hu-HU" dirty="0">
+                <a:hlinkClick r:id="rId7"/>
+              </a:rPr>
+              <a:t>https://</a:t>
+            </a:r>
+            <a:r>
+              <a:rPr lang="hu-HU" dirty="0" smtClean="0">
+                <a:hlinkClick r:id="rId7"/>
+              </a:rPr>
+              <a:t>www.seekpng.com/png/detail/48-485999_torn-notebook-paper-png-folha-de-papel-rasgado.png</a:t>
+            </a:r>
+            <a:endParaRPr lang="hu-HU" dirty="0" smtClean="0"/>
+          </a:p>
+          <a:p>
+            <a:r>
+              <a:rPr lang="hu-HU" dirty="0"/>
+              <a:t>https://static.vecteezy.com/system/resources/previews/002/052/434/non_2x/scrapbook-note-pieces-torn-paper-set-notebook-paper-ripped-paper-different-shapes-free-vector.jpg</a:t>
+            </a:r>
+            <a:endParaRPr lang="hu-HU" dirty="0" smtClean="0"/>
+          </a:p>
+          <a:p>
+            <a:endParaRPr lang="hu-HU" dirty="0"/>
+          </a:p>
+        </p:txBody>
+      </p:sp>
+    </p:spTree>
+    <p:extLst>
+      <p:ext uri="{BB962C8B-B14F-4D97-AF65-F5344CB8AC3E}">
+        <p14:creationId xmlns:p14="http://schemas.microsoft.com/office/powerpoint/2010/main" val="4196032858"/>
+      </p:ext>
+    </p:extLst>
+  </p:cSld>
+  <p:clrMapOvr>
+    <a:masterClrMapping/>
+  </p:clrMapOvr>
+</p:sld>
+</file>
+
+<file path=ppt/slides/slide11.xml><?xml version="1.0" encoding="utf-8"?>
+<p:sld xmlns:a="http://schemas.openxmlformats.org/drawingml/2006/main" xmlns:r="http://schemas.openxmlformats.org/officeDocument/2006/relationships" xmlns:p="http://schemas.openxmlformats.org/presentationml/2006/main">
+  <p:cSld>
+    <p:spTree>
+      <p:nvGrpSpPr>
+        <p:cNvPr id="1" name=""/>
+        <p:cNvGrpSpPr/>
+        <p:nvPr/>
+      </p:nvGrpSpPr>
+      <p:grpSpPr>
+        <a:xfrm>
+          <a:off x="0" y="0"/>
+          <a:ext cx="0" cy="0"/>
+          <a:chOff x="0" y="0"/>
+          <a:chExt cx="0" cy="0"/>
+        </a:xfrm>
+      </p:grpSpPr>
+      <p:sp>
+        <p:nvSpPr>
+          <p:cNvPr id="2" name="Cím 1"/>
+          <p:cNvSpPr>
+            <a:spLocks noGrp="1"/>
+          </p:cNvSpPr>
+          <p:nvPr>
+            <p:ph type="title"/>
+          </p:nvPr>
+        </p:nvSpPr>
+        <p:spPr/>
+        <p:txBody>
+          <a:bodyPr/>
+          <a:lstStyle/>
+          <a:p>
+            <a:r>
+              <a:rPr lang="hu-HU" dirty="0"/>
+              <a:t>Tartalmi források</a:t>
+            </a:r>
+          </a:p>
+        </p:txBody>
+      </p:sp>
+      <p:sp>
+        <p:nvSpPr>
+          <p:cNvPr id="3" name="Tartalom helye 2"/>
+          <p:cNvSpPr>
+            <a:spLocks noGrp="1"/>
+          </p:cNvSpPr>
+          <p:nvPr>
+            <p:ph idx="1"/>
+          </p:nvPr>
+        </p:nvSpPr>
+        <p:spPr/>
+        <p:txBody>
+          <a:bodyPr/>
+          <a:lstStyle/>
+          <a:p>
+            <a:r>
+              <a:rPr lang="hu-HU" dirty="0"/>
+              <a:t>https://integraudio.com/how-to-develop-daw/</a:t>
+            </a:r>
+          </a:p>
+        </p:txBody>
+      </p:sp>
+    </p:spTree>
+    <p:extLst>
+      <p:ext uri="{BB962C8B-B14F-4D97-AF65-F5344CB8AC3E}">
+        <p14:creationId xmlns:p14="http://schemas.microsoft.com/office/powerpoint/2010/main" val="1048620916"/>
+      </p:ext>
+    </p:extLst>
+  </p:cSld>
+  <p:clrMapOvr>
+    <a:masterClrMapping/>
+  </p:clrMapOvr>
+</p:sld>
+</file>
+
 <file path=ppt/slides/slide2.xml><?xml version="1.0" encoding="utf-8"?>
 <p:sld xmlns:a="http://schemas.openxmlformats.org/drawingml/2006/main" xmlns:r="http://schemas.openxmlformats.org/officeDocument/2006/relationships" xmlns:p="http://schemas.openxmlformats.org/presentationml/2006/main">
   <p:cSld>
@@ -6778,7 +7015,7 @@
         </p:blipFill>
         <p:spPr bwMode="auto">
           <a:xfrm>
-            <a:off x="-399841" y="301933"/>
+            <a:off x="-488741" y="712390"/>
             <a:ext cx="7473741" cy="6635134"/>
           </a:xfrm>
           <a:prstGeom prst="rect">
@@ -6831,8 +7068,8 @@
         </p:nvSpPr>
         <p:spPr>
           <a:xfrm>
-            <a:off x="913795" y="2000582"/>
-            <a:ext cx="10353762" cy="4058751"/>
+            <a:off x="812194" y="2371174"/>
+            <a:ext cx="10795605" cy="4058751"/>
           </a:xfrm>
         </p:spPr>
         <p:txBody>
@@ -6991,7 +7228,7 @@
         </p:nvCxnSpPr>
         <p:spPr>
           <a:xfrm>
-            <a:off x="1790700" y="4876800"/>
+            <a:off x="1638300" y="5245100"/>
             <a:ext cx="355600" cy="0"/>
           </a:xfrm>
           <a:prstGeom prst="straightConnector1">
@@ -8620,6 +8857,96 @@
           <a:chExt cx="0" cy="0"/>
         </a:xfrm>
       </p:grpSpPr>
+      <p:pic>
+        <p:nvPicPr>
+          <p:cNvPr id="1026" name="Picture 2" descr="Scrapbook note pieces torn paper Set. Notebook paper ripped. Vector paper  different shapes 2052434 Vector Art at Vecteezy"/>
+          <p:cNvPicPr>
+            <a:picLocks noChangeAspect="1" noChangeArrowheads="1"/>
+          </p:cNvPicPr>
+          <p:nvPr/>
+        </p:nvPicPr>
+        <p:blipFill>
+          <a:blip r:embed="rId2">
+            <a:extLst>
+              <a:ext uri="{BEBA8EAE-BF5A-486C-A8C5-ECC9F3942E4B}">
+                <a14:imgProps xmlns:a14="http://schemas.microsoft.com/office/drawing/2010/main">
+                  <a14:imgLayer r:embed="rId3">
+                    <a14:imgEffect>
+                      <a14:backgroundRemoval t="62653" b="90000" l="9900" r="88809">
+                        <a14:backgroundMark x1="48924" y1="18367" x2="48924" y2="18367"/>
+                        <a14:backgroundMark x1="43472" y1="43673" x2="72166" y2="40204"/>
+                        <a14:backgroundMark x1="77331" y1="19796" x2="63558" y2="36939"/>
+                        <a14:backgroundMark x1="46341" y1="25102" x2="73745" y2="31633"/>
+                        <a14:backgroundMark x1="43902" y1="60000" x2="88379" y2="59592"/>
+                        <a14:backgroundMark x1="87518" y1="12041" x2="86083" y2="62041"/>
+                        <a14:backgroundMark x1="47202" y1="20204" x2="78623" y2="22653"/>
+                        <a14:backgroundMark x1="82640" y1="28980" x2="47489" y2="51020"/>
+                        <a14:backgroundMark x1="13773" y1="65714" x2="13773" y2="65714"/>
+                        <a14:backgroundMark x1="16643" y1="66735" x2="16643" y2="66735"/>
+                        <a14:backgroundMark x1="18508" y1="66327" x2="18508" y2="66327"/>
+                        <a14:backgroundMark x1="20947" y1="66122" x2="20947" y2="66122"/>
+                        <a14:backgroundMark x1="23386" y1="65918" x2="23386" y2="65918"/>
+                        <a14:backgroundMark x1="25538" y1="66122" x2="25538" y2="66122"/>
+                        <a14:backgroundMark x1="27690" y1="65918" x2="27690" y2="65918"/>
+                        <a14:backgroundMark x1="30129" y1="65918" x2="30129" y2="65918"/>
+                        <a14:backgroundMark x1="32568" y1="65918" x2="32568" y2="65918"/>
+                        <a14:backgroundMark x1="34864" y1="65918" x2="34864" y2="65918"/>
+                        <a14:backgroundMark x1="37303" y1="66122" x2="37303" y2="66122"/>
+                        <a14:backgroundMark x1="39311" y1="65918" x2="39311" y2="65918"/>
+                        <a14:backgroundMark x1="41607" y1="66122" x2="41607" y2="66122"/>
+                        <a14:backgroundMark x1="44476" y1="66122" x2="44476" y2="66122"/>
+                        <a14:backgroundMark x1="46198" y1="65918" x2="46198" y2="65918"/>
+                        <a14:backgroundMark x1="48637" y1="65918" x2="48637" y2="65918"/>
+                        <a14:backgroundMark x1="51076" y1="65918" x2="51076" y2="65918"/>
+                        <a14:backgroundMark x1="53515" y1="65918" x2="53515" y2="65918"/>
+                        <a14:backgroundMark x1="55811" y1="66327" x2="55811" y2="66327"/>
+                        <a14:backgroundMark x1="58393" y1="66327" x2="58393" y2="66327"/>
+                        <a14:backgroundMark x1="60258" y1="66122" x2="60258" y2="66122"/>
+                        <a14:backgroundMark x1="62697" y1="65714" x2="62697" y2="65714"/>
+                        <a14:backgroundMark x1="65423" y1="66122" x2="65423" y2="66122"/>
+                        <a14:backgroundMark x1="67288" y1="65918" x2="67288" y2="65918"/>
+                        <a14:backgroundMark x1="69871" y1="65918" x2="69871" y2="65918"/>
+                        <a14:backgroundMark x1="72310" y1="66122" x2="72310" y2="66122"/>
+                        <a14:backgroundMark x1="74175" y1="66122" x2="74175" y2="66122"/>
+                        <a14:backgroundMark x1="76614" y1="66122" x2="76614" y2="66122"/>
+                        <a14:backgroundMark x1="78766" y1="66122" x2="78766" y2="66122"/>
+                        <a14:backgroundMark x1="81492" y1="66531" x2="81492" y2="66531"/>
+                        <a14:backgroundMark x1="83788" y1="66122" x2="83788" y2="66122"/>
+                      </a14:backgroundRemoval>
+                    </a14:imgEffect>
+                  </a14:imgLayer>
+                </a14:imgProps>
+              </a:ext>
+              <a:ext uri="{28A0092B-C50C-407E-A947-70E740481C1C}">
+                <a14:useLocalDpi xmlns:a14="http://schemas.microsoft.com/office/drawing/2010/main" val="0"/>
+              </a:ext>
+            </a:extLst>
+          </a:blip>
+          <a:srcRect/>
+          <a:stretch>
+            <a:fillRect/>
+          </a:stretch>
+        </p:blipFill>
+        <p:spPr bwMode="auto">
+          <a:xfrm>
+            <a:off x="-1119750" y="-3168926"/>
+            <a:ext cx="10432989" cy="7334526"/>
+          </a:xfrm>
+          <a:prstGeom prst="rect">
+            <a:avLst/>
+          </a:prstGeom>
+          <a:noFill/>
+          <a:extLst>
+            <a:ext uri="{909E8E84-426E-40DD-AFC4-6F175D3DCCD1}">
+              <a14:hiddenFill xmlns:a14="http://schemas.microsoft.com/office/drawing/2010/main">
+                <a:solidFill>
+                  <a:srgbClr val="FFFFFF"/>
+                </a:solidFill>
+              </a14:hiddenFill>
+            </a:ext>
+          </a:extLst>
+        </p:spPr>
+      </p:pic>
       <p:sp>
         <p:nvSpPr>
           <p:cNvPr id="2" name="Cím 1"/>
@@ -8630,11 +8957,17 @@
             <p:ph type="title"/>
           </p:nvPr>
         </p:nvSpPr>
-        <p:spPr/>
+        <p:spPr>
+          <a:xfrm>
+            <a:off x="0" y="452180"/>
+            <a:ext cx="1969105" cy="970450"/>
+          </a:xfrm>
+        </p:spPr>
         <p:txBody>
           <a:bodyPr/>
           <a:lstStyle/>
           <a:p>
+            <a:pPr algn="l"/>
             <a:r>
               <a:rPr lang="hu-HU" dirty="0"/>
               <a:t>Elődei</a:t>
@@ -8652,98 +8985,237 @@
             <p:ph idx="1"/>
           </p:nvPr>
         </p:nvSpPr>
-        <p:spPr/>
+        <p:spPr>
+          <a:xfrm>
+            <a:off x="1321241" y="1724805"/>
+            <a:ext cx="6197160" cy="1653395"/>
+          </a:xfrm>
+        </p:spPr>
         <p:txBody>
           <a:bodyPr/>
           <a:lstStyle/>
           <a:p>
-            <a:r>
-              <a:rPr lang="hu-HU" dirty="0" smtClean="0"/>
+            <a:pPr>
+              <a:buClr>
+                <a:schemeClr val="bg1"/>
+              </a:buClr>
+              <a:buFont typeface="Arial" panose="020B0604020202020204" pitchFamily="34" charset="0"/>
+              <a:buChar char="•"/>
+            </a:pPr>
+            <a:r>
+              <a:rPr lang="hu-HU" b="1" dirty="0" smtClean="0">
+                <a:solidFill>
+                  <a:schemeClr val="bg1"/>
+                </a:solidFill>
+                <a:latin typeface="Bradley Hand ITC" panose="03070402050302030203" pitchFamily="66" charset="0"/>
+              </a:rPr>
               <a:t>Magnetofon  </a:t>
             </a:r>
             <a:r>
-              <a:rPr lang="hu-HU" i="1" dirty="0" smtClean="0"/>
+              <a:rPr lang="hu-HU" b="1" i="1" dirty="0" smtClean="0">
+                <a:solidFill>
+                  <a:schemeClr val="bg1"/>
+                </a:solidFill>
+                <a:latin typeface="Bradley Hand ITC" panose="03070402050302030203" pitchFamily="66" charset="0"/>
+              </a:rPr>
               <a:t>„(</a:t>
             </a:r>
             <a:r>
-              <a:rPr lang="hu-HU" i="1" dirty="0" err="1" smtClean="0"/>
+              <a:rPr lang="hu-HU" b="1" i="1" dirty="0" err="1" smtClean="0">
+                <a:solidFill>
+                  <a:schemeClr val="bg1"/>
+                </a:solidFill>
+                <a:latin typeface="Bradley Hand ITC" panose="03070402050302030203" pitchFamily="66" charset="0"/>
+              </a:rPr>
               <a:t>Reel</a:t>
             </a:r>
             <a:r>
-              <a:rPr lang="hu-HU" i="1" dirty="0" smtClean="0"/>
+              <a:rPr lang="hu-HU" b="1" i="1" dirty="0" smtClean="0">
+                <a:solidFill>
+                  <a:schemeClr val="bg1"/>
+                </a:solidFill>
+                <a:latin typeface="Bradley Hand ITC" panose="03070402050302030203" pitchFamily="66" charset="0"/>
+              </a:rPr>
               <a:t> </a:t>
             </a:r>
             <a:r>
-              <a:rPr lang="hu-HU" i="1" dirty="0" err="1" smtClean="0"/>
+              <a:rPr lang="hu-HU" b="1" i="1" dirty="0" err="1" smtClean="0">
+                <a:solidFill>
+                  <a:schemeClr val="bg1"/>
+                </a:solidFill>
+                <a:latin typeface="Bradley Hand ITC" panose="03070402050302030203" pitchFamily="66" charset="0"/>
+              </a:rPr>
               <a:t>to</a:t>
             </a:r>
             <a:r>
-              <a:rPr lang="hu-HU" i="1" dirty="0" smtClean="0"/>
+              <a:rPr lang="hu-HU" b="1" i="1" dirty="0" smtClean="0">
+                <a:solidFill>
+                  <a:schemeClr val="bg1"/>
+                </a:solidFill>
+                <a:latin typeface="Bradley Hand ITC" panose="03070402050302030203" pitchFamily="66" charset="0"/>
+              </a:rPr>
               <a:t> </a:t>
             </a:r>
             <a:r>
-              <a:rPr lang="hu-HU" i="1" dirty="0" err="1" smtClean="0"/>
+              <a:rPr lang="hu-HU" b="1" i="1" dirty="0" err="1" smtClean="0">
+                <a:solidFill>
+                  <a:schemeClr val="bg1"/>
+                </a:solidFill>
+                <a:latin typeface="Bradley Hand ITC" panose="03070402050302030203" pitchFamily="66" charset="0"/>
+              </a:rPr>
               <a:t>reel</a:t>
             </a:r>
             <a:r>
-              <a:rPr lang="hu-HU" i="1" dirty="0" smtClean="0"/>
+              <a:rPr lang="hu-HU" b="1" i="1" dirty="0" smtClean="0">
+                <a:solidFill>
+                  <a:schemeClr val="bg1"/>
+                </a:solidFill>
+                <a:latin typeface="Bradley Hand ITC" panose="03070402050302030203" pitchFamily="66" charset="0"/>
+              </a:rPr>
               <a:t> </a:t>
             </a:r>
             <a:r>
-              <a:rPr lang="hu-HU" i="1" dirty="0" err="1" smtClean="0"/>
+              <a:rPr lang="hu-HU" b="1" i="1" dirty="0" err="1" smtClean="0">
+                <a:solidFill>
+                  <a:schemeClr val="bg1"/>
+                </a:solidFill>
+                <a:latin typeface="Bradley Hand ITC" panose="03070402050302030203" pitchFamily="66" charset="0"/>
+              </a:rPr>
               <a:t>tape</a:t>
             </a:r>
             <a:r>
-              <a:rPr lang="hu-HU" i="1" dirty="0" smtClean="0"/>
+              <a:rPr lang="hu-HU" b="1" i="1" dirty="0" smtClean="0">
+                <a:solidFill>
+                  <a:schemeClr val="bg1"/>
+                </a:solidFill>
+                <a:latin typeface="Bradley Hand ITC" panose="03070402050302030203" pitchFamily="66" charset="0"/>
+              </a:rPr>
               <a:t> </a:t>
             </a:r>
             <a:r>
-              <a:rPr lang="hu-HU" i="1" dirty="0" err="1" smtClean="0"/>
+              <a:rPr lang="hu-HU" b="1" i="1" dirty="0" err="1" smtClean="0">
+                <a:solidFill>
+                  <a:schemeClr val="bg1"/>
+                </a:solidFill>
+                <a:latin typeface="Bradley Hand ITC" panose="03070402050302030203" pitchFamily="66" charset="0"/>
+              </a:rPr>
               <a:t>machine</a:t>
             </a:r>
             <a:r>
-              <a:rPr lang="hu-HU" i="1" dirty="0" smtClean="0"/>
+              <a:rPr lang="hu-HU" b="1" i="1" dirty="0" smtClean="0">
+                <a:solidFill>
+                  <a:schemeClr val="bg1"/>
+                </a:solidFill>
+                <a:latin typeface="Bradley Hand ITC" panose="03070402050302030203" pitchFamily="66" charset="0"/>
+              </a:rPr>
               <a:t>)”</a:t>
             </a:r>
           </a:p>
           <a:p>
-            <a:pPr lvl="1"/>
-            <a:r>
-              <a:rPr lang="hu-HU" i="1" dirty="0" smtClean="0"/>
+            <a:pPr marL="450000" lvl="1" indent="0">
+              <a:buClr>
+                <a:schemeClr val="bg1"/>
+              </a:buClr>
+              <a:buNone/>
+            </a:pPr>
+            <a:r>
+              <a:rPr lang="hu-HU" sz="2000" b="1" i="1" dirty="0">
+                <a:solidFill>
+                  <a:schemeClr val="bg1"/>
+                </a:solidFill>
+                <a:latin typeface="Bradley Hand ITC" panose="03070402050302030203" pitchFamily="66" charset="0"/>
+              </a:rPr>
+              <a:t>	</a:t>
+            </a:r>
+            <a:r>
+              <a:rPr lang="hu-HU" sz="2000" b="1" i="1" dirty="0" smtClean="0">
+                <a:solidFill>
+                  <a:schemeClr val="bg1"/>
+                </a:solidFill>
+                <a:latin typeface="Bradley Hand ITC" panose="03070402050302030203" pitchFamily="66" charset="0"/>
+              </a:rPr>
+              <a:t>	</a:t>
+            </a:r>
+            <a:r>
+              <a:rPr lang="hu-HU" sz="2000" b="1" i="1" dirty="0" smtClean="0">
+                <a:solidFill>
+                  <a:schemeClr val="bg1"/>
+                </a:solidFill>
+                <a:latin typeface="Bradley Hand ITC" panose="03070402050302030203" pitchFamily="66" charset="0"/>
+              </a:rPr>
               <a:t>Használták: 1940-es </a:t>
             </a:r>
             <a:r>
-              <a:rPr lang="hu-HU" i="1" dirty="0" err="1" smtClean="0"/>
+              <a:rPr lang="hu-HU" sz="2000" b="1" i="1" dirty="0" err="1" smtClean="0">
+                <a:solidFill>
+                  <a:schemeClr val="bg1"/>
+                </a:solidFill>
+                <a:latin typeface="Bradley Hand ITC" panose="03070402050302030203" pitchFamily="66" charset="0"/>
+              </a:rPr>
               <a:t>éveltől</a:t>
             </a:r>
             <a:r>
-              <a:rPr lang="hu-HU" i="1" dirty="0" smtClean="0"/>
+              <a:rPr lang="hu-HU" sz="2000" b="1" i="1" dirty="0" smtClean="0">
+                <a:solidFill>
+                  <a:schemeClr val="bg1"/>
+                </a:solidFill>
+                <a:latin typeface="Bradley Hand ITC" panose="03070402050302030203" pitchFamily="66" charset="0"/>
+              </a:rPr>
               <a:t> 1980-ig</a:t>
             </a:r>
             <a:br>
-              <a:rPr lang="hu-HU" i="1" dirty="0" smtClean="0"/>
+              <a:rPr lang="hu-HU" sz="2000" b="1" i="1" dirty="0" smtClean="0">
+                <a:solidFill>
+                  <a:schemeClr val="bg1"/>
+                </a:solidFill>
+                <a:latin typeface="Bradley Hand ITC" panose="03070402050302030203" pitchFamily="66" charset="0"/>
+              </a:rPr>
             </a:br>
             <a:r>
-              <a:rPr lang="hu-HU" i="1" dirty="0" smtClean="0"/>
-              <a:t>(</a:t>
-            </a:r>
-            <a:r>
-              <a:rPr lang="hu-HU" i="1" dirty="0" err="1" smtClean="0"/>
+              <a:rPr lang="hu-HU" sz="2000" b="1" i="1" dirty="0" smtClean="0">
+                <a:solidFill>
+                  <a:schemeClr val="bg1"/>
+                </a:solidFill>
+                <a:latin typeface="Bradley Hand ITC" panose="03070402050302030203" pitchFamily="66" charset="0"/>
+              </a:rPr>
+              <a:t>		(</a:t>
+            </a:r>
+            <a:r>
+              <a:rPr lang="hu-HU" sz="2000" b="1" i="1" dirty="0" err="1" smtClean="0">
+                <a:solidFill>
+                  <a:schemeClr val="bg1"/>
+                </a:solidFill>
+                <a:latin typeface="Bradley Hand ITC" panose="03070402050302030203" pitchFamily="66" charset="0"/>
+              </a:rPr>
               <a:t>Bohemian</a:t>
             </a:r>
             <a:r>
-              <a:rPr lang="hu-HU" i="1" dirty="0" smtClean="0"/>
+              <a:rPr lang="hu-HU" sz="2000" b="1" i="1" dirty="0" smtClean="0">
+                <a:solidFill>
+                  <a:schemeClr val="bg1"/>
+                </a:solidFill>
+                <a:latin typeface="Bradley Hand ITC" panose="03070402050302030203" pitchFamily="66" charset="0"/>
+              </a:rPr>
               <a:t> </a:t>
             </a:r>
             <a:r>
-              <a:rPr lang="hu-HU" i="1" dirty="0" err="1" smtClean="0"/>
+              <a:rPr lang="hu-HU" sz="2000" b="1" i="1" dirty="0" err="1" smtClean="0">
+                <a:solidFill>
+                  <a:schemeClr val="bg1"/>
+                </a:solidFill>
+                <a:latin typeface="Bradley Hand ITC" panose="03070402050302030203" pitchFamily="66" charset="0"/>
+              </a:rPr>
               <a:t>rhapsody</a:t>
             </a:r>
             <a:r>
-              <a:rPr lang="hu-HU" i="1" dirty="0" smtClean="0"/>
-              <a:t>(film)- láthatjuk használatát, bonyodalmát</a:t>
-            </a:r>
-            <a:endParaRPr lang="hu-HU" i="1" dirty="0" smtClean="0"/>
+              <a:rPr lang="hu-HU" sz="2000" b="1" i="1" dirty="0" smtClean="0">
+                <a:solidFill>
+                  <a:schemeClr val="bg1"/>
+                </a:solidFill>
+                <a:latin typeface="Bradley Hand ITC" panose="03070402050302030203" pitchFamily="66" charset="0"/>
+              </a:rPr>
+              <a:t>(film)- láthatjuk 						használatát, bonyodalmát</a:t>
+            </a:r>
           </a:p>
           <a:p>
             <a:pPr marL="36900" indent="0">
@@ -8762,7 +9234,7 @@
           <p:nvPr/>
         </p:nvPicPr>
         <p:blipFill>
-          <a:blip r:embed="rId2">
+          <a:blip r:embed="rId4">
             <a:extLst>
               <a:ext uri="{28A0092B-C50C-407E-A947-70E740481C1C}">
                 <a14:useLocalDpi xmlns:a14="http://schemas.microsoft.com/office/drawing/2010/main" val="0"/>
@@ -8776,13 +9248,18 @@
         </p:blipFill>
         <p:spPr bwMode="auto">
           <a:xfrm>
-            <a:off x="2349004" y="3596724"/>
+            <a:off x="829125" y="3548311"/>
             <a:ext cx="4486274" cy="2990850"/>
           </a:xfrm>
           <a:prstGeom prst="rect">
             <a:avLst/>
           </a:prstGeom>
           <a:noFill/>
+          <a:ln w="12700">
+            <a:solidFill>
+              <a:srgbClr val="00B0F0"/>
+            </a:solidFill>
+          </a:ln>
           <a:extLst>
             <a:ext uri="{909E8E84-426E-40DD-AFC4-6F175D3DCCD1}">
               <a14:hiddenFill xmlns:a14="http://schemas.microsoft.com/office/drawing/2010/main">
@@ -8803,7 +9280,7 @@
           <p:nvPr/>
         </p:nvPicPr>
         <p:blipFill>
-          <a:blip r:embed="rId3">
+          <a:blip r:embed="rId5">
             <a:extLst>
               <a:ext uri="{28A0092B-C50C-407E-A947-70E740481C1C}">
                 <a14:useLocalDpi xmlns:a14="http://schemas.microsoft.com/office/drawing/2010/main" val="0"/>
@@ -8817,8 +9294,405 @@
         </p:blipFill>
         <p:spPr bwMode="auto">
           <a:xfrm>
-            <a:off x="7772400" y="1186937"/>
-            <a:ext cx="4028428" cy="2683388"/>
+            <a:off x="8279127" y="813084"/>
+            <a:ext cx="3612705" cy="2406470"/>
+          </a:xfrm>
+          <a:prstGeom prst="rect">
+            <a:avLst/>
+          </a:prstGeom>
+          <a:noFill/>
+          <a:ln>
+            <a:solidFill>
+              <a:srgbClr val="00B0F0"/>
+            </a:solidFill>
+          </a:ln>
+          <a:extLst>
+            <a:ext uri="{909E8E84-426E-40DD-AFC4-6F175D3DCCD1}">
+              <a14:hiddenFill xmlns:a14="http://schemas.microsoft.com/office/drawing/2010/main">
+                <a:solidFill>
+                  <a:srgbClr val="FFFFFF"/>
+                </a:solidFill>
+              </a14:hiddenFill>
+            </a:ext>
+          </a:extLst>
+        </p:spPr>
+      </p:pic>
+      <p:pic>
+        <p:nvPicPr>
+          <p:cNvPr id="7" name="Picture 12" descr="masking tape png - x tape clip art PNG image with transparent background |  TOPpng">
+            <a:extLst>
+              <a:ext uri="{FF2B5EF4-FFF2-40B4-BE49-F238E27FC236}">
+                <a16:creationId xmlns:a16="http://schemas.microsoft.com/office/drawing/2014/main" id="{67518699-2CAE-C797-0B3D-DAE856DE85E8}"/>
+              </a:ext>
+            </a:extLst>
+          </p:cNvPr>
+          <p:cNvPicPr>
+            <a:picLocks noChangeAspect="1" noChangeArrowheads="1"/>
+          </p:cNvPicPr>
+          <p:nvPr/>
+        </p:nvPicPr>
+        <p:blipFill>
+          <a:blip r:embed="rId6" cstate="print">
+            <a:extLst>
+              <a:ext uri="{BEBA8EAE-BF5A-486C-A8C5-ECC9F3942E4B}">
+                <a14:imgProps xmlns:a14="http://schemas.microsoft.com/office/drawing/2010/main">
+                  <a14:imgLayer r:embed="rId7">
+                    <a14:imgEffect>
+                      <a14:backgroundRemoval t="7451" b="90920" l="1310" r="97738">
+                        <a14:foregroundMark x1="4881" y1="25378" x2="8095" y2="26310"/>
+                        <a14:foregroundMark x1="1310" y1="23283" x2="1310" y2="23283"/>
+                        <a14:foregroundMark x1="21429" y1="7451" x2="23095" y2="8731"/>
+                        <a14:foregroundMark x1="77976" y1="90920" x2="76310" y2="89406"/>
+                        <a14:foregroundMark x1="93929" y1="77416" x2="93214" y2="73923"/>
+                        <a14:foregroundMark x1="97738" y1="76251" x2="97738" y2="76251"/>
+                      </a14:backgroundRemoval>
+                    </a14:imgEffect>
+                  </a14:imgLayer>
+                </a14:imgProps>
+              </a:ext>
+              <a:ext uri="{28A0092B-C50C-407E-A947-70E740481C1C}">
+                <a14:useLocalDpi xmlns:a14="http://schemas.microsoft.com/office/drawing/2010/main" val="0"/>
+              </a:ext>
+            </a:extLst>
+          </a:blip>
+          <a:srcRect/>
+          <a:stretch>
+            <a:fillRect/>
+          </a:stretch>
+        </p:blipFill>
+        <p:spPr bwMode="auto">
+          <a:xfrm rot="5400000">
+            <a:off x="11046933" y="2501446"/>
+            <a:ext cx="1135796" cy="1161609"/>
+          </a:xfrm>
+          <a:prstGeom prst="rect">
+            <a:avLst/>
+          </a:prstGeom>
+          <a:noFill/>
+          <a:extLst>
+            <a:ext uri="{909E8E84-426E-40DD-AFC4-6F175D3DCCD1}">
+              <a14:hiddenFill xmlns:a14="http://schemas.microsoft.com/office/drawing/2010/main">
+                <a:solidFill>
+                  <a:srgbClr val="FFFFFF"/>
+                </a:solidFill>
+              </a14:hiddenFill>
+            </a:ext>
+          </a:extLst>
+        </p:spPr>
+      </p:pic>
+      <p:pic>
+        <p:nvPicPr>
+          <p:cNvPr id="8" name="Picture 12" descr="masking tape png - x tape clip art PNG image with transparent background |  TOPpng">
+            <a:extLst>
+              <a:ext uri="{FF2B5EF4-FFF2-40B4-BE49-F238E27FC236}">
+                <a16:creationId xmlns:a16="http://schemas.microsoft.com/office/drawing/2014/main" id="{67518699-2CAE-C797-0B3D-DAE856DE85E8}"/>
+              </a:ext>
+            </a:extLst>
+          </p:cNvPr>
+          <p:cNvPicPr>
+            <a:picLocks noChangeAspect="1" noChangeArrowheads="1"/>
+          </p:cNvPicPr>
+          <p:nvPr/>
+        </p:nvPicPr>
+        <p:blipFill>
+          <a:blip r:embed="rId6" cstate="print">
+            <a:extLst>
+              <a:ext uri="{BEBA8EAE-BF5A-486C-A8C5-ECC9F3942E4B}">
+                <a14:imgProps xmlns:a14="http://schemas.microsoft.com/office/drawing/2010/main">
+                  <a14:imgLayer r:embed="rId7">
+                    <a14:imgEffect>
+                      <a14:backgroundRemoval t="7451" b="90920" l="1310" r="97738">
+                        <a14:foregroundMark x1="4881" y1="25378" x2="8095" y2="26310"/>
+                        <a14:foregroundMark x1="1310" y1="23283" x2="1310" y2="23283"/>
+                        <a14:foregroundMark x1="21429" y1="7451" x2="23095" y2="8731"/>
+                        <a14:foregroundMark x1="77976" y1="90920" x2="76310" y2="89406"/>
+                        <a14:foregroundMark x1="93929" y1="77416" x2="93214" y2="73923"/>
+                        <a14:foregroundMark x1="97738" y1="76251" x2="97738" y2="76251"/>
+                      </a14:backgroundRemoval>
+                    </a14:imgEffect>
+                  </a14:imgLayer>
+                </a14:imgProps>
+              </a:ext>
+              <a:ext uri="{28A0092B-C50C-407E-A947-70E740481C1C}">
+                <a14:useLocalDpi xmlns:a14="http://schemas.microsoft.com/office/drawing/2010/main" val="0"/>
+              </a:ext>
+            </a:extLst>
+          </a:blip>
+          <a:srcRect/>
+          <a:stretch>
+            <a:fillRect/>
+          </a:stretch>
+        </p:blipFill>
+        <p:spPr bwMode="auto">
+          <a:xfrm rot="5400000">
+            <a:off x="7924032" y="576103"/>
+            <a:ext cx="1135796" cy="1161609"/>
+          </a:xfrm>
+          <a:prstGeom prst="rect">
+            <a:avLst/>
+          </a:prstGeom>
+          <a:noFill/>
+          <a:extLst>
+            <a:ext uri="{909E8E84-426E-40DD-AFC4-6F175D3DCCD1}">
+              <a14:hiddenFill xmlns:a14="http://schemas.microsoft.com/office/drawing/2010/main">
+                <a:solidFill>
+                  <a:srgbClr val="FFFFFF"/>
+                </a:solidFill>
+              </a14:hiddenFill>
+            </a:ext>
+          </a:extLst>
+        </p:spPr>
+      </p:pic>
+      <p:pic>
+        <p:nvPicPr>
+          <p:cNvPr id="9" name="Picture 12" descr="masking tape png - x tape clip art PNG image with transparent background |  TOPpng">
+            <a:extLst>
+              <a:ext uri="{FF2B5EF4-FFF2-40B4-BE49-F238E27FC236}">
+                <a16:creationId xmlns:a16="http://schemas.microsoft.com/office/drawing/2014/main" id="{0E301E45-EF06-AAFA-D78A-C6C03A80A9D8}"/>
+              </a:ext>
+            </a:extLst>
+          </p:cNvPr>
+          <p:cNvPicPr>
+            <a:picLocks noChangeAspect="1" noChangeArrowheads="1"/>
+          </p:cNvPicPr>
+          <p:nvPr/>
+        </p:nvPicPr>
+        <p:blipFill>
+          <a:blip r:embed="rId8" cstate="print">
+            <a:duotone>
+              <a:prstClr val="black"/>
+              <a:srgbClr val="0000FF">
+                <a:tint val="45000"/>
+                <a:satMod val="400000"/>
+              </a:srgbClr>
+            </a:duotone>
+            <a:extLst>
+              <a:ext uri="{BEBA8EAE-BF5A-486C-A8C5-ECC9F3942E4B}">
+                <a14:imgProps xmlns:a14="http://schemas.microsoft.com/office/drawing/2010/main">
+                  <a14:imgLayer r:embed="rId9">
+                    <a14:imgEffect>
+                      <a14:backgroundRemoval t="7451" b="90920" l="1310" r="97738">
+                        <a14:foregroundMark x1="4881" y1="25378" x2="8095" y2="26310"/>
+                        <a14:foregroundMark x1="1310" y1="23283" x2="1310" y2="23283"/>
+                        <a14:foregroundMark x1="21429" y1="7451" x2="23095" y2="8731"/>
+                        <a14:foregroundMark x1="77976" y1="90920" x2="76310" y2="89406"/>
+                        <a14:foregroundMark x1="93929" y1="77416" x2="93214" y2="73923"/>
+                        <a14:foregroundMark x1="97738" y1="76251" x2="97738" y2="76251"/>
+                      </a14:backgroundRemoval>
+                    </a14:imgEffect>
+                  </a14:imgLayer>
+                </a14:imgProps>
+              </a:ext>
+              <a:ext uri="{28A0092B-C50C-407E-A947-70E740481C1C}">
+                <a14:useLocalDpi xmlns:a14="http://schemas.microsoft.com/office/drawing/2010/main" val="0"/>
+              </a:ext>
+            </a:extLst>
+          </a:blip>
+          <a:srcRect/>
+          <a:stretch>
+            <a:fillRect/>
+          </a:stretch>
+        </p:blipFill>
+        <p:spPr bwMode="auto">
+          <a:xfrm rot="16200000">
+            <a:off x="7225706" y="2426686"/>
+            <a:ext cx="962360" cy="984232"/>
+          </a:xfrm>
+          <a:prstGeom prst="rect">
+            <a:avLst/>
+          </a:prstGeom>
+          <a:noFill/>
+          <a:extLst>
+            <a:ext uri="{909E8E84-426E-40DD-AFC4-6F175D3DCCD1}">
+              <a14:hiddenFill xmlns:a14="http://schemas.microsoft.com/office/drawing/2010/main">
+                <a:solidFill>
+                  <a:srgbClr val="FFFFFF"/>
+                </a:solidFill>
+              </a14:hiddenFill>
+            </a:ext>
+          </a:extLst>
+        </p:spPr>
+      </p:pic>
+      <p:pic>
+        <p:nvPicPr>
+          <p:cNvPr id="10" name="Picture 12" descr="masking tape png - x tape clip art PNG image with transparent background |  TOPpng">
+            <a:extLst>
+              <a:ext uri="{FF2B5EF4-FFF2-40B4-BE49-F238E27FC236}">
+                <a16:creationId xmlns:a16="http://schemas.microsoft.com/office/drawing/2014/main" id="{0E301E45-EF06-AAFA-D78A-C6C03A80A9D8}"/>
+              </a:ext>
+            </a:extLst>
+          </p:cNvPr>
+          <p:cNvPicPr>
+            <a:picLocks noChangeAspect="1" noChangeArrowheads="1"/>
+          </p:cNvPicPr>
+          <p:nvPr/>
+        </p:nvPicPr>
+        <p:blipFill>
+          <a:blip r:embed="rId8" cstate="print">
+            <a:duotone>
+              <a:prstClr val="black"/>
+              <a:srgbClr val="0000FF">
+                <a:tint val="45000"/>
+                <a:satMod val="400000"/>
+              </a:srgbClr>
+            </a:duotone>
+            <a:extLst>
+              <a:ext uri="{BEBA8EAE-BF5A-486C-A8C5-ECC9F3942E4B}">
+                <a14:imgProps xmlns:a14="http://schemas.microsoft.com/office/drawing/2010/main">
+                  <a14:imgLayer r:embed="rId9">
+                    <a14:imgEffect>
+                      <a14:backgroundRemoval t="7451" b="90920" l="1310" r="97738">
+                        <a14:foregroundMark x1="4881" y1="25378" x2="8095" y2="26310"/>
+                        <a14:foregroundMark x1="1310" y1="23283" x2="1310" y2="23283"/>
+                        <a14:foregroundMark x1="21429" y1="7451" x2="23095" y2="8731"/>
+                        <a14:foregroundMark x1="77976" y1="90920" x2="76310" y2="89406"/>
+                        <a14:foregroundMark x1="93929" y1="77416" x2="93214" y2="73923"/>
+                        <a14:foregroundMark x1="97738" y1="76251" x2="97738" y2="76251"/>
+                      </a14:backgroundRemoval>
+                    </a14:imgEffect>
+                  </a14:imgLayer>
+                </a14:imgProps>
+              </a:ext>
+              <a:ext uri="{28A0092B-C50C-407E-A947-70E740481C1C}">
+                <a14:useLocalDpi xmlns:a14="http://schemas.microsoft.com/office/drawing/2010/main" val="0"/>
+              </a:ext>
+            </a:extLst>
+          </a:blip>
+          <a:srcRect/>
+          <a:stretch>
+            <a:fillRect/>
+          </a:stretch>
+        </p:blipFill>
+        <p:spPr bwMode="auto">
+          <a:xfrm rot="16200000">
+            <a:off x="347945" y="1210907"/>
+            <a:ext cx="962360" cy="984232"/>
+          </a:xfrm>
+          <a:prstGeom prst="rect">
+            <a:avLst/>
+          </a:prstGeom>
+          <a:noFill/>
+          <a:extLst>
+            <a:ext uri="{909E8E84-426E-40DD-AFC4-6F175D3DCCD1}">
+              <a14:hiddenFill xmlns:a14="http://schemas.microsoft.com/office/drawing/2010/main">
+                <a:solidFill>
+                  <a:srgbClr val="FFFFFF"/>
+                </a:solidFill>
+              </a14:hiddenFill>
+            </a:ext>
+          </a:extLst>
+        </p:spPr>
+      </p:pic>
+      <p:pic>
+        <p:nvPicPr>
+          <p:cNvPr id="11" name="Picture 12" descr="masking tape png - x tape clip art PNG image with transparent background |  TOPpng">
+            <a:extLst>
+              <a:ext uri="{FF2B5EF4-FFF2-40B4-BE49-F238E27FC236}">
+                <a16:creationId xmlns:a16="http://schemas.microsoft.com/office/drawing/2014/main" id="{67518699-2CAE-C797-0B3D-DAE856DE85E8}"/>
+              </a:ext>
+            </a:extLst>
+          </p:cNvPr>
+          <p:cNvPicPr>
+            <a:picLocks noChangeAspect="1" noChangeArrowheads="1"/>
+          </p:cNvPicPr>
+          <p:nvPr/>
+        </p:nvPicPr>
+        <p:blipFill>
+          <a:blip r:embed="rId10" cstate="print">
+            <a:extLst>
+              <a:ext uri="{BEBA8EAE-BF5A-486C-A8C5-ECC9F3942E4B}">
+                <a14:imgProps xmlns:a14="http://schemas.microsoft.com/office/drawing/2010/main">
+                  <a14:imgLayer r:embed="rId7">
+                    <a14:imgEffect>
+                      <a14:backgroundRemoval t="7451" b="90920" l="1310" r="97738">
+                        <a14:foregroundMark x1="4881" y1="25378" x2="8095" y2="26310"/>
+                        <a14:foregroundMark x1="1310" y1="23283" x2="1310" y2="23283"/>
+                        <a14:foregroundMark x1="21429" y1="7451" x2="23095" y2="8731"/>
+                        <a14:foregroundMark x1="77976" y1="90920" x2="76310" y2="89406"/>
+                        <a14:foregroundMark x1="93929" y1="77416" x2="93214" y2="73923"/>
+                        <a14:foregroundMark x1="97738" y1="76251" x2="97738" y2="76251"/>
+                      </a14:backgroundRemoval>
+                    </a14:imgEffect>
+                  </a14:imgLayer>
+                </a14:imgProps>
+              </a:ext>
+              <a:ext uri="{28A0092B-C50C-407E-A947-70E740481C1C}">
+                <a14:useLocalDpi xmlns:a14="http://schemas.microsoft.com/office/drawing/2010/main" val="0"/>
+              </a:ext>
+            </a:extLst>
+          </a:blip>
+          <a:srcRect/>
+          <a:stretch>
+            <a:fillRect/>
+          </a:stretch>
+        </p:blipFill>
+        <p:spPr bwMode="auto">
+          <a:xfrm rot="570766">
+            <a:off x="4387875" y="3369652"/>
+            <a:ext cx="1176488" cy="1203226"/>
+          </a:xfrm>
+          <a:prstGeom prst="rect">
+            <a:avLst/>
+          </a:prstGeom>
+          <a:noFill/>
+          <a:extLst>
+            <a:ext uri="{909E8E84-426E-40DD-AFC4-6F175D3DCCD1}">
+              <a14:hiddenFill xmlns:a14="http://schemas.microsoft.com/office/drawing/2010/main">
+                <a:solidFill>
+                  <a:srgbClr val="FFFFFF"/>
+                </a:solidFill>
+              </a14:hiddenFill>
+            </a:ext>
+          </a:extLst>
+        </p:spPr>
+      </p:pic>
+      <p:pic>
+        <p:nvPicPr>
+          <p:cNvPr id="12" name="Picture 12" descr="masking tape png - x tape clip art PNG image with transparent background |  TOPpng">
+            <a:extLst>
+              <a:ext uri="{FF2B5EF4-FFF2-40B4-BE49-F238E27FC236}">
+                <a16:creationId xmlns:a16="http://schemas.microsoft.com/office/drawing/2014/main" id="{67518699-2CAE-C797-0B3D-DAE856DE85E8}"/>
+              </a:ext>
+            </a:extLst>
+          </p:cNvPr>
+          <p:cNvPicPr>
+            <a:picLocks noChangeAspect="1" noChangeArrowheads="1"/>
+          </p:cNvPicPr>
+          <p:nvPr/>
+        </p:nvPicPr>
+        <p:blipFill>
+          <a:blip r:embed="rId10" cstate="print">
+            <a:extLst>
+              <a:ext uri="{BEBA8EAE-BF5A-486C-A8C5-ECC9F3942E4B}">
+                <a14:imgProps xmlns:a14="http://schemas.microsoft.com/office/drawing/2010/main">
+                  <a14:imgLayer r:embed="rId7">
+                    <a14:imgEffect>
+                      <a14:backgroundRemoval t="7451" b="90920" l="1310" r="97738">
+                        <a14:foregroundMark x1="4881" y1="25378" x2="8095" y2="26310"/>
+                        <a14:foregroundMark x1="1310" y1="23283" x2="1310" y2="23283"/>
+                        <a14:foregroundMark x1="21429" y1="7451" x2="23095" y2="8731"/>
+                        <a14:foregroundMark x1="77976" y1="90920" x2="76310" y2="89406"/>
+                        <a14:foregroundMark x1="93929" y1="77416" x2="93214" y2="73923"/>
+                        <a14:foregroundMark x1="97738" y1="76251" x2="97738" y2="76251"/>
+                      </a14:backgroundRemoval>
+                    </a14:imgEffect>
+                  </a14:imgLayer>
+                </a14:imgProps>
+              </a:ext>
+              <a:ext uri="{28A0092B-C50C-407E-A947-70E740481C1C}">
+                <a14:useLocalDpi xmlns:a14="http://schemas.microsoft.com/office/drawing/2010/main" val="0"/>
+              </a:ext>
+            </a:extLst>
+          </a:blip>
+          <a:srcRect/>
+          <a:stretch>
+            <a:fillRect/>
+          </a:stretch>
+        </p:blipFill>
+        <p:spPr bwMode="auto">
+          <a:xfrm rot="10472878">
+            <a:off x="396307" y="5714748"/>
+            <a:ext cx="1176488" cy="1203226"/>
           </a:xfrm>
           <a:prstGeom prst="rect">
             <a:avLst/>
@@ -8881,9 +9755,10 @@
           <a:lstStyle/>
           <a:p>
             <a:r>
-              <a:rPr lang="hu-HU" dirty="0"/>
-              <a:t>Működése</a:t>
-            </a:r>
+              <a:rPr lang="hu-HU" dirty="0" smtClean="0"/>
+              <a:t>Működésük HARDWARE</a:t>
+            </a:r>
+            <a:endParaRPr lang="hu-HU" dirty="0"/>
           </a:p>
         </p:txBody>
       </p:sp>
@@ -8902,7 +9777,7 @@
           <a:bodyPr/>
           <a:lstStyle/>
           <a:p>
-            <a:endParaRPr lang="hu-HU"/>
+            <a:endParaRPr lang="hu-HU" dirty="0"/>
           </a:p>
         </p:txBody>
       </p:sp>
@@ -8954,9 +9829,10 @@
           <a:lstStyle/>
           <a:p>
             <a:r>
-              <a:rPr lang="hu-HU" dirty="0"/>
-              <a:t>Képforrások:</a:t>
-            </a:r>
+              <a:rPr lang="hu-HU" dirty="0" smtClean="0"/>
+              <a:t>Működésük SZOFTVER</a:t>
+            </a:r>
+            <a:endParaRPr lang="hu-HU" dirty="0"/>
           </a:p>
         </p:txBody>
       </p:sp>
@@ -8976,83 +9852,312 @@
           <a:lstStyle/>
           <a:p>
             <a:r>
-              <a:rPr lang="hu-HU" dirty="0">
-                <a:hlinkClick r:id="rId2"/>
-              </a:rPr>
-              <a:t>https://in.pinterest.com/pin/607915649691778141/</a:t>
-            </a:r>
-            <a:endParaRPr lang="hu-HU" dirty="0"/>
-          </a:p>
-          <a:p>
+              <a:rPr lang="hu-HU" dirty="0" smtClean="0"/>
+              <a:t>4 alapvető komponens:</a:t>
+            </a:r>
+          </a:p>
+          <a:p>
+            <a:pPr marL="36900" indent="0">
+              <a:buNone/>
+            </a:pPr>
+            <a:r>
+              <a:rPr lang="hu-HU" dirty="0" smtClean="0"/>
+              <a:t>-Számítógép							Gazdagép		</a:t>
+            </a:r>
+          </a:p>
+          <a:p>
+            <a:pPr marL="36900" indent="0">
+              <a:buNone/>
+            </a:pPr>
+            <a:r>
+              <a:rPr lang="hu-HU" dirty="0" smtClean="0"/>
+              <a:t>-Hangkártya/(egyéb </a:t>
+            </a:r>
+            <a:r>
+              <a:rPr lang="hu-HU" dirty="0" err="1" smtClean="0"/>
+              <a:t>audio</a:t>
+            </a:r>
+            <a:r>
+              <a:rPr lang="hu-HU" dirty="0" smtClean="0"/>
+              <a:t> interfész)		</a:t>
+            </a:r>
             <a:r>
               <a:rPr lang="hu-HU" dirty="0"/>
-              <a:t>https://online.berklee.edu/takenote/wp-content/uploads/2022/02/Take-Note-DAW-image.jpg</a:t>
-            </a:r>
-          </a:p>
-          <a:p>
-            <a:r>
-              <a:rPr lang="hu-HU" dirty="0">
-                <a:hlinkClick r:id="rId3"/>
-              </a:rPr>
-              <a:t>https://www.freepik.com/free-vector/ripped-paper-note_4561983.htm</a:t>
-            </a:r>
-            <a:endParaRPr lang="hu-HU" dirty="0"/>
-          </a:p>
-          <a:p>
-            <a:r>
-              <a:rPr lang="hu-HU" dirty="0">
-                <a:hlinkClick r:id="rId4"/>
-              </a:rPr>
-              <a:t>https://st.hzcdn.com/simgs/0cf142150825f739_4-5579/home-design.jpg</a:t>
-            </a:r>
-            <a:endParaRPr lang="hu-HU" dirty="0"/>
-          </a:p>
-          <a:p>
-            <a:r>
-              <a:rPr lang="hu-HU" dirty="0">
-                <a:hlinkClick r:id="rId5"/>
-              </a:rPr>
-              <a:t>https://</a:t>
-            </a:r>
-            <a:r>
-              <a:rPr lang="hu-HU" dirty="0" smtClean="0">
-                <a:hlinkClick r:id="rId5"/>
-              </a:rPr>
-              <a:t>jguitar.com/images/chordshape/Bsharp-Major-Bsharp-x%2C3%2C2%2C0%2C1%2C3.png</a:t>
+              <a:t>Analóg, Digitális jelek</a:t>
             </a:r>
             <a:endParaRPr lang="hu-HU" dirty="0" smtClean="0"/>
           </a:p>
           <a:p>
-            <a:r>
-              <a:rPr lang="hu-HU" dirty="0">
-                <a:hlinkClick r:id="rId6"/>
-              </a:rPr>
-              <a:t>https://</a:t>
-            </a:r>
-            <a:r>
-              <a:rPr lang="hu-HU" dirty="0" smtClean="0">
-                <a:hlinkClick r:id="rId6"/>
-              </a:rPr>
-              <a:t>musictech.com/wp-content/uploads/2015/10/marc-antony-batmandica1.jpg</a:t>
-            </a:r>
+            <a:pPr marL="36900" indent="0">
+              <a:buNone/>
+            </a:pPr>
             <a:endParaRPr lang="hu-HU" dirty="0" smtClean="0"/>
           </a:p>
           <a:p>
-            <a:r>
-              <a:rPr lang="hu-HU" dirty="0"/>
-              <a:t>https://www.seekpng.com/png/detail/48-485999_torn-notebook-paper-png-folha-de-papel-rasgado.png</a:t>
-            </a:r>
-            <a:endParaRPr lang="hu-HU" dirty="0" smtClean="0"/>
-          </a:p>
-          <a:p>
-            <a:endParaRPr lang="hu-HU" dirty="0"/>
+            <a:pPr marL="36900" indent="0">
+              <a:buNone/>
+            </a:pPr>
+            <a:r>
+              <a:rPr lang="hu-HU" dirty="0" smtClean="0"/>
+              <a:t>-Hangszerkesztő szoftver(DAW)		Hangszerkesztő funkciók</a:t>
+            </a:r>
+          </a:p>
+          <a:p>
+            <a:pPr marL="36900" indent="0">
+              <a:buNone/>
+            </a:pPr>
+            <a:r>
+              <a:rPr lang="hu-HU" dirty="0" smtClean="0"/>
+              <a:t>-Bemeneti eszköz </a:t>
+            </a:r>
+          </a:p>
+        </p:txBody>
+      </p:sp>
+      <p:sp>
+        <p:nvSpPr>
+          <p:cNvPr id="6" name="Jobb oldali kapcsos zárójel 5"/>
+          <p:cNvSpPr/>
+          <p:nvPr/>
+        </p:nvSpPr>
+        <p:spPr>
+          <a:xfrm>
+            <a:off x="5130800" y="2044700"/>
+            <a:ext cx="368300" cy="812800"/>
+          </a:xfrm>
+          <a:prstGeom prst="rightBrace">
+            <a:avLst>
+              <a:gd name="adj1" fmla="val 3646"/>
+              <a:gd name="adj2" fmla="val 39706"/>
+            </a:avLst>
+          </a:prstGeom>
+          <a:ln w="38100">
+            <a:solidFill>
+              <a:srgbClr val="00B0F0"/>
+            </a:solidFill>
+          </a:ln>
+        </p:spPr>
+        <p:style>
+          <a:lnRef idx="1">
+            <a:schemeClr val="accent1"/>
+          </a:lnRef>
+          <a:fillRef idx="0">
+            <a:schemeClr val="accent1"/>
+          </a:fillRef>
+          <a:effectRef idx="0">
+            <a:schemeClr val="accent1"/>
+          </a:effectRef>
+          <a:fontRef idx="minor">
+            <a:schemeClr val="tx1"/>
+          </a:fontRef>
+        </p:style>
+        <p:txBody>
+          <a:bodyPr rtlCol="0" anchor="ctr"/>
+          <a:lstStyle/>
+          <a:p>
+            <a:pPr algn="ctr"/>
+            <a:endParaRPr lang="hu-HU"/>
+          </a:p>
+        </p:txBody>
+      </p:sp>
+      <p:sp>
+        <p:nvSpPr>
+          <p:cNvPr id="7" name="Jobb oldali kapcsos zárójel 6"/>
+          <p:cNvSpPr/>
+          <p:nvPr/>
+        </p:nvSpPr>
+        <p:spPr>
+          <a:xfrm>
+            <a:off x="4533900" y="3448050"/>
+            <a:ext cx="368300" cy="812800"/>
+          </a:xfrm>
+          <a:prstGeom prst="rightBrace">
+            <a:avLst>
+              <a:gd name="adj1" fmla="val 3646"/>
+              <a:gd name="adj2" fmla="val 27206"/>
+            </a:avLst>
+          </a:prstGeom>
+          <a:ln w="38100">
+            <a:solidFill>
+              <a:srgbClr val="00B0F0"/>
+            </a:solidFill>
+          </a:ln>
+        </p:spPr>
+        <p:style>
+          <a:lnRef idx="1">
+            <a:schemeClr val="accent1"/>
+          </a:lnRef>
+          <a:fillRef idx="0">
+            <a:schemeClr val="accent1"/>
+          </a:fillRef>
+          <a:effectRef idx="0">
+            <a:schemeClr val="accent1"/>
+          </a:effectRef>
+          <a:fontRef idx="minor">
+            <a:schemeClr val="tx1"/>
+          </a:fontRef>
+        </p:style>
+        <p:txBody>
+          <a:bodyPr rtlCol="0" anchor="ctr"/>
+          <a:lstStyle/>
+          <a:p>
+            <a:pPr algn="ctr"/>
+            <a:endParaRPr lang="hu-HU"/>
+          </a:p>
+        </p:txBody>
+      </p:sp>
+      <p:cxnSp>
+        <p:nvCxnSpPr>
+          <p:cNvPr id="9" name="Egyenes összekötő nyíllal 8"/>
+          <p:cNvCxnSpPr/>
+          <p:nvPr/>
+        </p:nvCxnSpPr>
+        <p:spPr>
+          <a:xfrm>
+            <a:off x="6832600" y="2235200"/>
+            <a:ext cx="0" cy="406400"/>
+          </a:xfrm>
+          <a:prstGeom prst="straightConnector1">
+            <a:avLst/>
+          </a:prstGeom>
+          <a:ln w="28575">
+            <a:solidFill>
+              <a:srgbClr val="00B0F0"/>
+            </a:solidFill>
+            <a:tailEnd type="triangle"/>
+          </a:ln>
+        </p:spPr>
+        <p:style>
+          <a:lnRef idx="1">
+            <a:schemeClr val="accent1"/>
+          </a:lnRef>
+          <a:fillRef idx="0">
+            <a:schemeClr val="accent1"/>
+          </a:fillRef>
+          <a:effectRef idx="0">
+            <a:schemeClr val="accent1"/>
+          </a:effectRef>
+          <a:fontRef idx="minor">
+            <a:schemeClr val="tx1"/>
+          </a:fontRef>
+        </p:style>
+      </p:cxnSp>
+      <p:sp>
+        <p:nvSpPr>
+          <p:cNvPr id="15" name="Téglalap 14"/>
+          <p:cNvSpPr/>
+          <p:nvPr/>
+        </p:nvSpPr>
+        <p:spPr>
+          <a:xfrm>
+            <a:off x="5130800" y="4533900"/>
+            <a:ext cx="7061200" cy="2324100"/>
+          </a:xfrm>
+          <a:custGeom>
+            <a:avLst/>
+            <a:gdLst>
+              <a:gd name="connsiteX0" fmla="*/ 0 w 7061200"/>
+              <a:gd name="connsiteY0" fmla="*/ 0 h 1778000"/>
+              <a:gd name="connsiteX1" fmla="*/ 7061200 w 7061200"/>
+              <a:gd name="connsiteY1" fmla="*/ 0 h 1778000"/>
+              <a:gd name="connsiteX2" fmla="*/ 7061200 w 7061200"/>
+              <a:gd name="connsiteY2" fmla="*/ 1778000 h 1778000"/>
+              <a:gd name="connsiteX3" fmla="*/ 0 w 7061200"/>
+              <a:gd name="connsiteY3" fmla="*/ 1778000 h 1778000"/>
+              <a:gd name="connsiteX4" fmla="*/ 0 w 7061200"/>
+              <a:gd name="connsiteY4" fmla="*/ 0 h 1778000"/>
+              <a:gd name="connsiteX0" fmla="*/ 0 w 7061200"/>
+              <a:gd name="connsiteY0" fmla="*/ 1778000 h 1778000"/>
+              <a:gd name="connsiteX1" fmla="*/ 7061200 w 7061200"/>
+              <a:gd name="connsiteY1" fmla="*/ 0 h 1778000"/>
+              <a:gd name="connsiteX2" fmla="*/ 7061200 w 7061200"/>
+              <a:gd name="connsiteY2" fmla="*/ 1778000 h 1778000"/>
+              <a:gd name="connsiteX3" fmla="*/ 0 w 7061200"/>
+              <a:gd name="connsiteY3" fmla="*/ 1778000 h 1778000"/>
+              <a:gd name="connsiteX4" fmla="*/ 0 w 7061200"/>
+              <a:gd name="connsiteY4" fmla="*/ 1778000 h 1778000"/>
+              <a:gd name="connsiteX0" fmla="*/ 0 w 7061200"/>
+              <a:gd name="connsiteY0" fmla="*/ 2324100 h 2324100"/>
+              <a:gd name="connsiteX1" fmla="*/ 7048500 w 7061200"/>
+              <a:gd name="connsiteY1" fmla="*/ 0 h 2324100"/>
+              <a:gd name="connsiteX2" fmla="*/ 7061200 w 7061200"/>
+              <a:gd name="connsiteY2" fmla="*/ 2324100 h 2324100"/>
+              <a:gd name="connsiteX3" fmla="*/ 0 w 7061200"/>
+              <a:gd name="connsiteY3" fmla="*/ 2324100 h 2324100"/>
+              <a:gd name="connsiteX4" fmla="*/ 0 w 7061200"/>
+              <a:gd name="connsiteY4" fmla="*/ 2324100 h 2324100"/>
+            </a:gdLst>
+            <a:ahLst/>
+            <a:cxnLst>
+              <a:cxn ang="0">
+                <a:pos x="connsiteX0" y="connsiteY0"/>
+              </a:cxn>
+              <a:cxn ang="0">
+                <a:pos x="connsiteX1" y="connsiteY1"/>
+              </a:cxn>
+              <a:cxn ang="0">
+                <a:pos x="connsiteX2" y="connsiteY2"/>
+              </a:cxn>
+              <a:cxn ang="0">
+                <a:pos x="connsiteX3" y="connsiteY3"/>
+              </a:cxn>
+              <a:cxn ang="0">
+                <a:pos x="connsiteX4" y="connsiteY4"/>
+              </a:cxn>
+            </a:cxnLst>
+            <a:rect l="l" t="t" r="r" b="b"/>
+            <a:pathLst>
+              <a:path w="7061200" h="2324100">
+                <a:moveTo>
+                  <a:pt x="0" y="2324100"/>
+                </a:moveTo>
+                <a:lnTo>
+                  <a:pt x="7048500" y="0"/>
+                </a:lnTo>
+                <a:cubicBezTo>
+                  <a:pt x="7052733" y="774700"/>
+                  <a:pt x="7056967" y="1549400"/>
+                  <a:pt x="7061200" y="2324100"/>
+                </a:cubicBezTo>
+                <a:lnTo>
+                  <a:pt x="0" y="2324100"/>
+                </a:lnTo>
+                <a:lnTo>
+                  <a:pt x="0" y="2324100"/>
+                </a:lnTo>
+                <a:close/>
+              </a:path>
+            </a:pathLst>
+          </a:custGeom>
+        </p:spPr>
+        <p:style>
+          <a:lnRef idx="2">
+            <a:schemeClr val="accent1">
+              <a:shade val="50000"/>
+            </a:schemeClr>
+          </a:lnRef>
+          <a:fillRef idx="1">
+            <a:schemeClr val="accent1"/>
+          </a:fillRef>
+          <a:effectRef idx="0">
+            <a:schemeClr val="accent1"/>
+          </a:effectRef>
+          <a:fontRef idx="minor">
+            <a:schemeClr val="lt1"/>
+          </a:fontRef>
+        </p:style>
+        <p:txBody>
+          <a:bodyPr rtlCol="0" anchor="ctr"/>
+          <a:lstStyle/>
+          <a:p>
+            <a:pPr algn="ctr"/>
+            <a:endParaRPr lang="hu-HU"/>
           </a:p>
         </p:txBody>
       </p:sp>
     </p:spTree>
     <p:extLst>
       <p:ext uri="{BB962C8B-B14F-4D97-AF65-F5344CB8AC3E}">
-        <p14:creationId xmlns:p14="http://schemas.microsoft.com/office/powerpoint/2010/main" val="4196032858"/>
+        <p14:creationId xmlns:p14="http://schemas.microsoft.com/office/powerpoint/2010/main" val="3369144330"/>
       </p:ext>
     </p:extLst>
   </p:cSld>
@@ -9095,9 +10200,10 @@
           <a:lstStyle/>
           <a:p>
             <a:r>
-              <a:rPr lang="hu-HU" dirty="0"/>
-              <a:t>Tartalmi források</a:t>
-            </a:r>
+              <a:rPr lang="hu-HU" dirty="0" smtClean="0"/>
+              <a:t>Programozásuk</a:t>
+            </a:r>
+            <a:endParaRPr lang="hu-HU" dirty="0"/>
           </a:p>
         </p:txBody>
       </p:sp>
@@ -9116,17 +10222,86 @@
           <a:bodyPr/>
           <a:lstStyle/>
           <a:p>
-            <a:r>
-              <a:rPr lang="hu-HU" dirty="0"/>
-              <a:t>https://integraudio.com/how-to-develop-daw/</a:t>
-            </a:r>
+            <a:endParaRPr lang="hu-HU" dirty="0"/>
           </a:p>
         </p:txBody>
       </p:sp>
     </p:spTree>
     <p:extLst>
       <p:ext uri="{BB962C8B-B14F-4D97-AF65-F5344CB8AC3E}">
-        <p14:creationId xmlns:p14="http://schemas.microsoft.com/office/powerpoint/2010/main" val="1048620916"/>
+        <p14:creationId xmlns:p14="http://schemas.microsoft.com/office/powerpoint/2010/main" val="2872919710"/>
+      </p:ext>
+    </p:extLst>
+  </p:cSld>
+  <p:clrMapOvr>
+    <a:masterClrMapping/>
+  </p:clrMapOvr>
+</p:sld>
+</file>
+
+<file path=ppt/slides/slide9.xml><?xml version="1.0" encoding="utf-8"?>
+<p:sld xmlns:a="http://schemas.openxmlformats.org/drawingml/2006/main" xmlns:r="http://schemas.openxmlformats.org/officeDocument/2006/relationships" xmlns:p="http://schemas.openxmlformats.org/presentationml/2006/main">
+  <p:cSld>
+    <p:spTree>
+      <p:nvGrpSpPr>
+        <p:cNvPr id="1" name=""/>
+        <p:cNvGrpSpPr/>
+        <p:nvPr/>
+      </p:nvGrpSpPr>
+      <p:grpSpPr>
+        <a:xfrm>
+          <a:off x="0" y="0"/>
+          <a:ext cx="0" cy="0"/>
+          <a:chOff x="0" y="0"/>
+          <a:chExt cx="0" cy="0"/>
+        </a:xfrm>
+      </p:grpSpPr>
+      <p:sp>
+        <p:nvSpPr>
+          <p:cNvPr id="2" name="Cím 1"/>
+          <p:cNvSpPr>
+            <a:spLocks noGrp="1"/>
+          </p:cNvSpPr>
+          <p:nvPr>
+            <p:ph type="title"/>
+          </p:nvPr>
+        </p:nvSpPr>
+        <p:spPr/>
+        <p:txBody>
+          <a:bodyPr/>
+          <a:lstStyle/>
+          <a:p>
+            <a:r>
+              <a:rPr lang="hu-HU" dirty="0" smtClean="0"/>
+              <a:t>Elérhető legjobb(szoftver)</a:t>
+            </a:r>
+            <a:endParaRPr lang="hu-HU" dirty="0"/>
+          </a:p>
+        </p:txBody>
+      </p:sp>
+      <p:sp>
+        <p:nvSpPr>
+          <p:cNvPr id="3" name="Tartalom helye 2"/>
+          <p:cNvSpPr>
+            <a:spLocks noGrp="1"/>
+          </p:cNvSpPr>
+          <p:nvPr>
+            <p:ph idx="1"/>
+          </p:nvPr>
+        </p:nvSpPr>
+        <p:spPr/>
+        <p:txBody>
+          <a:bodyPr/>
+          <a:lstStyle/>
+          <a:p>
+            <a:endParaRPr lang="hu-HU"/>
+          </a:p>
+        </p:txBody>
+      </p:sp>
+    </p:spTree>
+    <p:extLst>
+      <p:ext uri="{BB962C8B-B14F-4D97-AF65-F5344CB8AC3E}">
+        <p14:creationId xmlns:p14="http://schemas.microsoft.com/office/powerpoint/2010/main" val="3732646220"/>
       </p:ext>
     </p:extLst>
   </p:cSld>

</xml_diff>